<commit_message>
wrong font size fix
</commit_message>
<xml_diff>
--- a/Help/Figures.pptx
+++ b/Help/Figures.pptx
@@ -250,7 +250,7 @@
           <a:p>
             <a:fld id="{2DC2A043-560F-4D2E-8D1E-02B02E053659}" type="datetimeFigureOut">
               <a:rPr lang="en-US" smtClean="0"/>
-              <a:t>2018-10-23</a:t>
+              <a:t>2018-11-19</a:t>
             </a:fld>
             <a:endParaRPr lang="en-US"/>
           </a:p>
@@ -420,7 +420,7 @@
           <a:p>
             <a:fld id="{2DC2A043-560F-4D2E-8D1E-02B02E053659}" type="datetimeFigureOut">
               <a:rPr lang="en-US" smtClean="0"/>
-              <a:t>2018-10-23</a:t>
+              <a:t>2018-11-19</a:t>
             </a:fld>
             <a:endParaRPr lang="en-US"/>
           </a:p>
@@ -600,7 +600,7 @@
           <a:p>
             <a:fld id="{2DC2A043-560F-4D2E-8D1E-02B02E053659}" type="datetimeFigureOut">
               <a:rPr lang="en-US" smtClean="0"/>
-              <a:t>2018-10-23</a:t>
+              <a:t>2018-11-19</a:t>
             </a:fld>
             <a:endParaRPr lang="en-US"/>
           </a:p>
@@ -770,7 +770,7 @@
           <a:p>
             <a:fld id="{2DC2A043-560F-4D2E-8D1E-02B02E053659}" type="datetimeFigureOut">
               <a:rPr lang="en-US" smtClean="0"/>
-              <a:t>2018-10-23</a:t>
+              <a:t>2018-11-19</a:t>
             </a:fld>
             <a:endParaRPr lang="en-US"/>
           </a:p>
@@ -1016,7 +1016,7 @@
           <a:p>
             <a:fld id="{2DC2A043-560F-4D2E-8D1E-02B02E053659}" type="datetimeFigureOut">
               <a:rPr lang="en-US" smtClean="0"/>
-              <a:t>2018-10-23</a:t>
+              <a:t>2018-11-19</a:t>
             </a:fld>
             <a:endParaRPr lang="en-US"/>
           </a:p>
@@ -1248,7 +1248,7 @@
           <a:p>
             <a:fld id="{2DC2A043-560F-4D2E-8D1E-02B02E053659}" type="datetimeFigureOut">
               <a:rPr lang="en-US" smtClean="0"/>
-              <a:t>2018-10-23</a:t>
+              <a:t>2018-11-19</a:t>
             </a:fld>
             <a:endParaRPr lang="en-US"/>
           </a:p>
@@ -1615,7 +1615,7 @@
           <a:p>
             <a:fld id="{2DC2A043-560F-4D2E-8D1E-02B02E053659}" type="datetimeFigureOut">
               <a:rPr lang="en-US" smtClean="0"/>
-              <a:t>2018-10-23</a:t>
+              <a:t>2018-11-19</a:t>
             </a:fld>
             <a:endParaRPr lang="en-US"/>
           </a:p>
@@ -1733,7 +1733,7 @@
           <a:p>
             <a:fld id="{2DC2A043-560F-4D2E-8D1E-02B02E053659}" type="datetimeFigureOut">
               <a:rPr lang="en-US" smtClean="0"/>
-              <a:t>2018-10-23</a:t>
+              <a:t>2018-11-19</a:t>
             </a:fld>
             <a:endParaRPr lang="en-US"/>
           </a:p>
@@ -1828,7 +1828,7 @@
           <a:p>
             <a:fld id="{2DC2A043-560F-4D2E-8D1E-02B02E053659}" type="datetimeFigureOut">
               <a:rPr lang="en-US" smtClean="0"/>
-              <a:t>2018-10-23</a:t>
+              <a:t>2018-11-19</a:t>
             </a:fld>
             <a:endParaRPr lang="en-US"/>
           </a:p>
@@ -2105,7 +2105,7 @@
           <a:p>
             <a:fld id="{2DC2A043-560F-4D2E-8D1E-02B02E053659}" type="datetimeFigureOut">
               <a:rPr lang="en-US" smtClean="0"/>
-              <a:t>2018-10-23</a:t>
+              <a:t>2018-11-19</a:t>
             </a:fld>
             <a:endParaRPr lang="en-US"/>
           </a:p>
@@ -2358,7 +2358,7 @@
           <a:p>
             <a:fld id="{2DC2A043-560F-4D2E-8D1E-02B02E053659}" type="datetimeFigureOut">
               <a:rPr lang="en-US" smtClean="0"/>
-              <a:t>2018-10-23</a:t>
+              <a:t>2018-11-19</a:t>
             </a:fld>
             <a:endParaRPr lang="en-US"/>
           </a:p>
@@ -2571,7 +2571,7 @@
           <a:p>
             <a:fld id="{2DC2A043-560F-4D2E-8D1E-02B02E053659}" type="datetimeFigureOut">
               <a:rPr lang="en-US" smtClean="0"/>
-              <a:t>2018-10-23</a:t>
+              <a:t>2018-11-19</a:t>
             </a:fld>
             <a:endParaRPr lang="en-US"/>
           </a:p>
@@ -8601,8 +8601,8 @@
             </p:sp>
           </mc:Fallback>
         </mc:AlternateContent>
-        <mc:AlternateContent xmlns:mc="http://schemas.openxmlformats.org/markup-compatibility/2006" xmlns:a14="http://schemas.microsoft.com/office/drawing/2010/main">
-          <mc:Choice Requires="a14">
+        <mc:AlternateContent xmlns:mc="http://schemas.openxmlformats.org/markup-compatibility/2006">
+          <mc:Choice xmlns:a14="http://schemas.microsoft.com/office/drawing/2010/main" Requires="a14">
             <p:sp>
               <p:nvSpPr>
                 <p:cNvPr id="7" name="Rectangle 6"/>
@@ -8654,14 +8654,14 @@
                         <m:sSub>
                           <m:sSubPr>
                             <m:ctrlPr>
-                              <a:rPr lang="en-US" sz="2260" i="1" dirty="0" smtClean="0">
+                              <a:rPr lang="en-US" i="1" dirty="0" smtClean="0">
                                 <a:latin typeface="Cambria Math" panose="02040503050406030204" pitchFamily="18" charset="0"/>
                               </a:rPr>
                             </m:ctrlPr>
                           </m:sSubPr>
                           <m:e>
                             <m:r>
-                              <a:rPr lang="en-US" sz="2260" i="1" dirty="0">
+                              <a:rPr lang="en-US" i="1" dirty="0">
                                 <a:latin typeface="Cambria Math" panose="02040503050406030204" pitchFamily="18" charset="0"/>
                               </a:rPr>
                               <m:t>𝑥</m:t>
@@ -8669,7 +8669,7 @@
                           </m:e>
                           <m:sub>
                             <m:r>
-                              <a:rPr lang="en-US" sz="2260" b="0" i="1" dirty="0" smtClean="0">
+                              <a:rPr lang="en-US" b="0" i="1" dirty="0" smtClean="0">
                                 <a:latin typeface="Cambria Math" panose="02040503050406030204" pitchFamily="18" charset="0"/>
                               </a:rPr>
                               <m:t>2</m:t>
@@ -8679,12 +8679,12 @@
                       </m:oMath>
                     </m:oMathPara>
                   </a14:m>
-                  <a:endParaRPr lang="en-US" sz="2260" dirty="0"/>
+                  <a:endParaRPr lang="en-US" dirty="0"/>
                 </a:p>
               </p:txBody>
             </p:sp>
           </mc:Choice>
-          <mc:Fallback xmlns="">
+          <mc:Fallback>
             <p:sp>
               <p:nvSpPr>
                 <p:cNvPr id="7" name="Rectangle 6"/>
@@ -10250,8 +10250,8 @@
             </a:p>
           </p:txBody>
         </p:sp>
-        <mc:AlternateContent xmlns:mc="http://schemas.openxmlformats.org/markup-compatibility/2006">
-          <mc:Choice xmlns:a14="http://schemas.microsoft.com/office/drawing/2010/main" Requires="a14">
+        <mc:AlternateContent xmlns:mc="http://schemas.openxmlformats.org/markup-compatibility/2006" xmlns:a14="http://schemas.microsoft.com/office/drawing/2010/main">
+          <mc:Choice Requires="a14">
             <p:sp>
               <p:nvSpPr>
                 <p:cNvPr id="39" name="TextBox 38"/>
@@ -10346,13 +10346,7 @@
                             <a:rPr lang="en-US" b="0" i="1" dirty="0" smtClean="0">
                               <a:latin typeface="Cambria Math" panose="02040503050406030204" pitchFamily="18" charset="0"/>
                             </a:rPr>
-                            <m:t>−</m:t>
-                          </m:r>
-                          <m:r>
-                            <a:rPr lang="en-US" b="0" i="1" dirty="0" smtClean="0">
-                              <a:latin typeface="Cambria Math" panose="02040503050406030204" pitchFamily="18" charset="0"/>
-                            </a:rPr>
-                            <m:t>1</m:t>
+                            <m:t>−1</m:t>
                           </m:r>
                         </m:sub>
                       </m:sSub>
@@ -10380,7 +10374,7 @@
               </p:txBody>
             </p:sp>
           </mc:Choice>
-          <mc:Fallback>
+          <mc:Fallback xmlns="">
             <p:sp>
               <p:nvSpPr>
                 <p:cNvPr id="39" name="TextBox 38"/>
@@ -11274,8 +11268,8 @@
             </a:fontRef>
           </p:style>
         </p:cxnSp>
-        <mc:AlternateContent xmlns:mc="http://schemas.openxmlformats.org/markup-compatibility/2006">
-          <mc:Choice xmlns:a14="http://schemas.microsoft.com/office/drawing/2010/main" Requires="a14">
+        <mc:AlternateContent xmlns:mc="http://schemas.openxmlformats.org/markup-compatibility/2006" xmlns:a14="http://schemas.microsoft.com/office/drawing/2010/main">
+          <mc:Choice Requires="a14">
             <p:sp>
               <p:nvSpPr>
                 <p:cNvPr id="2" name="Oval 1"/>
@@ -11356,7 +11350,7 @@
               </p:txBody>
             </p:sp>
           </mc:Choice>
-          <mc:Fallback>
+          <mc:Fallback xmlns="">
             <p:sp>
               <p:nvSpPr>
                 <p:cNvPr id="2" name="Oval 1"/>
@@ -11395,8 +11389,8 @@
             </p:sp>
           </mc:Fallback>
         </mc:AlternateContent>
-        <mc:AlternateContent xmlns:mc="http://schemas.openxmlformats.org/markup-compatibility/2006">
-          <mc:Choice xmlns:a14="http://schemas.microsoft.com/office/drawing/2010/main" Requires="a14">
+        <mc:AlternateContent xmlns:mc="http://schemas.openxmlformats.org/markup-compatibility/2006" xmlns:a14="http://schemas.microsoft.com/office/drawing/2010/main">
+          <mc:Choice Requires="a14">
             <p:sp>
               <p:nvSpPr>
                 <p:cNvPr id="33" name="Oval 32"/>
@@ -11477,7 +11471,7 @@
               </p:txBody>
             </p:sp>
           </mc:Choice>
-          <mc:Fallback>
+          <mc:Fallback xmlns="">
             <p:sp>
               <p:nvSpPr>
                 <p:cNvPr id="33" name="Oval 32"/>
@@ -11516,8 +11510,8 @@
             </p:sp>
           </mc:Fallback>
         </mc:AlternateContent>
-        <mc:AlternateContent xmlns:mc="http://schemas.openxmlformats.org/markup-compatibility/2006">
-          <mc:Choice xmlns:a14="http://schemas.microsoft.com/office/drawing/2010/main" Requires="a14">
+        <mc:AlternateContent xmlns:mc="http://schemas.openxmlformats.org/markup-compatibility/2006" xmlns:a14="http://schemas.microsoft.com/office/drawing/2010/main">
+          <mc:Choice Requires="a14">
             <p:sp>
               <p:nvSpPr>
                 <p:cNvPr id="35" name="Oval 34"/>
@@ -11598,7 +11592,7 @@
               </p:txBody>
             </p:sp>
           </mc:Choice>
-          <mc:Fallback>
+          <mc:Fallback xmlns="">
             <p:sp>
               <p:nvSpPr>
                 <p:cNvPr id="35" name="Oval 34"/>
@@ -11637,8 +11631,8 @@
             </p:sp>
           </mc:Fallback>
         </mc:AlternateContent>
-        <mc:AlternateContent xmlns:mc="http://schemas.openxmlformats.org/markup-compatibility/2006">
-          <mc:Choice xmlns:a14="http://schemas.microsoft.com/office/drawing/2010/main" Requires="a14">
+        <mc:AlternateContent xmlns:mc="http://schemas.openxmlformats.org/markup-compatibility/2006" xmlns:a14="http://schemas.microsoft.com/office/drawing/2010/main">
+          <mc:Choice Requires="a14">
             <p:sp>
               <p:nvSpPr>
                 <p:cNvPr id="38" name="Oval 37"/>
@@ -11719,7 +11713,7 @@
               </p:txBody>
             </p:sp>
           </mc:Choice>
-          <mc:Fallback>
+          <mc:Fallback xmlns="">
             <p:sp>
               <p:nvSpPr>
                 <p:cNvPr id="38" name="Oval 37"/>
@@ -11788,8 +11782,8 @@
             </a:p>
           </p:txBody>
         </p:sp>
-        <mc:AlternateContent xmlns:mc="http://schemas.openxmlformats.org/markup-compatibility/2006">
-          <mc:Choice xmlns:a14="http://schemas.microsoft.com/office/drawing/2010/main" Requires="a14">
+        <mc:AlternateContent xmlns:mc="http://schemas.openxmlformats.org/markup-compatibility/2006" xmlns:a14="http://schemas.microsoft.com/office/drawing/2010/main">
+          <mc:Choice Requires="a14">
             <p:sp>
               <p:nvSpPr>
                 <p:cNvPr id="107" name="TextBox 106"/>
@@ -11870,6 +11864,7 @@
                   </a:endParaRPr>
                 </a:p>
                 <a:p>
+                  <a:pPr/>
                   <a14:m>
                     <m:oMathPara xmlns:m="http://schemas.openxmlformats.org/officeDocument/2006/math">
                       <m:oMathParaPr>
@@ -12027,7 +12022,7 @@
               </p:txBody>
             </p:sp>
           </mc:Choice>
-          <mc:Fallback>
+          <mc:Fallback xmlns="">
             <p:sp>
               <p:nvSpPr>
                 <p:cNvPr id="107" name="TextBox 106"/>
@@ -12103,8 +12098,8 @@
             </a:fontRef>
           </p:style>
         </p:cxnSp>
-        <mc:AlternateContent xmlns:mc="http://schemas.openxmlformats.org/markup-compatibility/2006">
-          <mc:Choice xmlns:a14="http://schemas.microsoft.com/office/drawing/2010/main" Requires="a14">
+        <mc:AlternateContent xmlns:mc="http://schemas.openxmlformats.org/markup-compatibility/2006" xmlns:a14="http://schemas.microsoft.com/office/drawing/2010/main">
+          <mc:Choice Requires="a14">
             <p:sp>
               <p:nvSpPr>
                 <p:cNvPr id="110" name="TextBox 109"/>
@@ -12185,6 +12180,7 @@
                   </a:endParaRPr>
                 </a:p>
                 <a:p>
+                  <a:pPr/>
                   <a14:m>
                     <m:oMathPara xmlns:m="http://schemas.openxmlformats.org/officeDocument/2006/math">
                       <m:oMathParaPr>
@@ -12342,7 +12338,7 @@
               </p:txBody>
             </p:sp>
           </mc:Choice>
-          <mc:Fallback>
+          <mc:Fallback xmlns="">
             <p:sp>
               <p:nvSpPr>
                 <p:cNvPr id="110" name="TextBox 109"/>

</xml_diff>

<commit_message>
more EM on vanilla HMM indexing corrected: N -> L i -> t 0 -> 1
</commit_message>
<xml_diff>
--- a/Help/Figures.pptx
+++ b/Help/Figures.pptx
@@ -250,7 +250,7 @@
           <a:p>
             <a:fld id="{2DC2A043-560F-4D2E-8D1E-02B02E053659}" type="datetimeFigureOut">
               <a:rPr lang="en-US" smtClean="0"/>
-              <a:t>2018-11-19</a:t>
+              <a:t>2018-12-05</a:t>
             </a:fld>
             <a:endParaRPr lang="en-US"/>
           </a:p>
@@ -420,7 +420,7 @@
           <a:p>
             <a:fld id="{2DC2A043-560F-4D2E-8D1E-02B02E053659}" type="datetimeFigureOut">
               <a:rPr lang="en-US" smtClean="0"/>
-              <a:t>2018-11-19</a:t>
+              <a:t>2018-12-05</a:t>
             </a:fld>
             <a:endParaRPr lang="en-US"/>
           </a:p>
@@ -600,7 +600,7 @@
           <a:p>
             <a:fld id="{2DC2A043-560F-4D2E-8D1E-02B02E053659}" type="datetimeFigureOut">
               <a:rPr lang="en-US" smtClean="0"/>
-              <a:t>2018-11-19</a:t>
+              <a:t>2018-12-05</a:t>
             </a:fld>
             <a:endParaRPr lang="en-US"/>
           </a:p>
@@ -770,7 +770,7 @@
           <a:p>
             <a:fld id="{2DC2A043-560F-4D2E-8D1E-02B02E053659}" type="datetimeFigureOut">
               <a:rPr lang="en-US" smtClean="0"/>
-              <a:t>2018-11-19</a:t>
+              <a:t>2018-12-05</a:t>
             </a:fld>
             <a:endParaRPr lang="en-US"/>
           </a:p>
@@ -1016,7 +1016,7 @@
           <a:p>
             <a:fld id="{2DC2A043-560F-4D2E-8D1E-02B02E053659}" type="datetimeFigureOut">
               <a:rPr lang="en-US" smtClean="0"/>
-              <a:t>2018-11-19</a:t>
+              <a:t>2018-12-05</a:t>
             </a:fld>
             <a:endParaRPr lang="en-US"/>
           </a:p>
@@ -1248,7 +1248,7 @@
           <a:p>
             <a:fld id="{2DC2A043-560F-4D2E-8D1E-02B02E053659}" type="datetimeFigureOut">
               <a:rPr lang="en-US" smtClean="0"/>
-              <a:t>2018-11-19</a:t>
+              <a:t>2018-12-05</a:t>
             </a:fld>
             <a:endParaRPr lang="en-US"/>
           </a:p>
@@ -1615,7 +1615,7 @@
           <a:p>
             <a:fld id="{2DC2A043-560F-4D2E-8D1E-02B02E053659}" type="datetimeFigureOut">
               <a:rPr lang="en-US" smtClean="0"/>
-              <a:t>2018-11-19</a:t>
+              <a:t>2018-12-05</a:t>
             </a:fld>
             <a:endParaRPr lang="en-US"/>
           </a:p>
@@ -1733,7 +1733,7 @@
           <a:p>
             <a:fld id="{2DC2A043-560F-4D2E-8D1E-02B02E053659}" type="datetimeFigureOut">
               <a:rPr lang="en-US" smtClean="0"/>
-              <a:t>2018-11-19</a:t>
+              <a:t>2018-12-05</a:t>
             </a:fld>
             <a:endParaRPr lang="en-US"/>
           </a:p>
@@ -1828,7 +1828,7 @@
           <a:p>
             <a:fld id="{2DC2A043-560F-4D2E-8D1E-02B02E053659}" type="datetimeFigureOut">
               <a:rPr lang="en-US" smtClean="0"/>
-              <a:t>2018-11-19</a:t>
+              <a:t>2018-12-05</a:t>
             </a:fld>
             <a:endParaRPr lang="en-US"/>
           </a:p>
@@ -2105,7 +2105,7 @@
           <a:p>
             <a:fld id="{2DC2A043-560F-4D2E-8D1E-02B02E053659}" type="datetimeFigureOut">
               <a:rPr lang="en-US" smtClean="0"/>
-              <a:t>2018-11-19</a:t>
+              <a:t>2018-12-05</a:t>
             </a:fld>
             <a:endParaRPr lang="en-US"/>
           </a:p>
@@ -2358,7 +2358,7 @@
           <a:p>
             <a:fld id="{2DC2A043-560F-4D2E-8D1E-02B02E053659}" type="datetimeFigureOut">
               <a:rPr lang="en-US" smtClean="0"/>
-              <a:t>2018-11-19</a:t>
+              <a:t>2018-12-05</a:t>
             </a:fld>
             <a:endParaRPr lang="en-US"/>
           </a:p>
@@ -2571,7 +2571,7 @@
           <a:p>
             <a:fld id="{2DC2A043-560F-4D2E-8D1E-02B02E053659}" type="datetimeFigureOut">
               <a:rPr lang="en-US" smtClean="0"/>
-              <a:t>2018-11-19</a:t>
+              <a:t>2018-12-05</a:t>
             </a:fld>
             <a:endParaRPr lang="en-US"/>
           </a:p>
@@ -8601,8 +8601,8 @@
             </p:sp>
           </mc:Fallback>
         </mc:AlternateContent>
-        <mc:AlternateContent xmlns:mc="http://schemas.openxmlformats.org/markup-compatibility/2006">
-          <mc:Choice xmlns:a14="http://schemas.microsoft.com/office/drawing/2010/main" Requires="a14">
+        <mc:AlternateContent xmlns:mc="http://schemas.openxmlformats.org/markup-compatibility/2006" xmlns:a14="http://schemas.microsoft.com/office/drawing/2010/main">
+          <mc:Choice Requires="a14">
             <p:sp>
               <p:nvSpPr>
                 <p:cNvPr id="7" name="Rectangle 6"/>
@@ -8684,7 +8684,7 @@
               </p:txBody>
             </p:sp>
           </mc:Choice>
-          <mc:Fallback>
+          <mc:Fallback xmlns="">
             <p:sp>
               <p:nvSpPr>
                 <p:cNvPr id="7" name="Rectangle 6"/>
@@ -10250,8 +10250,8 @@
             </a:p>
           </p:txBody>
         </p:sp>
-        <mc:AlternateContent xmlns:mc="http://schemas.openxmlformats.org/markup-compatibility/2006" xmlns:a14="http://schemas.microsoft.com/office/drawing/2010/main">
-          <mc:Choice Requires="a14">
+        <mc:AlternateContent xmlns:mc="http://schemas.openxmlformats.org/markup-compatibility/2006">
+          <mc:Choice xmlns:a14="http://schemas.microsoft.com/office/drawing/2010/main" Requires="a14">
             <p:sp>
               <p:nvSpPr>
                 <p:cNvPr id="39" name="TextBox 38"/>
@@ -10309,7 +10309,7 @@
                             <a:rPr lang="en-US" b="0" i="1" dirty="0" smtClean="0">
                               <a:latin typeface="Cambria Math" panose="02040503050406030204" pitchFamily="18" charset="0"/>
                             </a:rPr>
-                            <m:t>𝑖</m:t>
+                            <m:t>𝑡</m:t>
                           </m:r>
                         </m:sub>
                       </m:sSub>
@@ -10340,7 +10340,7 @@
                             <a:rPr lang="en-US" b="0" i="1" dirty="0" smtClean="0">
                               <a:latin typeface="Cambria Math" panose="02040503050406030204" pitchFamily="18" charset="0"/>
                             </a:rPr>
-                            <m:t>𝑖</m:t>
+                            <m:t>𝑡</m:t>
                           </m:r>
                           <m:r>
                             <a:rPr lang="en-US" b="0" i="1" dirty="0" smtClean="0">
@@ -10374,7 +10374,7 @@
               </p:txBody>
             </p:sp>
           </mc:Choice>
-          <mc:Fallback xmlns="">
+          <mc:Fallback>
             <p:sp>
               <p:nvSpPr>
                 <p:cNvPr id="39" name="TextBox 38"/>
@@ -10413,8 +10413,8 @@
             </p:sp>
           </mc:Fallback>
         </mc:AlternateContent>
-        <mc:AlternateContent xmlns:mc="http://schemas.openxmlformats.org/markup-compatibility/2006" xmlns:a14="http://schemas.microsoft.com/office/drawing/2010/main">
-          <mc:Choice Requires="a14">
+        <mc:AlternateContent xmlns:mc="http://schemas.openxmlformats.org/markup-compatibility/2006">
+          <mc:Choice xmlns:a14="http://schemas.microsoft.com/office/drawing/2010/main" Requires="a14">
             <p:sp>
               <p:nvSpPr>
                 <p:cNvPr id="41" name="TextBox 40"/>
@@ -10472,7 +10472,7 @@
                             <a:rPr lang="en-US" b="0" i="1" dirty="0" smtClean="0">
                               <a:latin typeface="Cambria Math" panose="02040503050406030204" pitchFamily="18" charset="0"/>
                             </a:rPr>
-                            <m:t>𝑖</m:t>
+                            <m:t>𝑡</m:t>
                           </m:r>
                         </m:sub>
                       </m:sSub>
@@ -10503,7 +10503,7 @@
                             <a:rPr lang="en-US" b="0" i="1" dirty="0" smtClean="0">
                               <a:latin typeface="Cambria Math" panose="02040503050406030204" pitchFamily="18" charset="0"/>
                             </a:rPr>
-                            <m:t>𝑖</m:t>
+                            <m:t>𝑡</m:t>
                           </m:r>
                         </m:sub>
                       </m:sSub>
@@ -10531,7 +10531,7 @@
               </p:txBody>
             </p:sp>
           </mc:Choice>
-          <mc:Fallback xmlns="">
+          <mc:Fallback>
             <p:sp>
               <p:nvSpPr>
                 <p:cNvPr id="41" name="TextBox 40"/>

</xml_diff>

<commit_message>
HOPHMM transition done, new figure added
</commit_message>
<xml_diff>
--- a/Help/Figures.pptx
+++ b/Help/Figures.pptx
@@ -8,11 +8,12 @@
     <p:sldId id="256" r:id="rId2"/>
     <p:sldId id="257" r:id="rId3"/>
     <p:sldId id="264" r:id="rId4"/>
-    <p:sldId id="265" r:id="rId5"/>
-    <p:sldId id="258" r:id="rId6"/>
-    <p:sldId id="259" r:id="rId7"/>
-    <p:sldId id="262" r:id="rId8"/>
-    <p:sldId id="263" r:id="rId9"/>
+    <p:sldId id="266" r:id="rId5"/>
+    <p:sldId id="265" r:id="rId6"/>
+    <p:sldId id="258" r:id="rId7"/>
+    <p:sldId id="259" r:id="rId8"/>
+    <p:sldId id="262" r:id="rId9"/>
+    <p:sldId id="263" r:id="rId10"/>
   </p:sldIdLst>
   <p:sldSz cx="12192000" cy="6858000"/>
   <p:notesSz cx="6858000" cy="9144000"/>
@@ -250,7 +251,7 @@
           <a:p>
             <a:fld id="{2DC2A043-560F-4D2E-8D1E-02B02E053659}" type="datetimeFigureOut">
               <a:rPr lang="en-US" smtClean="0"/>
-              <a:t>2018-12-05</a:t>
+              <a:t>2019-01-07</a:t>
             </a:fld>
             <a:endParaRPr lang="en-US"/>
           </a:p>
@@ -420,7 +421,7 @@
           <a:p>
             <a:fld id="{2DC2A043-560F-4D2E-8D1E-02B02E053659}" type="datetimeFigureOut">
               <a:rPr lang="en-US" smtClean="0"/>
-              <a:t>2018-12-05</a:t>
+              <a:t>2019-01-07</a:t>
             </a:fld>
             <a:endParaRPr lang="en-US"/>
           </a:p>
@@ -600,7 +601,7 @@
           <a:p>
             <a:fld id="{2DC2A043-560F-4D2E-8D1E-02B02E053659}" type="datetimeFigureOut">
               <a:rPr lang="en-US" smtClean="0"/>
-              <a:t>2018-12-05</a:t>
+              <a:t>2019-01-07</a:t>
             </a:fld>
             <a:endParaRPr lang="en-US"/>
           </a:p>
@@ -770,7 +771,7 @@
           <a:p>
             <a:fld id="{2DC2A043-560F-4D2E-8D1E-02B02E053659}" type="datetimeFigureOut">
               <a:rPr lang="en-US" smtClean="0"/>
-              <a:t>2018-12-05</a:t>
+              <a:t>2019-01-07</a:t>
             </a:fld>
             <a:endParaRPr lang="en-US"/>
           </a:p>
@@ -1016,7 +1017,7 @@
           <a:p>
             <a:fld id="{2DC2A043-560F-4D2E-8D1E-02B02E053659}" type="datetimeFigureOut">
               <a:rPr lang="en-US" smtClean="0"/>
-              <a:t>2018-12-05</a:t>
+              <a:t>2019-01-07</a:t>
             </a:fld>
             <a:endParaRPr lang="en-US"/>
           </a:p>
@@ -1248,7 +1249,7 @@
           <a:p>
             <a:fld id="{2DC2A043-560F-4D2E-8D1E-02B02E053659}" type="datetimeFigureOut">
               <a:rPr lang="en-US" smtClean="0"/>
-              <a:t>2018-12-05</a:t>
+              <a:t>2019-01-07</a:t>
             </a:fld>
             <a:endParaRPr lang="en-US"/>
           </a:p>
@@ -1615,7 +1616,7 @@
           <a:p>
             <a:fld id="{2DC2A043-560F-4D2E-8D1E-02B02E053659}" type="datetimeFigureOut">
               <a:rPr lang="en-US" smtClean="0"/>
-              <a:t>2018-12-05</a:t>
+              <a:t>2019-01-07</a:t>
             </a:fld>
             <a:endParaRPr lang="en-US"/>
           </a:p>
@@ -1733,7 +1734,7 @@
           <a:p>
             <a:fld id="{2DC2A043-560F-4D2E-8D1E-02B02E053659}" type="datetimeFigureOut">
               <a:rPr lang="en-US" smtClean="0"/>
-              <a:t>2018-12-05</a:t>
+              <a:t>2019-01-07</a:t>
             </a:fld>
             <a:endParaRPr lang="en-US"/>
           </a:p>
@@ -1828,7 +1829,7 @@
           <a:p>
             <a:fld id="{2DC2A043-560F-4D2E-8D1E-02B02E053659}" type="datetimeFigureOut">
               <a:rPr lang="en-US" smtClean="0"/>
-              <a:t>2018-12-05</a:t>
+              <a:t>2019-01-07</a:t>
             </a:fld>
             <a:endParaRPr lang="en-US"/>
           </a:p>
@@ -2105,7 +2106,7 @@
           <a:p>
             <a:fld id="{2DC2A043-560F-4D2E-8D1E-02B02E053659}" type="datetimeFigureOut">
               <a:rPr lang="en-US" smtClean="0"/>
-              <a:t>2018-12-05</a:t>
+              <a:t>2019-01-07</a:t>
             </a:fld>
             <a:endParaRPr lang="en-US"/>
           </a:p>
@@ -2358,7 +2359,7 @@
           <a:p>
             <a:fld id="{2DC2A043-560F-4D2E-8D1E-02B02E053659}" type="datetimeFigureOut">
               <a:rPr lang="en-US" smtClean="0"/>
-              <a:t>2018-12-05</a:t>
+              <a:t>2019-01-07</a:t>
             </a:fld>
             <a:endParaRPr lang="en-US"/>
           </a:p>
@@ -2571,7 +2572,7 @@
           <a:p>
             <a:fld id="{2DC2A043-560F-4D2E-8D1E-02B02E053659}" type="datetimeFigureOut">
               <a:rPr lang="en-US" smtClean="0"/>
-              <a:t>2018-12-05</a:t>
+              <a:t>2019-01-07</a:t>
             </a:fld>
             <a:endParaRPr lang="en-US"/>
           </a:p>
@@ -6906,7 +6907,7 @@
           <a:p>
             <a:r>
               <a:rPr lang="en-US" dirty="0" smtClean="0"/>
-              <a:t>Base States</a:t>
+              <a:t>Base-States</a:t>
             </a:r>
             <a:endParaRPr lang="en-US" dirty="0"/>
           </a:p>
@@ -6936,7 +6937,7 @@
           <a:p>
             <a:r>
               <a:rPr lang="en-US" dirty="0" smtClean="0"/>
-              <a:t>Sub States</a:t>
+              <a:t>Sub-States</a:t>
             </a:r>
             <a:endParaRPr lang="en-US" dirty="0"/>
           </a:p>
@@ -10250,8 +10251,8 @@
             </a:p>
           </p:txBody>
         </p:sp>
-        <mc:AlternateContent xmlns:mc="http://schemas.openxmlformats.org/markup-compatibility/2006">
-          <mc:Choice xmlns:a14="http://schemas.microsoft.com/office/drawing/2010/main" Requires="a14">
+        <mc:AlternateContent xmlns:mc="http://schemas.openxmlformats.org/markup-compatibility/2006" xmlns:a14="http://schemas.microsoft.com/office/drawing/2010/main">
+          <mc:Choice Requires="a14">
             <p:sp>
               <p:nvSpPr>
                 <p:cNvPr id="39" name="TextBox 38"/>
@@ -10346,7 +10347,13 @@
                             <a:rPr lang="en-US" b="0" i="1" dirty="0" smtClean="0">
                               <a:latin typeface="Cambria Math" panose="02040503050406030204" pitchFamily="18" charset="0"/>
                             </a:rPr>
-                            <m:t>−1</m:t>
+                            <m:t>−</m:t>
+                          </m:r>
+                          <m:r>
+                            <a:rPr lang="en-US" b="0" i="1" dirty="0" smtClean="0">
+                              <a:latin typeface="Cambria Math" panose="02040503050406030204" pitchFamily="18" charset="0"/>
+                            </a:rPr>
+                            <m:t>1</m:t>
                           </m:r>
                         </m:sub>
                       </m:sSub>
@@ -10374,7 +10381,7 @@
               </p:txBody>
             </p:sp>
           </mc:Choice>
-          <mc:Fallback>
+          <mc:Fallback xmlns="">
             <p:sp>
               <p:nvSpPr>
                 <p:cNvPr id="39" name="TextBox 38"/>
@@ -10413,8 +10420,8 @@
             </p:sp>
           </mc:Fallback>
         </mc:AlternateContent>
-        <mc:AlternateContent xmlns:mc="http://schemas.openxmlformats.org/markup-compatibility/2006">
-          <mc:Choice xmlns:a14="http://schemas.microsoft.com/office/drawing/2010/main" Requires="a14">
+        <mc:AlternateContent xmlns:mc="http://schemas.openxmlformats.org/markup-compatibility/2006" xmlns:a14="http://schemas.microsoft.com/office/drawing/2010/main">
+          <mc:Choice Requires="a14">
             <p:sp>
               <p:nvSpPr>
                 <p:cNvPr id="41" name="TextBox 40"/>
@@ -10531,7 +10538,7 @@
               </p:txBody>
             </p:sp>
           </mc:Choice>
-          <mc:Fallback>
+          <mc:Fallback xmlns="">
             <p:sp>
               <p:nvSpPr>
                 <p:cNvPr id="41" name="TextBox 40"/>
@@ -10662,6 +10669,4354 @@
 </file>
 
 <file path=ppt/slides/slide4.xml><?xml version="1.0" encoding="utf-8"?>
+<p:sld xmlns:a="http://schemas.openxmlformats.org/drawingml/2006/main" xmlns:r="http://schemas.openxmlformats.org/officeDocument/2006/relationships" xmlns:p="http://schemas.openxmlformats.org/presentationml/2006/main">
+  <p:cSld>
+    <p:spTree>
+      <p:nvGrpSpPr>
+        <p:cNvPr id="1" name=""/>
+        <p:cNvGrpSpPr/>
+        <p:nvPr/>
+      </p:nvGrpSpPr>
+      <p:grpSpPr>
+        <a:xfrm>
+          <a:off x="0" y="0"/>
+          <a:ext cx="0" cy="0"/>
+          <a:chOff x="0" y="0"/>
+          <a:chExt cx="0" cy="0"/>
+        </a:xfrm>
+      </p:grpSpPr>
+      <p:grpSp>
+        <p:nvGrpSpPr>
+          <p:cNvPr id="2" name="Group 1"/>
+          <p:cNvGrpSpPr/>
+          <p:nvPr/>
+        </p:nvGrpSpPr>
+        <p:grpSpPr>
+          <a:xfrm>
+            <a:off x="1026644" y="1672484"/>
+            <a:ext cx="9740131" cy="3202683"/>
+            <a:chOff x="2561530" y="1131309"/>
+            <a:chExt cx="9740131" cy="3202683"/>
+          </a:xfrm>
+        </p:grpSpPr>
+        <p:sp>
+          <p:nvSpPr>
+            <p:cNvPr id="30" name="Rectangle 29"/>
+            <p:cNvSpPr/>
+            <p:nvPr/>
+          </p:nvSpPr>
+          <p:spPr>
+            <a:xfrm>
+              <a:off x="6603111" y="2064797"/>
+              <a:ext cx="457599" cy="453839"/>
+            </a:xfrm>
+            <a:prstGeom prst="rect">
+              <a:avLst/>
+            </a:prstGeom>
+            <a:solidFill>
+              <a:schemeClr val="accent1">
+                <a:lumMod val="40000"/>
+                <a:lumOff val="60000"/>
+              </a:schemeClr>
+            </a:solidFill>
+          </p:spPr>
+          <p:style>
+            <a:lnRef idx="2">
+              <a:schemeClr val="accent1">
+                <a:shade val="50000"/>
+              </a:schemeClr>
+            </a:lnRef>
+            <a:fillRef idx="1">
+              <a:schemeClr val="accent1"/>
+            </a:fillRef>
+            <a:effectRef idx="0">
+              <a:schemeClr val="accent1"/>
+            </a:effectRef>
+            <a:fontRef idx="minor">
+              <a:schemeClr val="lt1"/>
+            </a:fontRef>
+          </p:style>
+          <p:txBody>
+            <a:bodyPr rtlCol="0" anchor="ctr"/>
+            <a:lstStyle/>
+            <a:p>
+              <a:pPr algn="ctr"/>
+              <a:endParaRPr lang="en-US"/>
+            </a:p>
+          </p:txBody>
+        </p:sp>
+        <p:sp>
+          <p:nvSpPr>
+            <p:cNvPr id="33" name="Rectangle 32"/>
+            <p:cNvSpPr/>
+            <p:nvPr/>
+          </p:nvSpPr>
+          <p:spPr>
+            <a:xfrm>
+              <a:off x="7060710" y="2064797"/>
+              <a:ext cx="457599" cy="453839"/>
+            </a:xfrm>
+            <a:prstGeom prst="rect">
+              <a:avLst/>
+            </a:prstGeom>
+            <a:solidFill>
+              <a:schemeClr val="accent1">
+                <a:lumMod val="40000"/>
+                <a:lumOff val="60000"/>
+              </a:schemeClr>
+            </a:solidFill>
+          </p:spPr>
+          <p:style>
+            <a:lnRef idx="2">
+              <a:schemeClr val="accent1">
+                <a:shade val="50000"/>
+              </a:schemeClr>
+            </a:lnRef>
+            <a:fillRef idx="1">
+              <a:schemeClr val="accent1"/>
+            </a:fillRef>
+            <a:effectRef idx="0">
+              <a:schemeClr val="accent1"/>
+            </a:effectRef>
+            <a:fontRef idx="minor">
+              <a:schemeClr val="lt1"/>
+            </a:fontRef>
+          </p:style>
+          <p:txBody>
+            <a:bodyPr rtlCol="0" anchor="ctr"/>
+            <a:lstStyle/>
+            <a:p>
+              <a:pPr algn="ctr"/>
+              <a:endParaRPr lang="en-US"/>
+            </a:p>
+          </p:txBody>
+        </p:sp>
+        <p:sp>
+          <p:nvSpPr>
+            <p:cNvPr id="35" name="Rectangle 34"/>
+            <p:cNvSpPr/>
+            <p:nvPr/>
+          </p:nvSpPr>
+          <p:spPr>
+            <a:xfrm>
+              <a:off x="6603111" y="2518636"/>
+              <a:ext cx="457599" cy="453839"/>
+            </a:xfrm>
+            <a:prstGeom prst="rect">
+              <a:avLst/>
+            </a:prstGeom>
+            <a:solidFill>
+              <a:schemeClr val="accent6"/>
+            </a:solidFill>
+          </p:spPr>
+          <p:style>
+            <a:lnRef idx="2">
+              <a:schemeClr val="accent1">
+                <a:shade val="50000"/>
+              </a:schemeClr>
+            </a:lnRef>
+            <a:fillRef idx="1">
+              <a:schemeClr val="accent1"/>
+            </a:fillRef>
+            <a:effectRef idx="0">
+              <a:schemeClr val="accent1"/>
+            </a:effectRef>
+            <a:fontRef idx="minor">
+              <a:schemeClr val="lt1"/>
+            </a:fontRef>
+          </p:style>
+          <p:txBody>
+            <a:bodyPr rtlCol="0" anchor="ctr"/>
+            <a:lstStyle/>
+            <a:p>
+              <a:pPr algn="ctr"/>
+              <a:endParaRPr lang="en-US" sz="900" dirty="0"/>
+            </a:p>
+          </p:txBody>
+        </p:sp>
+        <p:sp>
+          <p:nvSpPr>
+            <p:cNvPr id="38" name="Rectangle 37"/>
+            <p:cNvSpPr/>
+            <p:nvPr/>
+          </p:nvSpPr>
+          <p:spPr>
+            <a:xfrm>
+              <a:off x="7060710" y="2518636"/>
+              <a:ext cx="457599" cy="453839"/>
+            </a:xfrm>
+            <a:prstGeom prst="rect">
+              <a:avLst/>
+            </a:prstGeom>
+            <a:solidFill>
+              <a:schemeClr val="accent6"/>
+            </a:solidFill>
+          </p:spPr>
+          <p:style>
+            <a:lnRef idx="2">
+              <a:schemeClr val="accent1">
+                <a:shade val="50000"/>
+              </a:schemeClr>
+            </a:lnRef>
+            <a:fillRef idx="1">
+              <a:schemeClr val="accent1"/>
+            </a:fillRef>
+            <a:effectRef idx="0">
+              <a:schemeClr val="accent1"/>
+            </a:effectRef>
+            <a:fontRef idx="minor">
+              <a:schemeClr val="lt1"/>
+            </a:fontRef>
+          </p:style>
+          <p:txBody>
+            <a:bodyPr rtlCol="0" anchor="ctr"/>
+            <a:lstStyle/>
+            <a:p>
+              <a:pPr algn="ctr"/>
+              <a:endParaRPr lang="en-US"/>
+            </a:p>
+          </p:txBody>
+        </p:sp>
+        <p:sp>
+          <p:nvSpPr>
+            <p:cNvPr id="40" name="Rectangle 39"/>
+            <p:cNvSpPr/>
+            <p:nvPr/>
+          </p:nvSpPr>
+          <p:spPr>
+            <a:xfrm>
+              <a:off x="7518309" y="2064797"/>
+              <a:ext cx="457599" cy="453839"/>
+            </a:xfrm>
+            <a:prstGeom prst="rect">
+              <a:avLst/>
+            </a:prstGeom>
+            <a:solidFill>
+              <a:schemeClr val="accent1">
+                <a:lumMod val="40000"/>
+                <a:lumOff val="60000"/>
+              </a:schemeClr>
+            </a:solidFill>
+          </p:spPr>
+          <p:style>
+            <a:lnRef idx="2">
+              <a:schemeClr val="accent1">
+                <a:shade val="50000"/>
+              </a:schemeClr>
+            </a:lnRef>
+            <a:fillRef idx="1">
+              <a:schemeClr val="accent1"/>
+            </a:fillRef>
+            <a:effectRef idx="0">
+              <a:schemeClr val="accent1"/>
+            </a:effectRef>
+            <a:fontRef idx="minor">
+              <a:schemeClr val="lt1"/>
+            </a:fontRef>
+          </p:style>
+          <p:txBody>
+            <a:bodyPr rtlCol="0" anchor="ctr"/>
+            <a:lstStyle/>
+            <a:p>
+              <a:pPr algn="ctr"/>
+              <a:endParaRPr lang="en-US"/>
+            </a:p>
+          </p:txBody>
+        </p:sp>
+        <p:sp>
+          <p:nvSpPr>
+            <p:cNvPr id="43" name="Rectangle 42"/>
+            <p:cNvSpPr/>
+            <p:nvPr/>
+          </p:nvSpPr>
+          <p:spPr>
+            <a:xfrm>
+              <a:off x="7975908" y="2064797"/>
+              <a:ext cx="457599" cy="453839"/>
+            </a:xfrm>
+            <a:prstGeom prst="rect">
+              <a:avLst/>
+            </a:prstGeom>
+            <a:solidFill>
+              <a:schemeClr val="accent1">
+                <a:lumMod val="40000"/>
+                <a:lumOff val="60000"/>
+              </a:schemeClr>
+            </a:solidFill>
+          </p:spPr>
+          <p:style>
+            <a:lnRef idx="2">
+              <a:schemeClr val="accent1">
+                <a:shade val="50000"/>
+              </a:schemeClr>
+            </a:lnRef>
+            <a:fillRef idx="1">
+              <a:schemeClr val="accent1"/>
+            </a:fillRef>
+            <a:effectRef idx="0">
+              <a:schemeClr val="accent1"/>
+            </a:effectRef>
+            <a:fontRef idx="minor">
+              <a:schemeClr val="lt1"/>
+            </a:fontRef>
+          </p:style>
+          <p:txBody>
+            <a:bodyPr rtlCol="0" anchor="ctr"/>
+            <a:lstStyle/>
+            <a:p>
+              <a:pPr algn="ctr"/>
+              <a:endParaRPr lang="en-US"/>
+            </a:p>
+          </p:txBody>
+        </p:sp>
+        <p:sp>
+          <p:nvSpPr>
+            <p:cNvPr id="44" name="Rectangle 43"/>
+            <p:cNvSpPr/>
+            <p:nvPr/>
+          </p:nvSpPr>
+          <p:spPr>
+            <a:xfrm>
+              <a:off x="7518309" y="2518636"/>
+              <a:ext cx="457599" cy="453839"/>
+            </a:xfrm>
+            <a:prstGeom prst="rect">
+              <a:avLst/>
+            </a:prstGeom>
+            <a:solidFill>
+              <a:schemeClr val="accent6"/>
+            </a:solidFill>
+          </p:spPr>
+          <p:style>
+            <a:lnRef idx="2">
+              <a:schemeClr val="accent1">
+                <a:shade val="50000"/>
+              </a:schemeClr>
+            </a:lnRef>
+            <a:fillRef idx="1">
+              <a:schemeClr val="accent1"/>
+            </a:fillRef>
+            <a:effectRef idx="0">
+              <a:schemeClr val="accent1"/>
+            </a:effectRef>
+            <a:fontRef idx="minor">
+              <a:schemeClr val="lt1"/>
+            </a:fontRef>
+          </p:style>
+          <p:txBody>
+            <a:bodyPr rtlCol="0" anchor="ctr"/>
+            <a:lstStyle/>
+            <a:p>
+              <a:pPr algn="ctr"/>
+              <a:endParaRPr lang="en-US"/>
+            </a:p>
+          </p:txBody>
+        </p:sp>
+        <p:sp>
+          <p:nvSpPr>
+            <p:cNvPr id="45" name="Rectangle 44"/>
+            <p:cNvSpPr/>
+            <p:nvPr/>
+          </p:nvSpPr>
+          <p:spPr>
+            <a:xfrm>
+              <a:off x="7975908" y="2518636"/>
+              <a:ext cx="457599" cy="453839"/>
+            </a:xfrm>
+            <a:prstGeom prst="rect">
+              <a:avLst/>
+            </a:prstGeom>
+            <a:solidFill>
+              <a:schemeClr val="accent6"/>
+            </a:solidFill>
+          </p:spPr>
+          <p:style>
+            <a:lnRef idx="2">
+              <a:schemeClr val="accent1">
+                <a:shade val="50000"/>
+              </a:schemeClr>
+            </a:lnRef>
+            <a:fillRef idx="1">
+              <a:schemeClr val="accent1"/>
+            </a:fillRef>
+            <a:effectRef idx="0">
+              <a:schemeClr val="accent1"/>
+            </a:effectRef>
+            <a:fontRef idx="minor">
+              <a:schemeClr val="lt1"/>
+            </a:fontRef>
+          </p:style>
+          <p:txBody>
+            <a:bodyPr rtlCol="0" anchor="ctr"/>
+            <a:lstStyle/>
+            <a:p>
+              <a:pPr algn="ctr"/>
+              <a:endParaRPr lang="en-US"/>
+            </a:p>
+          </p:txBody>
+        </p:sp>
+        <p:sp>
+          <p:nvSpPr>
+            <p:cNvPr id="46" name="Rectangle 45"/>
+            <p:cNvSpPr/>
+            <p:nvPr/>
+          </p:nvSpPr>
+          <p:spPr>
+            <a:xfrm>
+              <a:off x="6603111" y="2972475"/>
+              <a:ext cx="457599" cy="453839"/>
+            </a:xfrm>
+            <a:prstGeom prst="rect">
+              <a:avLst/>
+            </a:prstGeom>
+            <a:solidFill>
+              <a:schemeClr val="accent1">
+                <a:lumMod val="40000"/>
+                <a:lumOff val="60000"/>
+              </a:schemeClr>
+            </a:solidFill>
+          </p:spPr>
+          <p:style>
+            <a:lnRef idx="2">
+              <a:schemeClr val="accent1">
+                <a:shade val="50000"/>
+              </a:schemeClr>
+            </a:lnRef>
+            <a:fillRef idx="1">
+              <a:schemeClr val="accent1"/>
+            </a:fillRef>
+            <a:effectRef idx="0">
+              <a:schemeClr val="accent1"/>
+            </a:effectRef>
+            <a:fontRef idx="minor">
+              <a:schemeClr val="lt1"/>
+            </a:fontRef>
+          </p:style>
+          <p:txBody>
+            <a:bodyPr rtlCol="0" anchor="ctr"/>
+            <a:lstStyle/>
+            <a:p>
+              <a:pPr algn="ctr"/>
+              <a:endParaRPr lang="en-US"/>
+            </a:p>
+          </p:txBody>
+        </p:sp>
+        <p:sp>
+          <p:nvSpPr>
+            <p:cNvPr id="49" name="Rectangle 48"/>
+            <p:cNvSpPr/>
+            <p:nvPr/>
+          </p:nvSpPr>
+          <p:spPr>
+            <a:xfrm>
+              <a:off x="7060710" y="2972475"/>
+              <a:ext cx="457599" cy="453839"/>
+            </a:xfrm>
+            <a:prstGeom prst="rect">
+              <a:avLst/>
+            </a:prstGeom>
+            <a:solidFill>
+              <a:schemeClr val="accent1">
+                <a:lumMod val="40000"/>
+                <a:lumOff val="60000"/>
+              </a:schemeClr>
+            </a:solidFill>
+          </p:spPr>
+          <p:style>
+            <a:lnRef idx="2">
+              <a:schemeClr val="accent1">
+                <a:shade val="50000"/>
+              </a:schemeClr>
+            </a:lnRef>
+            <a:fillRef idx="1">
+              <a:schemeClr val="accent1"/>
+            </a:fillRef>
+            <a:effectRef idx="0">
+              <a:schemeClr val="accent1"/>
+            </a:effectRef>
+            <a:fontRef idx="minor">
+              <a:schemeClr val="lt1"/>
+            </a:fontRef>
+          </p:style>
+          <p:txBody>
+            <a:bodyPr rtlCol="0" anchor="ctr"/>
+            <a:lstStyle/>
+            <a:p>
+              <a:pPr algn="ctr"/>
+              <a:endParaRPr lang="en-US"/>
+            </a:p>
+          </p:txBody>
+        </p:sp>
+        <p:sp>
+          <p:nvSpPr>
+            <p:cNvPr id="50" name="Rectangle 49"/>
+            <p:cNvSpPr/>
+            <p:nvPr/>
+          </p:nvSpPr>
+          <p:spPr>
+            <a:xfrm>
+              <a:off x="6603111" y="3426314"/>
+              <a:ext cx="457599" cy="453839"/>
+            </a:xfrm>
+            <a:prstGeom prst="rect">
+              <a:avLst/>
+            </a:prstGeom>
+            <a:solidFill>
+              <a:schemeClr val="accent1">
+                <a:lumMod val="40000"/>
+                <a:lumOff val="60000"/>
+              </a:schemeClr>
+            </a:solidFill>
+          </p:spPr>
+          <p:style>
+            <a:lnRef idx="2">
+              <a:schemeClr val="accent1">
+                <a:shade val="50000"/>
+              </a:schemeClr>
+            </a:lnRef>
+            <a:fillRef idx="1">
+              <a:schemeClr val="accent1"/>
+            </a:fillRef>
+            <a:effectRef idx="0">
+              <a:schemeClr val="accent1"/>
+            </a:effectRef>
+            <a:fontRef idx="minor">
+              <a:schemeClr val="lt1"/>
+            </a:fontRef>
+          </p:style>
+          <p:txBody>
+            <a:bodyPr rtlCol="0" anchor="ctr"/>
+            <a:lstStyle/>
+            <a:p>
+              <a:pPr algn="ctr"/>
+              <a:endParaRPr lang="en-US"/>
+            </a:p>
+          </p:txBody>
+        </p:sp>
+        <p:sp>
+          <p:nvSpPr>
+            <p:cNvPr id="52" name="Rectangle 51"/>
+            <p:cNvSpPr/>
+            <p:nvPr/>
+          </p:nvSpPr>
+          <p:spPr>
+            <a:xfrm>
+              <a:off x="7060710" y="3426314"/>
+              <a:ext cx="457599" cy="453839"/>
+            </a:xfrm>
+            <a:prstGeom prst="rect">
+              <a:avLst/>
+            </a:prstGeom>
+            <a:solidFill>
+              <a:schemeClr val="accent1">
+                <a:lumMod val="40000"/>
+                <a:lumOff val="60000"/>
+              </a:schemeClr>
+            </a:solidFill>
+          </p:spPr>
+          <p:style>
+            <a:lnRef idx="2">
+              <a:schemeClr val="accent1">
+                <a:shade val="50000"/>
+              </a:schemeClr>
+            </a:lnRef>
+            <a:fillRef idx="1">
+              <a:schemeClr val="accent1"/>
+            </a:fillRef>
+            <a:effectRef idx="0">
+              <a:schemeClr val="accent1"/>
+            </a:effectRef>
+            <a:fontRef idx="minor">
+              <a:schemeClr val="lt1"/>
+            </a:fontRef>
+          </p:style>
+          <p:txBody>
+            <a:bodyPr rtlCol="0" anchor="ctr"/>
+            <a:lstStyle/>
+            <a:p>
+              <a:pPr algn="ctr"/>
+              <a:endParaRPr lang="en-US"/>
+            </a:p>
+          </p:txBody>
+        </p:sp>
+        <p:sp>
+          <p:nvSpPr>
+            <p:cNvPr id="53" name="Rectangle 52"/>
+            <p:cNvSpPr/>
+            <p:nvPr/>
+          </p:nvSpPr>
+          <p:spPr>
+            <a:xfrm>
+              <a:off x="7518309" y="2972475"/>
+              <a:ext cx="457599" cy="453839"/>
+            </a:xfrm>
+            <a:prstGeom prst="rect">
+              <a:avLst/>
+            </a:prstGeom>
+            <a:solidFill>
+              <a:schemeClr val="accent1">
+                <a:lumMod val="40000"/>
+                <a:lumOff val="60000"/>
+              </a:schemeClr>
+            </a:solidFill>
+          </p:spPr>
+          <p:style>
+            <a:lnRef idx="2">
+              <a:schemeClr val="accent1">
+                <a:shade val="50000"/>
+              </a:schemeClr>
+            </a:lnRef>
+            <a:fillRef idx="1">
+              <a:schemeClr val="accent1"/>
+            </a:fillRef>
+            <a:effectRef idx="0">
+              <a:schemeClr val="accent1"/>
+            </a:effectRef>
+            <a:fontRef idx="minor">
+              <a:schemeClr val="lt1"/>
+            </a:fontRef>
+          </p:style>
+          <p:txBody>
+            <a:bodyPr rtlCol="0" anchor="ctr"/>
+            <a:lstStyle/>
+            <a:p>
+              <a:pPr algn="ctr"/>
+              <a:endParaRPr lang="en-US"/>
+            </a:p>
+          </p:txBody>
+        </p:sp>
+        <p:sp>
+          <p:nvSpPr>
+            <p:cNvPr id="55" name="Rectangle 54"/>
+            <p:cNvSpPr/>
+            <p:nvPr/>
+          </p:nvSpPr>
+          <p:spPr>
+            <a:xfrm>
+              <a:off x="7975908" y="2972475"/>
+              <a:ext cx="457599" cy="453839"/>
+            </a:xfrm>
+            <a:prstGeom prst="rect">
+              <a:avLst/>
+            </a:prstGeom>
+            <a:solidFill>
+              <a:schemeClr val="accent1">
+                <a:lumMod val="40000"/>
+                <a:lumOff val="60000"/>
+              </a:schemeClr>
+            </a:solidFill>
+          </p:spPr>
+          <p:style>
+            <a:lnRef idx="2">
+              <a:schemeClr val="accent1">
+                <a:shade val="50000"/>
+              </a:schemeClr>
+            </a:lnRef>
+            <a:fillRef idx="1">
+              <a:schemeClr val="accent1"/>
+            </a:fillRef>
+            <a:effectRef idx="0">
+              <a:schemeClr val="accent1"/>
+            </a:effectRef>
+            <a:fontRef idx="minor">
+              <a:schemeClr val="lt1"/>
+            </a:fontRef>
+          </p:style>
+          <p:txBody>
+            <a:bodyPr rtlCol="0" anchor="ctr"/>
+            <a:lstStyle/>
+            <a:p>
+              <a:pPr algn="ctr"/>
+              <a:endParaRPr lang="en-US"/>
+            </a:p>
+          </p:txBody>
+        </p:sp>
+        <p:sp>
+          <p:nvSpPr>
+            <p:cNvPr id="56" name="Rectangle 55"/>
+            <p:cNvSpPr/>
+            <p:nvPr/>
+          </p:nvSpPr>
+          <p:spPr>
+            <a:xfrm>
+              <a:off x="7518309" y="3426314"/>
+              <a:ext cx="457599" cy="453839"/>
+            </a:xfrm>
+            <a:prstGeom prst="rect">
+              <a:avLst/>
+            </a:prstGeom>
+            <a:solidFill>
+              <a:schemeClr val="accent1">
+                <a:lumMod val="40000"/>
+                <a:lumOff val="60000"/>
+              </a:schemeClr>
+            </a:solidFill>
+          </p:spPr>
+          <p:style>
+            <a:lnRef idx="2">
+              <a:schemeClr val="accent1">
+                <a:shade val="50000"/>
+              </a:schemeClr>
+            </a:lnRef>
+            <a:fillRef idx="1">
+              <a:schemeClr val="accent1"/>
+            </a:fillRef>
+            <a:effectRef idx="0">
+              <a:schemeClr val="accent1"/>
+            </a:effectRef>
+            <a:fontRef idx="minor">
+              <a:schemeClr val="lt1"/>
+            </a:fontRef>
+          </p:style>
+          <p:txBody>
+            <a:bodyPr rtlCol="0" anchor="ctr"/>
+            <a:lstStyle/>
+            <a:p>
+              <a:pPr algn="ctr"/>
+              <a:endParaRPr lang="en-US"/>
+            </a:p>
+          </p:txBody>
+        </p:sp>
+        <p:sp>
+          <p:nvSpPr>
+            <p:cNvPr id="57" name="Rectangle 56"/>
+            <p:cNvSpPr/>
+            <p:nvPr/>
+          </p:nvSpPr>
+          <p:spPr>
+            <a:xfrm>
+              <a:off x="7975908" y="3426314"/>
+              <a:ext cx="457599" cy="453839"/>
+            </a:xfrm>
+            <a:prstGeom prst="rect">
+              <a:avLst/>
+            </a:prstGeom>
+            <a:solidFill>
+              <a:schemeClr val="accent1">
+                <a:lumMod val="40000"/>
+                <a:lumOff val="60000"/>
+              </a:schemeClr>
+            </a:solidFill>
+          </p:spPr>
+          <p:style>
+            <a:lnRef idx="2">
+              <a:schemeClr val="accent1">
+                <a:shade val="50000"/>
+              </a:schemeClr>
+            </a:lnRef>
+            <a:fillRef idx="1">
+              <a:schemeClr val="accent1"/>
+            </a:fillRef>
+            <a:effectRef idx="0">
+              <a:schemeClr val="accent1"/>
+            </a:effectRef>
+            <a:fontRef idx="minor">
+              <a:schemeClr val="lt1"/>
+            </a:fontRef>
+          </p:style>
+          <p:txBody>
+            <a:bodyPr rtlCol="0" anchor="ctr"/>
+            <a:lstStyle/>
+            <a:p>
+              <a:pPr algn="ctr"/>
+              <a:endParaRPr lang="en-US"/>
+            </a:p>
+          </p:txBody>
+        </p:sp>
+        <p:sp>
+          <p:nvSpPr>
+            <p:cNvPr id="58" name="Rectangle 57"/>
+            <p:cNvSpPr/>
+            <p:nvPr/>
+          </p:nvSpPr>
+          <p:spPr>
+            <a:xfrm>
+              <a:off x="8433507" y="2064797"/>
+              <a:ext cx="457599" cy="453839"/>
+            </a:xfrm>
+            <a:prstGeom prst="rect">
+              <a:avLst/>
+            </a:prstGeom>
+            <a:solidFill>
+              <a:schemeClr val="accent1">
+                <a:lumMod val="40000"/>
+                <a:lumOff val="60000"/>
+              </a:schemeClr>
+            </a:solidFill>
+          </p:spPr>
+          <p:style>
+            <a:lnRef idx="2">
+              <a:schemeClr val="accent1">
+                <a:shade val="50000"/>
+              </a:schemeClr>
+            </a:lnRef>
+            <a:fillRef idx="1">
+              <a:schemeClr val="accent1"/>
+            </a:fillRef>
+            <a:effectRef idx="0">
+              <a:schemeClr val="accent1"/>
+            </a:effectRef>
+            <a:fontRef idx="minor">
+              <a:schemeClr val="lt1"/>
+            </a:fontRef>
+          </p:style>
+          <p:txBody>
+            <a:bodyPr rtlCol="0" anchor="ctr"/>
+            <a:lstStyle/>
+            <a:p>
+              <a:pPr algn="ctr"/>
+              <a:endParaRPr lang="en-US"/>
+            </a:p>
+          </p:txBody>
+        </p:sp>
+        <p:sp>
+          <p:nvSpPr>
+            <p:cNvPr id="59" name="Rectangle 58"/>
+            <p:cNvSpPr/>
+            <p:nvPr/>
+          </p:nvSpPr>
+          <p:spPr>
+            <a:xfrm>
+              <a:off x="8891106" y="2064797"/>
+              <a:ext cx="457599" cy="453839"/>
+            </a:xfrm>
+            <a:prstGeom prst="rect">
+              <a:avLst/>
+            </a:prstGeom>
+            <a:solidFill>
+              <a:schemeClr val="accent1">
+                <a:lumMod val="40000"/>
+                <a:lumOff val="60000"/>
+              </a:schemeClr>
+            </a:solidFill>
+          </p:spPr>
+          <p:style>
+            <a:lnRef idx="2">
+              <a:schemeClr val="accent1">
+                <a:shade val="50000"/>
+              </a:schemeClr>
+            </a:lnRef>
+            <a:fillRef idx="1">
+              <a:schemeClr val="accent1"/>
+            </a:fillRef>
+            <a:effectRef idx="0">
+              <a:schemeClr val="accent1"/>
+            </a:effectRef>
+            <a:fontRef idx="minor">
+              <a:schemeClr val="lt1"/>
+            </a:fontRef>
+          </p:style>
+          <p:txBody>
+            <a:bodyPr rtlCol="0" anchor="ctr"/>
+            <a:lstStyle/>
+            <a:p>
+              <a:pPr algn="ctr"/>
+              <a:endParaRPr lang="en-US"/>
+            </a:p>
+          </p:txBody>
+        </p:sp>
+        <p:sp>
+          <p:nvSpPr>
+            <p:cNvPr id="63" name="Rectangle 62"/>
+            <p:cNvSpPr/>
+            <p:nvPr/>
+          </p:nvSpPr>
+          <p:spPr>
+            <a:xfrm>
+              <a:off x="8891106" y="2518636"/>
+              <a:ext cx="457599" cy="453839"/>
+            </a:xfrm>
+            <a:prstGeom prst="rect">
+              <a:avLst/>
+            </a:prstGeom>
+            <a:solidFill>
+              <a:schemeClr val="accent6"/>
+            </a:solidFill>
+          </p:spPr>
+          <p:style>
+            <a:lnRef idx="2">
+              <a:schemeClr val="accent1">
+                <a:shade val="50000"/>
+              </a:schemeClr>
+            </a:lnRef>
+            <a:fillRef idx="1">
+              <a:schemeClr val="accent1"/>
+            </a:fillRef>
+            <a:effectRef idx="0">
+              <a:schemeClr val="accent1"/>
+            </a:effectRef>
+            <a:fontRef idx="minor">
+              <a:schemeClr val="lt1"/>
+            </a:fontRef>
+          </p:style>
+          <p:txBody>
+            <a:bodyPr rtlCol="0" anchor="ctr"/>
+            <a:lstStyle/>
+            <a:p>
+              <a:pPr algn="ctr"/>
+              <a:endParaRPr lang="en-US"/>
+            </a:p>
+          </p:txBody>
+        </p:sp>
+        <p:sp>
+          <p:nvSpPr>
+            <p:cNvPr id="64" name="Rectangle 63"/>
+            <p:cNvSpPr/>
+            <p:nvPr/>
+          </p:nvSpPr>
+          <p:spPr>
+            <a:xfrm>
+              <a:off x="8433507" y="2972475"/>
+              <a:ext cx="457599" cy="453839"/>
+            </a:xfrm>
+            <a:prstGeom prst="rect">
+              <a:avLst/>
+            </a:prstGeom>
+            <a:solidFill>
+              <a:schemeClr val="accent1">
+                <a:lumMod val="40000"/>
+                <a:lumOff val="60000"/>
+              </a:schemeClr>
+            </a:solidFill>
+          </p:spPr>
+          <p:style>
+            <a:lnRef idx="2">
+              <a:schemeClr val="accent1">
+                <a:shade val="50000"/>
+              </a:schemeClr>
+            </a:lnRef>
+            <a:fillRef idx="1">
+              <a:schemeClr val="accent1"/>
+            </a:fillRef>
+            <a:effectRef idx="0">
+              <a:schemeClr val="accent1"/>
+            </a:effectRef>
+            <a:fontRef idx="minor">
+              <a:schemeClr val="lt1"/>
+            </a:fontRef>
+          </p:style>
+          <p:txBody>
+            <a:bodyPr rtlCol="0" anchor="ctr"/>
+            <a:lstStyle/>
+            <a:p>
+              <a:pPr algn="ctr"/>
+              <a:endParaRPr lang="en-US"/>
+            </a:p>
+          </p:txBody>
+        </p:sp>
+        <p:sp>
+          <p:nvSpPr>
+            <p:cNvPr id="65" name="Rectangle 64"/>
+            <p:cNvSpPr/>
+            <p:nvPr/>
+          </p:nvSpPr>
+          <p:spPr>
+            <a:xfrm>
+              <a:off x="8891106" y="2972475"/>
+              <a:ext cx="457599" cy="453839"/>
+            </a:xfrm>
+            <a:prstGeom prst="rect">
+              <a:avLst/>
+            </a:prstGeom>
+            <a:solidFill>
+              <a:schemeClr val="accent1">
+                <a:lumMod val="40000"/>
+                <a:lumOff val="60000"/>
+              </a:schemeClr>
+            </a:solidFill>
+          </p:spPr>
+          <p:style>
+            <a:lnRef idx="2">
+              <a:schemeClr val="accent1">
+                <a:shade val="50000"/>
+              </a:schemeClr>
+            </a:lnRef>
+            <a:fillRef idx="1">
+              <a:schemeClr val="accent1"/>
+            </a:fillRef>
+            <a:effectRef idx="0">
+              <a:schemeClr val="accent1"/>
+            </a:effectRef>
+            <a:fontRef idx="minor">
+              <a:schemeClr val="lt1"/>
+            </a:fontRef>
+          </p:style>
+          <p:txBody>
+            <a:bodyPr rtlCol="0" anchor="ctr"/>
+            <a:lstStyle/>
+            <a:p>
+              <a:pPr algn="ctr"/>
+              <a:endParaRPr lang="en-US"/>
+            </a:p>
+          </p:txBody>
+        </p:sp>
+        <p:sp>
+          <p:nvSpPr>
+            <p:cNvPr id="66" name="Rectangle 65"/>
+            <p:cNvSpPr/>
+            <p:nvPr/>
+          </p:nvSpPr>
+          <p:spPr>
+            <a:xfrm>
+              <a:off x="8433507" y="3426314"/>
+              <a:ext cx="457599" cy="453839"/>
+            </a:xfrm>
+            <a:prstGeom prst="rect">
+              <a:avLst/>
+            </a:prstGeom>
+            <a:solidFill>
+              <a:schemeClr val="accent1">
+                <a:lumMod val="40000"/>
+                <a:lumOff val="60000"/>
+              </a:schemeClr>
+            </a:solidFill>
+          </p:spPr>
+          <p:style>
+            <a:lnRef idx="2">
+              <a:schemeClr val="accent1">
+                <a:shade val="50000"/>
+              </a:schemeClr>
+            </a:lnRef>
+            <a:fillRef idx="1">
+              <a:schemeClr val="accent1"/>
+            </a:fillRef>
+            <a:effectRef idx="0">
+              <a:schemeClr val="accent1"/>
+            </a:effectRef>
+            <a:fontRef idx="minor">
+              <a:schemeClr val="lt1"/>
+            </a:fontRef>
+          </p:style>
+          <p:txBody>
+            <a:bodyPr rtlCol="0" anchor="ctr"/>
+            <a:lstStyle/>
+            <a:p>
+              <a:pPr algn="ctr"/>
+              <a:endParaRPr lang="en-US"/>
+            </a:p>
+          </p:txBody>
+        </p:sp>
+        <p:sp>
+          <p:nvSpPr>
+            <p:cNvPr id="67" name="Rectangle 66"/>
+            <p:cNvSpPr/>
+            <p:nvPr/>
+          </p:nvSpPr>
+          <p:spPr>
+            <a:xfrm>
+              <a:off x="8891106" y="3426314"/>
+              <a:ext cx="457599" cy="453839"/>
+            </a:xfrm>
+            <a:prstGeom prst="rect">
+              <a:avLst/>
+            </a:prstGeom>
+            <a:solidFill>
+              <a:schemeClr val="accent1">
+                <a:lumMod val="40000"/>
+                <a:lumOff val="60000"/>
+              </a:schemeClr>
+            </a:solidFill>
+          </p:spPr>
+          <p:style>
+            <a:lnRef idx="2">
+              <a:schemeClr val="accent1">
+                <a:shade val="50000"/>
+              </a:schemeClr>
+            </a:lnRef>
+            <a:fillRef idx="1">
+              <a:schemeClr val="accent1"/>
+            </a:fillRef>
+            <a:effectRef idx="0">
+              <a:schemeClr val="accent1"/>
+            </a:effectRef>
+            <a:fontRef idx="minor">
+              <a:schemeClr val="lt1"/>
+            </a:fontRef>
+          </p:style>
+          <p:txBody>
+            <a:bodyPr rtlCol="0" anchor="ctr"/>
+            <a:lstStyle/>
+            <a:p>
+              <a:pPr algn="ctr"/>
+              <a:endParaRPr lang="en-US"/>
+            </a:p>
+          </p:txBody>
+        </p:sp>
+        <p:sp>
+          <p:nvSpPr>
+            <p:cNvPr id="71" name="Rectangle 70"/>
+            <p:cNvSpPr/>
+            <p:nvPr/>
+          </p:nvSpPr>
+          <p:spPr>
+            <a:xfrm>
+              <a:off x="5688555" y="2064797"/>
+              <a:ext cx="457599" cy="453839"/>
+            </a:xfrm>
+            <a:prstGeom prst="rect">
+              <a:avLst/>
+            </a:prstGeom>
+            <a:solidFill>
+              <a:schemeClr val="accent1">
+                <a:lumMod val="40000"/>
+                <a:lumOff val="60000"/>
+              </a:schemeClr>
+            </a:solidFill>
+          </p:spPr>
+          <p:style>
+            <a:lnRef idx="2">
+              <a:schemeClr val="accent1">
+                <a:shade val="50000"/>
+              </a:schemeClr>
+            </a:lnRef>
+            <a:fillRef idx="1">
+              <a:schemeClr val="accent1"/>
+            </a:fillRef>
+            <a:effectRef idx="0">
+              <a:schemeClr val="accent1"/>
+            </a:effectRef>
+            <a:fontRef idx="minor">
+              <a:schemeClr val="lt1"/>
+            </a:fontRef>
+          </p:style>
+          <p:txBody>
+            <a:bodyPr rtlCol="0" anchor="ctr"/>
+            <a:lstStyle/>
+            <a:p>
+              <a:pPr algn="ctr"/>
+              <a:endParaRPr lang="en-US"/>
+            </a:p>
+          </p:txBody>
+        </p:sp>
+        <p:sp>
+          <p:nvSpPr>
+            <p:cNvPr id="72" name="Rectangle 71"/>
+            <p:cNvSpPr/>
+            <p:nvPr/>
+          </p:nvSpPr>
+          <p:spPr>
+            <a:xfrm>
+              <a:off x="6146154" y="2064797"/>
+              <a:ext cx="457599" cy="453839"/>
+            </a:xfrm>
+            <a:prstGeom prst="rect">
+              <a:avLst/>
+            </a:prstGeom>
+            <a:solidFill>
+              <a:schemeClr val="accent1">
+                <a:lumMod val="40000"/>
+                <a:lumOff val="60000"/>
+              </a:schemeClr>
+            </a:solidFill>
+          </p:spPr>
+          <p:style>
+            <a:lnRef idx="2">
+              <a:schemeClr val="accent1">
+                <a:shade val="50000"/>
+              </a:schemeClr>
+            </a:lnRef>
+            <a:fillRef idx="1">
+              <a:schemeClr val="accent1"/>
+            </a:fillRef>
+            <a:effectRef idx="0">
+              <a:schemeClr val="accent1"/>
+            </a:effectRef>
+            <a:fontRef idx="minor">
+              <a:schemeClr val="lt1"/>
+            </a:fontRef>
+          </p:style>
+          <p:txBody>
+            <a:bodyPr rtlCol="0" anchor="ctr"/>
+            <a:lstStyle/>
+            <a:p>
+              <a:pPr algn="ctr"/>
+              <a:endParaRPr lang="en-US"/>
+            </a:p>
+          </p:txBody>
+        </p:sp>
+        <p:sp>
+          <p:nvSpPr>
+            <p:cNvPr id="73" name="Rectangle 72"/>
+            <p:cNvSpPr/>
+            <p:nvPr/>
+          </p:nvSpPr>
+          <p:spPr>
+            <a:xfrm>
+              <a:off x="5688555" y="2972475"/>
+              <a:ext cx="457599" cy="453839"/>
+            </a:xfrm>
+            <a:prstGeom prst="rect">
+              <a:avLst/>
+            </a:prstGeom>
+            <a:solidFill>
+              <a:schemeClr val="accent1">
+                <a:lumMod val="40000"/>
+                <a:lumOff val="60000"/>
+              </a:schemeClr>
+            </a:solidFill>
+          </p:spPr>
+          <p:style>
+            <a:lnRef idx="2">
+              <a:schemeClr val="accent1">
+                <a:shade val="50000"/>
+              </a:schemeClr>
+            </a:lnRef>
+            <a:fillRef idx="1">
+              <a:schemeClr val="accent1"/>
+            </a:fillRef>
+            <a:effectRef idx="0">
+              <a:schemeClr val="accent1"/>
+            </a:effectRef>
+            <a:fontRef idx="minor">
+              <a:schemeClr val="lt1"/>
+            </a:fontRef>
+          </p:style>
+          <p:txBody>
+            <a:bodyPr rtlCol="0" anchor="ctr"/>
+            <a:lstStyle/>
+            <a:p>
+              <a:pPr algn="ctr"/>
+              <a:endParaRPr lang="en-US"/>
+            </a:p>
+          </p:txBody>
+        </p:sp>
+        <p:sp>
+          <p:nvSpPr>
+            <p:cNvPr id="74" name="Rectangle 73"/>
+            <p:cNvSpPr/>
+            <p:nvPr/>
+          </p:nvSpPr>
+          <p:spPr>
+            <a:xfrm>
+              <a:off x="6146154" y="2972475"/>
+              <a:ext cx="457599" cy="453839"/>
+            </a:xfrm>
+            <a:prstGeom prst="rect">
+              <a:avLst/>
+            </a:prstGeom>
+            <a:solidFill>
+              <a:schemeClr val="accent1">
+                <a:lumMod val="40000"/>
+                <a:lumOff val="60000"/>
+              </a:schemeClr>
+            </a:solidFill>
+          </p:spPr>
+          <p:style>
+            <a:lnRef idx="2">
+              <a:schemeClr val="accent1">
+                <a:shade val="50000"/>
+              </a:schemeClr>
+            </a:lnRef>
+            <a:fillRef idx="1">
+              <a:schemeClr val="accent1"/>
+            </a:fillRef>
+            <a:effectRef idx="0">
+              <a:schemeClr val="accent1"/>
+            </a:effectRef>
+            <a:fontRef idx="minor">
+              <a:schemeClr val="lt1"/>
+            </a:fontRef>
+          </p:style>
+          <p:txBody>
+            <a:bodyPr rtlCol="0" anchor="ctr"/>
+            <a:lstStyle/>
+            <a:p>
+              <a:pPr algn="ctr"/>
+              <a:endParaRPr lang="en-US"/>
+            </a:p>
+          </p:txBody>
+        </p:sp>
+        <p:sp>
+          <p:nvSpPr>
+            <p:cNvPr id="75" name="Rectangle 74"/>
+            <p:cNvSpPr/>
+            <p:nvPr/>
+          </p:nvSpPr>
+          <p:spPr>
+            <a:xfrm>
+              <a:off x="5688555" y="3426314"/>
+              <a:ext cx="457599" cy="453839"/>
+            </a:xfrm>
+            <a:prstGeom prst="rect">
+              <a:avLst/>
+            </a:prstGeom>
+            <a:solidFill>
+              <a:schemeClr val="accent1">
+                <a:lumMod val="40000"/>
+                <a:lumOff val="60000"/>
+              </a:schemeClr>
+            </a:solidFill>
+          </p:spPr>
+          <p:style>
+            <a:lnRef idx="2">
+              <a:schemeClr val="accent1">
+                <a:shade val="50000"/>
+              </a:schemeClr>
+            </a:lnRef>
+            <a:fillRef idx="1">
+              <a:schemeClr val="accent1"/>
+            </a:fillRef>
+            <a:effectRef idx="0">
+              <a:schemeClr val="accent1"/>
+            </a:effectRef>
+            <a:fontRef idx="minor">
+              <a:schemeClr val="lt1"/>
+            </a:fontRef>
+          </p:style>
+          <p:txBody>
+            <a:bodyPr rtlCol="0" anchor="ctr"/>
+            <a:lstStyle/>
+            <a:p>
+              <a:pPr algn="ctr"/>
+              <a:endParaRPr lang="en-US"/>
+            </a:p>
+          </p:txBody>
+        </p:sp>
+        <p:sp>
+          <p:nvSpPr>
+            <p:cNvPr id="76" name="Rectangle 75"/>
+            <p:cNvSpPr/>
+            <p:nvPr/>
+          </p:nvSpPr>
+          <p:spPr>
+            <a:xfrm>
+              <a:off x="6146154" y="3426314"/>
+              <a:ext cx="457599" cy="453839"/>
+            </a:xfrm>
+            <a:prstGeom prst="rect">
+              <a:avLst/>
+            </a:prstGeom>
+            <a:solidFill>
+              <a:schemeClr val="accent1">
+                <a:lumMod val="40000"/>
+                <a:lumOff val="60000"/>
+              </a:schemeClr>
+            </a:solidFill>
+          </p:spPr>
+          <p:style>
+            <a:lnRef idx="2">
+              <a:schemeClr val="accent1">
+                <a:shade val="50000"/>
+              </a:schemeClr>
+            </a:lnRef>
+            <a:fillRef idx="1">
+              <a:schemeClr val="accent1"/>
+            </a:fillRef>
+            <a:effectRef idx="0">
+              <a:schemeClr val="accent1"/>
+            </a:effectRef>
+            <a:fontRef idx="minor">
+              <a:schemeClr val="lt1"/>
+            </a:fontRef>
+          </p:style>
+          <p:txBody>
+            <a:bodyPr rtlCol="0" anchor="ctr"/>
+            <a:lstStyle/>
+            <a:p>
+              <a:pPr algn="ctr"/>
+              <a:endParaRPr lang="en-US"/>
+            </a:p>
+          </p:txBody>
+        </p:sp>
+        <p:sp>
+          <p:nvSpPr>
+            <p:cNvPr id="78" name="Rectangle 77"/>
+            <p:cNvSpPr/>
+            <p:nvPr/>
+          </p:nvSpPr>
+          <p:spPr>
+            <a:xfrm>
+              <a:off x="6145047" y="2518634"/>
+              <a:ext cx="457599" cy="453839"/>
+            </a:xfrm>
+            <a:prstGeom prst="rect">
+              <a:avLst/>
+            </a:prstGeom>
+            <a:solidFill>
+              <a:schemeClr val="accent6"/>
+            </a:solidFill>
+          </p:spPr>
+          <p:style>
+            <a:lnRef idx="2">
+              <a:schemeClr val="accent1">
+                <a:shade val="50000"/>
+              </a:schemeClr>
+            </a:lnRef>
+            <a:fillRef idx="1">
+              <a:schemeClr val="accent1"/>
+            </a:fillRef>
+            <a:effectRef idx="0">
+              <a:schemeClr val="accent1"/>
+            </a:effectRef>
+            <a:fontRef idx="minor">
+              <a:schemeClr val="lt1"/>
+            </a:fontRef>
+          </p:style>
+          <p:txBody>
+            <a:bodyPr rtlCol="0" anchor="ctr"/>
+            <a:lstStyle/>
+            <a:p>
+              <a:pPr algn="ctr"/>
+              <a:endParaRPr lang="en-US"/>
+            </a:p>
+          </p:txBody>
+        </p:sp>
+        <p:sp>
+          <p:nvSpPr>
+            <p:cNvPr id="79" name="Rectangle 78"/>
+            <p:cNvSpPr/>
+            <p:nvPr/>
+          </p:nvSpPr>
+          <p:spPr>
+            <a:xfrm>
+              <a:off x="5689194" y="2518634"/>
+              <a:ext cx="457599" cy="453839"/>
+            </a:xfrm>
+            <a:prstGeom prst="rect">
+              <a:avLst/>
+            </a:prstGeom>
+            <a:solidFill>
+              <a:schemeClr val="accent6"/>
+            </a:solidFill>
+          </p:spPr>
+          <p:style>
+            <a:lnRef idx="2">
+              <a:schemeClr val="accent1">
+                <a:shade val="50000"/>
+              </a:schemeClr>
+            </a:lnRef>
+            <a:fillRef idx="1">
+              <a:schemeClr val="accent1"/>
+            </a:fillRef>
+            <a:effectRef idx="0">
+              <a:schemeClr val="accent1"/>
+            </a:effectRef>
+            <a:fontRef idx="minor">
+              <a:schemeClr val="lt1"/>
+            </a:fontRef>
+          </p:style>
+          <p:txBody>
+            <a:bodyPr rtlCol="0" anchor="ctr"/>
+            <a:lstStyle/>
+            <a:p>
+              <a:pPr algn="ctr"/>
+              <a:endParaRPr lang="en-US" sz="900" dirty="0">
+                <a:effectLst>
+                  <a:outerShdw blurRad="38100" dist="38100" dir="2700000" algn="tl">
+                    <a:srgbClr val="000000">
+                      <a:alpha val="43137"/>
+                    </a:srgbClr>
+                  </a:outerShdw>
+                </a:effectLst>
+              </a:endParaRPr>
+            </a:p>
+          </p:txBody>
+        </p:sp>
+        <p:sp>
+          <p:nvSpPr>
+            <p:cNvPr id="82" name="Rectangle 81"/>
+            <p:cNvSpPr/>
+            <p:nvPr/>
+          </p:nvSpPr>
+          <p:spPr>
+            <a:xfrm>
+              <a:off x="5231323" y="2064797"/>
+              <a:ext cx="457599" cy="453839"/>
+            </a:xfrm>
+            <a:prstGeom prst="rect">
+              <a:avLst/>
+            </a:prstGeom>
+            <a:solidFill>
+              <a:schemeClr val="accent1">
+                <a:lumMod val="40000"/>
+                <a:lumOff val="60000"/>
+              </a:schemeClr>
+            </a:solidFill>
+          </p:spPr>
+          <p:style>
+            <a:lnRef idx="2">
+              <a:schemeClr val="accent1">
+                <a:shade val="50000"/>
+              </a:schemeClr>
+            </a:lnRef>
+            <a:fillRef idx="1">
+              <a:schemeClr val="accent1"/>
+            </a:fillRef>
+            <a:effectRef idx="0">
+              <a:schemeClr val="accent1"/>
+            </a:effectRef>
+            <a:fontRef idx="minor">
+              <a:schemeClr val="lt1"/>
+            </a:fontRef>
+          </p:style>
+          <p:txBody>
+            <a:bodyPr rtlCol="0" anchor="ctr"/>
+            <a:lstStyle/>
+            <a:p>
+              <a:pPr algn="ctr"/>
+              <a:endParaRPr lang="en-US"/>
+            </a:p>
+          </p:txBody>
+        </p:sp>
+        <p:sp>
+          <p:nvSpPr>
+            <p:cNvPr id="83" name="Rectangle 82"/>
+            <p:cNvSpPr/>
+            <p:nvPr/>
+          </p:nvSpPr>
+          <p:spPr>
+            <a:xfrm>
+              <a:off x="5231323" y="2518636"/>
+              <a:ext cx="457599" cy="453839"/>
+            </a:xfrm>
+            <a:prstGeom prst="rect">
+              <a:avLst/>
+            </a:prstGeom>
+            <a:solidFill>
+              <a:schemeClr val="accent6"/>
+            </a:solidFill>
+          </p:spPr>
+          <p:style>
+            <a:lnRef idx="2">
+              <a:schemeClr val="accent1">
+                <a:shade val="50000"/>
+              </a:schemeClr>
+            </a:lnRef>
+            <a:fillRef idx="1">
+              <a:schemeClr val="accent1"/>
+            </a:fillRef>
+            <a:effectRef idx="0">
+              <a:schemeClr val="accent1"/>
+            </a:effectRef>
+            <a:fontRef idx="minor">
+              <a:schemeClr val="lt1"/>
+            </a:fontRef>
+          </p:style>
+          <p:txBody>
+            <a:bodyPr rtlCol="0" anchor="ctr"/>
+            <a:lstStyle/>
+            <a:p>
+              <a:pPr algn="ctr"/>
+              <a:endParaRPr lang="en-US"/>
+            </a:p>
+          </p:txBody>
+        </p:sp>
+        <p:sp>
+          <p:nvSpPr>
+            <p:cNvPr id="84" name="Rectangle 83"/>
+            <p:cNvSpPr/>
+            <p:nvPr/>
+          </p:nvSpPr>
+          <p:spPr>
+            <a:xfrm>
+              <a:off x="5231323" y="2972475"/>
+              <a:ext cx="457599" cy="453839"/>
+            </a:xfrm>
+            <a:prstGeom prst="rect">
+              <a:avLst/>
+            </a:prstGeom>
+            <a:solidFill>
+              <a:schemeClr val="accent1">
+                <a:lumMod val="40000"/>
+                <a:lumOff val="60000"/>
+              </a:schemeClr>
+            </a:solidFill>
+          </p:spPr>
+          <p:style>
+            <a:lnRef idx="2">
+              <a:schemeClr val="accent1">
+                <a:shade val="50000"/>
+              </a:schemeClr>
+            </a:lnRef>
+            <a:fillRef idx="1">
+              <a:schemeClr val="accent1"/>
+            </a:fillRef>
+            <a:effectRef idx="0">
+              <a:schemeClr val="accent1"/>
+            </a:effectRef>
+            <a:fontRef idx="minor">
+              <a:schemeClr val="lt1"/>
+            </a:fontRef>
+          </p:style>
+          <p:txBody>
+            <a:bodyPr rtlCol="0" anchor="ctr"/>
+            <a:lstStyle/>
+            <a:p>
+              <a:pPr algn="ctr"/>
+              <a:endParaRPr lang="en-US"/>
+            </a:p>
+          </p:txBody>
+        </p:sp>
+        <p:sp>
+          <p:nvSpPr>
+            <p:cNvPr id="85" name="Rectangle 84"/>
+            <p:cNvSpPr/>
+            <p:nvPr/>
+          </p:nvSpPr>
+          <p:spPr>
+            <a:xfrm>
+              <a:off x="5231323" y="3426314"/>
+              <a:ext cx="457599" cy="453839"/>
+            </a:xfrm>
+            <a:prstGeom prst="rect">
+              <a:avLst/>
+            </a:prstGeom>
+            <a:solidFill>
+              <a:schemeClr val="accent1">
+                <a:lumMod val="40000"/>
+                <a:lumOff val="60000"/>
+              </a:schemeClr>
+            </a:solidFill>
+          </p:spPr>
+          <p:style>
+            <a:lnRef idx="2">
+              <a:schemeClr val="accent1">
+                <a:shade val="50000"/>
+              </a:schemeClr>
+            </a:lnRef>
+            <a:fillRef idx="1">
+              <a:schemeClr val="accent1"/>
+            </a:fillRef>
+            <a:effectRef idx="0">
+              <a:schemeClr val="accent1"/>
+            </a:effectRef>
+            <a:fontRef idx="minor">
+              <a:schemeClr val="lt1"/>
+            </a:fontRef>
+          </p:style>
+          <p:txBody>
+            <a:bodyPr rtlCol="0" anchor="ctr"/>
+            <a:lstStyle/>
+            <a:p>
+              <a:pPr algn="ctr"/>
+              <a:endParaRPr lang="en-US"/>
+            </a:p>
+          </p:txBody>
+        </p:sp>
+        <p:sp>
+          <p:nvSpPr>
+            <p:cNvPr id="86" name="Rectangle 85"/>
+            <p:cNvSpPr/>
+            <p:nvPr/>
+          </p:nvSpPr>
+          <p:spPr>
+            <a:xfrm>
+              <a:off x="6603111" y="3880153"/>
+              <a:ext cx="457599" cy="453839"/>
+            </a:xfrm>
+            <a:prstGeom prst="rect">
+              <a:avLst/>
+            </a:prstGeom>
+            <a:solidFill>
+              <a:schemeClr val="accent1">
+                <a:lumMod val="40000"/>
+                <a:lumOff val="60000"/>
+              </a:schemeClr>
+            </a:solidFill>
+          </p:spPr>
+          <p:style>
+            <a:lnRef idx="2">
+              <a:schemeClr val="accent1">
+                <a:shade val="50000"/>
+              </a:schemeClr>
+            </a:lnRef>
+            <a:fillRef idx="1">
+              <a:schemeClr val="accent1"/>
+            </a:fillRef>
+            <a:effectRef idx="0">
+              <a:schemeClr val="accent1"/>
+            </a:effectRef>
+            <a:fontRef idx="minor">
+              <a:schemeClr val="lt1"/>
+            </a:fontRef>
+          </p:style>
+          <p:txBody>
+            <a:bodyPr rtlCol="0" anchor="ctr"/>
+            <a:lstStyle/>
+            <a:p>
+              <a:pPr algn="ctr"/>
+              <a:endParaRPr lang="en-US"/>
+            </a:p>
+          </p:txBody>
+        </p:sp>
+        <p:sp>
+          <p:nvSpPr>
+            <p:cNvPr id="87" name="Rectangle 86"/>
+            <p:cNvSpPr/>
+            <p:nvPr/>
+          </p:nvSpPr>
+          <p:spPr>
+            <a:xfrm>
+              <a:off x="7060710" y="3880153"/>
+              <a:ext cx="457599" cy="453839"/>
+            </a:xfrm>
+            <a:prstGeom prst="rect">
+              <a:avLst/>
+            </a:prstGeom>
+            <a:solidFill>
+              <a:schemeClr val="accent1">
+                <a:lumMod val="40000"/>
+                <a:lumOff val="60000"/>
+              </a:schemeClr>
+            </a:solidFill>
+          </p:spPr>
+          <p:style>
+            <a:lnRef idx="2">
+              <a:schemeClr val="accent1">
+                <a:shade val="50000"/>
+              </a:schemeClr>
+            </a:lnRef>
+            <a:fillRef idx="1">
+              <a:schemeClr val="accent1"/>
+            </a:fillRef>
+            <a:effectRef idx="0">
+              <a:schemeClr val="accent1"/>
+            </a:effectRef>
+            <a:fontRef idx="minor">
+              <a:schemeClr val="lt1"/>
+            </a:fontRef>
+          </p:style>
+          <p:txBody>
+            <a:bodyPr rtlCol="0" anchor="ctr"/>
+            <a:lstStyle/>
+            <a:p>
+              <a:pPr algn="ctr"/>
+              <a:endParaRPr lang="en-US"/>
+            </a:p>
+          </p:txBody>
+        </p:sp>
+        <p:sp>
+          <p:nvSpPr>
+            <p:cNvPr id="88" name="Rectangle 87"/>
+            <p:cNvSpPr/>
+            <p:nvPr/>
+          </p:nvSpPr>
+          <p:spPr>
+            <a:xfrm>
+              <a:off x="7518309" y="3880153"/>
+              <a:ext cx="457599" cy="453839"/>
+            </a:xfrm>
+            <a:prstGeom prst="rect">
+              <a:avLst/>
+            </a:prstGeom>
+            <a:solidFill>
+              <a:schemeClr val="accent1">
+                <a:lumMod val="40000"/>
+                <a:lumOff val="60000"/>
+              </a:schemeClr>
+            </a:solidFill>
+          </p:spPr>
+          <p:style>
+            <a:lnRef idx="2">
+              <a:schemeClr val="accent1">
+                <a:shade val="50000"/>
+              </a:schemeClr>
+            </a:lnRef>
+            <a:fillRef idx="1">
+              <a:schemeClr val="accent1"/>
+            </a:fillRef>
+            <a:effectRef idx="0">
+              <a:schemeClr val="accent1"/>
+            </a:effectRef>
+            <a:fontRef idx="minor">
+              <a:schemeClr val="lt1"/>
+            </a:fontRef>
+          </p:style>
+          <p:txBody>
+            <a:bodyPr rtlCol="0" anchor="ctr"/>
+            <a:lstStyle/>
+            <a:p>
+              <a:pPr algn="ctr"/>
+              <a:endParaRPr lang="en-US"/>
+            </a:p>
+          </p:txBody>
+        </p:sp>
+        <p:sp>
+          <p:nvSpPr>
+            <p:cNvPr id="89" name="Rectangle 88"/>
+            <p:cNvSpPr/>
+            <p:nvPr/>
+          </p:nvSpPr>
+          <p:spPr>
+            <a:xfrm>
+              <a:off x="7975908" y="3880153"/>
+              <a:ext cx="457599" cy="453839"/>
+            </a:xfrm>
+            <a:prstGeom prst="rect">
+              <a:avLst/>
+            </a:prstGeom>
+            <a:solidFill>
+              <a:schemeClr val="accent1">
+                <a:lumMod val="40000"/>
+                <a:lumOff val="60000"/>
+              </a:schemeClr>
+            </a:solidFill>
+          </p:spPr>
+          <p:style>
+            <a:lnRef idx="2">
+              <a:schemeClr val="accent1">
+                <a:shade val="50000"/>
+              </a:schemeClr>
+            </a:lnRef>
+            <a:fillRef idx="1">
+              <a:schemeClr val="accent1"/>
+            </a:fillRef>
+            <a:effectRef idx="0">
+              <a:schemeClr val="accent1"/>
+            </a:effectRef>
+            <a:fontRef idx="minor">
+              <a:schemeClr val="lt1"/>
+            </a:fontRef>
+          </p:style>
+          <p:txBody>
+            <a:bodyPr rtlCol="0" anchor="ctr"/>
+            <a:lstStyle/>
+            <a:p>
+              <a:pPr algn="ctr"/>
+              <a:endParaRPr lang="en-US"/>
+            </a:p>
+          </p:txBody>
+        </p:sp>
+        <p:sp>
+          <p:nvSpPr>
+            <p:cNvPr id="90" name="Rectangle 89"/>
+            <p:cNvSpPr/>
+            <p:nvPr/>
+          </p:nvSpPr>
+          <p:spPr>
+            <a:xfrm>
+              <a:off x="8433507" y="3880153"/>
+              <a:ext cx="457599" cy="453839"/>
+            </a:xfrm>
+            <a:prstGeom prst="rect">
+              <a:avLst/>
+            </a:prstGeom>
+            <a:solidFill>
+              <a:schemeClr val="accent1">
+                <a:lumMod val="40000"/>
+                <a:lumOff val="60000"/>
+              </a:schemeClr>
+            </a:solidFill>
+          </p:spPr>
+          <p:style>
+            <a:lnRef idx="2">
+              <a:schemeClr val="accent1">
+                <a:shade val="50000"/>
+              </a:schemeClr>
+            </a:lnRef>
+            <a:fillRef idx="1">
+              <a:schemeClr val="accent1"/>
+            </a:fillRef>
+            <a:effectRef idx="0">
+              <a:schemeClr val="accent1"/>
+            </a:effectRef>
+            <a:fontRef idx="minor">
+              <a:schemeClr val="lt1"/>
+            </a:fontRef>
+          </p:style>
+          <p:txBody>
+            <a:bodyPr rtlCol="0" anchor="ctr"/>
+            <a:lstStyle/>
+            <a:p>
+              <a:pPr algn="ctr"/>
+              <a:endParaRPr lang="en-US"/>
+            </a:p>
+          </p:txBody>
+        </p:sp>
+        <p:sp>
+          <p:nvSpPr>
+            <p:cNvPr id="91" name="Rectangle 90"/>
+            <p:cNvSpPr/>
+            <p:nvPr/>
+          </p:nvSpPr>
+          <p:spPr>
+            <a:xfrm>
+              <a:off x="8891106" y="3880153"/>
+              <a:ext cx="457599" cy="453839"/>
+            </a:xfrm>
+            <a:prstGeom prst="rect">
+              <a:avLst/>
+            </a:prstGeom>
+            <a:solidFill>
+              <a:schemeClr val="accent1">
+                <a:lumMod val="40000"/>
+                <a:lumOff val="60000"/>
+              </a:schemeClr>
+            </a:solidFill>
+          </p:spPr>
+          <p:style>
+            <a:lnRef idx="2">
+              <a:schemeClr val="accent1">
+                <a:shade val="50000"/>
+              </a:schemeClr>
+            </a:lnRef>
+            <a:fillRef idx="1">
+              <a:schemeClr val="accent1"/>
+            </a:fillRef>
+            <a:effectRef idx="0">
+              <a:schemeClr val="accent1"/>
+            </a:effectRef>
+            <a:fontRef idx="minor">
+              <a:schemeClr val="lt1"/>
+            </a:fontRef>
+          </p:style>
+          <p:txBody>
+            <a:bodyPr rtlCol="0" anchor="ctr"/>
+            <a:lstStyle/>
+            <a:p>
+              <a:pPr algn="ctr"/>
+              <a:endParaRPr lang="en-US"/>
+            </a:p>
+          </p:txBody>
+        </p:sp>
+        <p:sp>
+          <p:nvSpPr>
+            <p:cNvPr id="92" name="Rectangle 91"/>
+            <p:cNvSpPr/>
+            <p:nvPr/>
+          </p:nvSpPr>
+          <p:spPr>
+            <a:xfrm>
+              <a:off x="5688555" y="3880153"/>
+              <a:ext cx="457599" cy="453839"/>
+            </a:xfrm>
+            <a:prstGeom prst="rect">
+              <a:avLst/>
+            </a:prstGeom>
+            <a:solidFill>
+              <a:schemeClr val="accent1">
+                <a:lumMod val="40000"/>
+                <a:lumOff val="60000"/>
+              </a:schemeClr>
+            </a:solidFill>
+          </p:spPr>
+          <p:style>
+            <a:lnRef idx="2">
+              <a:schemeClr val="accent1">
+                <a:shade val="50000"/>
+              </a:schemeClr>
+            </a:lnRef>
+            <a:fillRef idx="1">
+              <a:schemeClr val="accent1"/>
+            </a:fillRef>
+            <a:effectRef idx="0">
+              <a:schemeClr val="accent1"/>
+            </a:effectRef>
+            <a:fontRef idx="minor">
+              <a:schemeClr val="lt1"/>
+            </a:fontRef>
+          </p:style>
+          <p:txBody>
+            <a:bodyPr rtlCol="0" anchor="ctr"/>
+            <a:lstStyle/>
+            <a:p>
+              <a:pPr algn="ctr"/>
+              <a:endParaRPr lang="en-US"/>
+            </a:p>
+          </p:txBody>
+        </p:sp>
+        <p:sp>
+          <p:nvSpPr>
+            <p:cNvPr id="93" name="Rectangle 92"/>
+            <p:cNvSpPr/>
+            <p:nvPr/>
+          </p:nvSpPr>
+          <p:spPr>
+            <a:xfrm>
+              <a:off x="6146154" y="3880153"/>
+              <a:ext cx="457599" cy="453839"/>
+            </a:xfrm>
+            <a:prstGeom prst="rect">
+              <a:avLst/>
+            </a:prstGeom>
+            <a:solidFill>
+              <a:schemeClr val="accent1">
+                <a:lumMod val="40000"/>
+                <a:lumOff val="60000"/>
+              </a:schemeClr>
+            </a:solidFill>
+          </p:spPr>
+          <p:style>
+            <a:lnRef idx="2">
+              <a:schemeClr val="accent1">
+                <a:shade val="50000"/>
+              </a:schemeClr>
+            </a:lnRef>
+            <a:fillRef idx="1">
+              <a:schemeClr val="accent1"/>
+            </a:fillRef>
+            <a:effectRef idx="0">
+              <a:schemeClr val="accent1"/>
+            </a:effectRef>
+            <a:fontRef idx="minor">
+              <a:schemeClr val="lt1"/>
+            </a:fontRef>
+          </p:style>
+          <p:txBody>
+            <a:bodyPr rtlCol="0" anchor="ctr"/>
+            <a:lstStyle/>
+            <a:p>
+              <a:pPr algn="ctr"/>
+              <a:endParaRPr lang="en-US"/>
+            </a:p>
+          </p:txBody>
+        </p:sp>
+        <p:sp>
+          <p:nvSpPr>
+            <p:cNvPr id="94" name="Rectangle 93"/>
+            <p:cNvSpPr/>
+            <p:nvPr/>
+          </p:nvSpPr>
+          <p:spPr>
+            <a:xfrm>
+              <a:off x="5231323" y="3880153"/>
+              <a:ext cx="457599" cy="453839"/>
+            </a:xfrm>
+            <a:prstGeom prst="rect">
+              <a:avLst/>
+            </a:prstGeom>
+            <a:solidFill>
+              <a:schemeClr val="accent1">
+                <a:lumMod val="40000"/>
+                <a:lumOff val="60000"/>
+              </a:schemeClr>
+            </a:solidFill>
+          </p:spPr>
+          <p:style>
+            <a:lnRef idx="2">
+              <a:schemeClr val="accent1">
+                <a:shade val="50000"/>
+              </a:schemeClr>
+            </a:lnRef>
+            <a:fillRef idx="1">
+              <a:schemeClr val="accent1"/>
+            </a:fillRef>
+            <a:effectRef idx="0">
+              <a:schemeClr val="accent1"/>
+            </a:effectRef>
+            <a:fontRef idx="minor">
+              <a:schemeClr val="lt1"/>
+            </a:fontRef>
+          </p:style>
+          <p:txBody>
+            <a:bodyPr rtlCol="0" anchor="ctr"/>
+            <a:lstStyle/>
+            <a:p>
+              <a:pPr algn="ctr"/>
+              <a:endParaRPr lang="en-US"/>
+            </a:p>
+          </p:txBody>
+        </p:sp>
+        <p:sp>
+          <p:nvSpPr>
+            <p:cNvPr id="104" name="Rectangle 103"/>
+            <p:cNvSpPr/>
+            <p:nvPr/>
+          </p:nvSpPr>
+          <p:spPr>
+            <a:xfrm>
+              <a:off x="4275547" y="2064797"/>
+              <a:ext cx="457599" cy="453839"/>
+            </a:xfrm>
+            <a:prstGeom prst="rect">
+              <a:avLst/>
+            </a:prstGeom>
+            <a:solidFill>
+              <a:schemeClr val="accent1">
+                <a:lumMod val="20000"/>
+                <a:lumOff val="80000"/>
+              </a:schemeClr>
+            </a:solidFill>
+          </p:spPr>
+          <p:style>
+            <a:lnRef idx="2">
+              <a:schemeClr val="accent1">
+                <a:shade val="50000"/>
+              </a:schemeClr>
+            </a:lnRef>
+            <a:fillRef idx="1">
+              <a:schemeClr val="accent1"/>
+            </a:fillRef>
+            <a:effectRef idx="0">
+              <a:schemeClr val="accent1"/>
+            </a:effectRef>
+            <a:fontRef idx="minor">
+              <a:schemeClr val="lt1"/>
+            </a:fontRef>
+          </p:style>
+          <p:txBody>
+            <a:bodyPr rtlCol="0" anchor="ctr"/>
+            <a:lstStyle/>
+            <a:p>
+              <a:pPr algn="ctr"/>
+              <a:endParaRPr lang="en-US"/>
+            </a:p>
+          </p:txBody>
+        </p:sp>
+        <p:sp>
+          <p:nvSpPr>
+            <p:cNvPr id="105" name="Rectangle 104"/>
+            <p:cNvSpPr/>
+            <p:nvPr/>
+          </p:nvSpPr>
+          <p:spPr>
+            <a:xfrm>
+              <a:off x="4733146" y="2064797"/>
+              <a:ext cx="457599" cy="453839"/>
+            </a:xfrm>
+            <a:prstGeom prst="rect">
+              <a:avLst/>
+            </a:prstGeom>
+            <a:solidFill>
+              <a:schemeClr val="accent1">
+                <a:lumMod val="20000"/>
+                <a:lumOff val="80000"/>
+              </a:schemeClr>
+            </a:solidFill>
+          </p:spPr>
+          <p:style>
+            <a:lnRef idx="2">
+              <a:schemeClr val="accent1">
+                <a:shade val="50000"/>
+              </a:schemeClr>
+            </a:lnRef>
+            <a:fillRef idx="1">
+              <a:schemeClr val="accent1"/>
+            </a:fillRef>
+            <a:effectRef idx="0">
+              <a:schemeClr val="accent1"/>
+            </a:effectRef>
+            <a:fontRef idx="minor">
+              <a:schemeClr val="lt1"/>
+            </a:fontRef>
+          </p:style>
+          <p:txBody>
+            <a:bodyPr rtlCol="0" anchor="ctr"/>
+            <a:lstStyle/>
+            <a:p>
+              <a:pPr algn="ctr"/>
+              <a:endParaRPr lang="en-US"/>
+            </a:p>
+          </p:txBody>
+        </p:sp>
+        <p:sp>
+          <p:nvSpPr>
+            <p:cNvPr id="106" name="Rectangle 105"/>
+            <p:cNvSpPr/>
+            <p:nvPr/>
+          </p:nvSpPr>
+          <p:spPr>
+            <a:xfrm>
+              <a:off x="4275547" y="2518636"/>
+              <a:ext cx="457599" cy="453839"/>
+            </a:xfrm>
+            <a:prstGeom prst="rect">
+              <a:avLst/>
+            </a:prstGeom>
+            <a:solidFill>
+              <a:schemeClr val="accent6"/>
+            </a:solidFill>
+          </p:spPr>
+          <p:style>
+            <a:lnRef idx="2">
+              <a:schemeClr val="accent1">
+                <a:shade val="50000"/>
+              </a:schemeClr>
+            </a:lnRef>
+            <a:fillRef idx="1">
+              <a:schemeClr val="accent1"/>
+            </a:fillRef>
+            <a:effectRef idx="0">
+              <a:schemeClr val="accent1"/>
+            </a:effectRef>
+            <a:fontRef idx="minor">
+              <a:schemeClr val="lt1"/>
+            </a:fontRef>
+          </p:style>
+          <p:txBody>
+            <a:bodyPr rtlCol="0" anchor="ctr"/>
+            <a:lstStyle/>
+            <a:p>
+              <a:pPr algn="ctr"/>
+              <a:endParaRPr lang="en-US" sz="900" dirty="0"/>
+            </a:p>
+          </p:txBody>
+        </p:sp>
+        <p:sp>
+          <p:nvSpPr>
+            <p:cNvPr id="107" name="Rectangle 106"/>
+            <p:cNvSpPr/>
+            <p:nvPr/>
+          </p:nvSpPr>
+          <p:spPr>
+            <a:xfrm>
+              <a:off x="4733146" y="2518636"/>
+              <a:ext cx="457599" cy="453839"/>
+            </a:xfrm>
+            <a:prstGeom prst="rect">
+              <a:avLst/>
+            </a:prstGeom>
+            <a:solidFill>
+              <a:schemeClr val="accent6"/>
+            </a:solidFill>
+          </p:spPr>
+          <p:style>
+            <a:lnRef idx="2">
+              <a:schemeClr val="accent1">
+                <a:shade val="50000"/>
+              </a:schemeClr>
+            </a:lnRef>
+            <a:fillRef idx="1">
+              <a:schemeClr val="accent1"/>
+            </a:fillRef>
+            <a:effectRef idx="0">
+              <a:schemeClr val="accent1"/>
+            </a:effectRef>
+            <a:fontRef idx="minor">
+              <a:schemeClr val="lt1"/>
+            </a:fontRef>
+          </p:style>
+          <p:txBody>
+            <a:bodyPr rtlCol="0" anchor="ctr"/>
+            <a:lstStyle/>
+            <a:p>
+              <a:pPr algn="ctr"/>
+              <a:endParaRPr lang="en-US"/>
+            </a:p>
+          </p:txBody>
+        </p:sp>
+        <p:sp>
+          <p:nvSpPr>
+            <p:cNvPr id="108" name="Rectangle 107"/>
+            <p:cNvSpPr/>
+            <p:nvPr/>
+          </p:nvSpPr>
+          <p:spPr>
+            <a:xfrm>
+              <a:off x="4275547" y="2972475"/>
+              <a:ext cx="457599" cy="453839"/>
+            </a:xfrm>
+            <a:prstGeom prst="rect">
+              <a:avLst/>
+            </a:prstGeom>
+            <a:solidFill>
+              <a:schemeClr val="accent1">
+                <a:lumMod val="20000"/>
+                <a:lumOff val="80000"/>
+              </a:schemeClr>
+            </a:solidFill>
+          </p:spPr>
+          <p:style>
+            <a:lnRef idx="2">
+              <a:schemeClr val="accent1">
+                <a:shade val="50000"/>
+              </a:schemeClr>
+            </a:lnRef>
+            <a:fillRef idx="1">
+              <a:schemeClr val="accent1"/>
+            </a:fillRef>
+            <a:effectRef idx="0">
+              <a:schemeClr val="accent1"/>
+            </a:effectRef>
+            <a:fontRef idx="minor">
+              <a:schemeClr val="lt1"/>
+            </a:fontRef>
+          </p:style>
+          <p:txBody>
+            <a:bodyPr rtlCol="0" anchor="ctr"/>
+            <a:lstStyle/>
+            <a:p>
+              <a:pPr algn="ctr"/>
+              <a:endParaRPr lang="en-US"/>
+            </a:p>
+          </p:txBody>
+        </p:sp>
+        <p:sp>
+          <p:nvSpPr>
+            <p:cNvPr id="109" name="Rectangle 108"/>
+            <p:cNvSpPr/>
+            <p:nvPr/>
+          </p:nvSpPr>
+          <p:spPr>
+            <a:xfrm>
+              <a:off x="4733146" y="2972475"/>
+              <a:ext cx="457599" cy="453839"/>
+            </a:xfrm>
+            <a:prstGeom prst="rect">
+              <a:avLst/>
+            </a:prstGeom>
+            <a:solidFill>
+              <a:schemeClr val="accent1">
+                <a:lumMod val="20000"/>
+                <a:lumOff val="80000"/>
+              </a:schemeClr>
+            </a:solidFill>
+          </p:spPr>
+          <p:style>
+            <a:lnRef idx="2">
+              <a:schemeClr val="accent1">
+                <a:shade val="50000"/>
+              </a:schemeClr>
+            </a:lnRef>
+            <a:fillRef idx="1">
+              <a:schemeClr val="accent1"/>
+            </a:fillRef>
+            <a:effectRef idx="0">
+              <a:schemeClr val="accent1"/>
+            </a:effectRef>
+            <a:fontRef idx="minor">
+              <a:schemeClr val="lt1"/>
+            </a:fontRef>
+          </p:style>
+          <p:txBody>
+            <a:bodyPr rtlCol="0" anchor="ctr"/>
+            <a:lstStyle/>
+            <a:p>
+              <a:pPr algn="ctr"/>
+              <a:endParaRPr lang="en-US"/>
+            </a:p>
+          </p:txBody>
+        </p:sp>
+        <p:sp>
+          <p:nvSpPr>
+            <p:cNvPr id="110" name="Rectangle 109"/>
+            <p:cNvSpPr/>
+            <p:nvPr/>
+          </p:nvSpPr>
+          <p:spPr>
+            <a:xfrm>
+              <a:off x="4275547" y="3426314"/>
+              <a:ext cx="457599" cy="453839"/>
+            </a:xfrm>
+            <a:prstGeom prst="rect">
+              <a:avLst/>
+            </a:prstGeom>
+            <a:solidFill>
+              <a:schemeClr val="accent1">
+                <a:lumMod val="20000"/>
+                <a:lumOff val="80000"/>
+              </a:schemeClr>
+            </a:solidFill>
+          </p:spPr>
+          <p:style>
+            <a:lnRef idx="2">
+              <a:schemeClr val="accent1">
+                <a:shade val="50000"/>
+              </a:schemeClr>
+            </a:lnRef>
+            <a:fillRef idx="1">
+              <a:schemeClr val="accent1"/>
+            </a:fillRef>
+            <a:effectRef idx="0">
+              <a:schemeClr val="accent1"/>
+            </a:effectRef>
+            <a:fontRef idx="minor">
+              <a:schemeClr val="lt1"/>
+            </a:fontRef>
+          </p:style>
+          <p:txBody>
+            <a:bodyPr rtlCol="0" anchor="ctr"/>
+            <a:lstStyle/>
+            <a:p>
+              <a:pPr algn="ctr"/>
+              <a:endParaRPr lang="en-US"/>
+            </a:p>
+          </p:txBody>
+        </p:sp>
+        <p:sp>
+          <p:nvSpPr>
+            <p:cNvPr id="111" name="Rectangle 110"/>
+            <p:cNvSpPr/>
+            <p:nvPr/>
+          </p:nvSpPr>
+          <p:spPr>
+            <a:xfrm>
+              <a:off x="4733146" y="3426314"/>
+              <a:ext cx="457599" cy="453839"/>
+            </a:xfrm>
+            <a:prstGeom prst="rect">
+              <a:avLst/>
+            </a:prstGeom>
+            <a:solidFill>
+              <a:schemeClr val="accent1">
+                <a:lumMod val="20000"/>
+                <a:lumOff val="80000"/>
+              </a:schemeClr>
+            </a:solidFill>
+          </p:spPr>
+          <p:style>
+            <a:lnRef idx="2">
+              <a:schemeClr val="accent1">
+                <a:shade val="50000"/>
+              </a:schemeClr>
+            </a:lnRef>
+            <a:fillRef idx="1">
+              <a:schemeClr val="accent1"/>
+            </a:fillRef>
+            <a:effectRef idx="0">
+              <a:schemeClr val="accent1"/>
+            </a:effectRef>
+            <a:fontRef idx="minor">
+              <a:schemeClr val="lt1"/>
+            </a:fontRef>
+          </p:style>
+          <p:txBody>
+            <a:bodyPr rtlCol="0" anchor="ctr"/>
+            <a:lstStyle/>
+            <a:p>
+              <a:pPr algn="ctr"/>
+              <a:endParaRPr lang="en-US"/>
+            </a:p>
+          </p:txBody>
+        </p:sp>
+        <p:sp>
+          <p:nvSpPr>
+            <p:cNvPr id="112" name="Rectangle 111"/>
+            <p:cNvSpPr/>
+            <p:nvPr/>
+          </p:nvSpPr>
+          <p:spPr>
+            <a:xfrm>
+              <a:off x="3360991" y="2064797"/>
+              <a:ext cx="457599" cy="453839"/>
+            </a:xfrm>
+            <a:prstGeom prst="rect">
+              <a:avLst/>
+            </a:prstGeom>
+            <a:solidFill>
+              <a:schemeClr val="accent1">
+                <a:lumMod val="20000"/>
+                <a:lumOff val="80000"/>
+              </a:schemeClr>
+            </a:solidFill>
+          </p:spPr>
+          <p:style>
+            <a:lnRef idx="2">
+              <a:schemeClr val="accent1">
+                <a:shade val="50000"/>
+              </a:schemeClr>
+            </a:lnRef>
+            <a:fillRef idx="1">
+              <a:schemeClr val="accent1"/>
+            </a:fillRef>
+            <a:effectRef idx="0">
+              <a:schemeClr val="accent1"/>
+            </a:effectRef>
+            <a:fontRef idx="minor">
+              <a:schemeClr val="lt1"/>
+            </a:fontRef>
+          </p:style>
+          <p:txBody>
+            <a:bodyPr rtlCol="0" anchor="ctr"/>
+            <a:lstStyle/>
+            <a:p>
+              <a:pPr algn="ctr"/>
+              <a:endParaRPr lang="en-US"/>
+            </a:p>
+          </p:txBody>
+        </p:sp>
+        <p:sp>
+          <p:nvSpPr>
+            <p:cNvPr id="113" name="Rectangle 112"/>
+            <p:cNvSpPr/>
+            <p:nvPr/>
+          </p:nvSpPr>
+          <p:spPr>
+            <a:xfrm>
+              <a:off x="3818590" y="2064797"/>
+              <a:ext cx="457599" cy="453839"/>
+            </a:xfrm>
+            <a:prstGeom prst="rect">
+              <a:avLst/>
+            </a:prstGeom>
+            <a:solidFill>
+              <a:schemeClr val="accent1">
+                <a:lumMod val="20000"/>
+                <a:lumOff val="80000"/>
+              </a:schemeClr>
+            </a:solidFill>
+          </p:spPr>
+          <p:style>
+            <a:lnRef idx="2">
+              <a:schemeClr val="accent1">
+                <a:shade val="50000"/>
+              </a:schemeClr>
+            </a:lnRef>
+            <a:fillRef idx="1">
+              <a:schemeClr val="accent1"/>
+            </a:fillRef>
+            <a:effectRef idx="0">
+              <a:schemeClr val="accent1"/>
+            </a:effectRef>
+            <a:fontRef idx="minor">
+              <a:schemeClr val="lt1"/>
+            </a:fontRef>
+          </p:style>
+          <p:txBody>
+            <a:bodyPr rtlCol="0" anchor="ctr"/>
+            <a:lstStyle/>
+            <a:p>
+              <a:pPr algn="ctr"/>
+              <a:endParaRPr lang="en-US"/>
+            </a:p>
+          </p:txBody>
+        </p:sp>
+        <p:sp>
+          <p:nvSpPr>
+            <p:cNvPr id="114" name="Rectangle 113"/>
+            <p:cNvSpPr/>
+            <p:nvPr/>
+          </p:nvSpPr>
+          <p:spPr>
+            <a:xfrm>
+              <a:off x="3360991" y="2972475"/>
+              <a:ext cx="457599" cy="453839"/>
+            </a:xfrm>
+            <a:prstGeom prst="rect">
+              <a:avLst/>
+            </a:prstGeom>
+            <a:solidFill>
+              <a:schemeClr val="accent1">
+                <a:lumMod val="20000"/>
+                <a:lumOff val="80000"/>
+              </a:schemeClr>
+            </a:solidFill>
+          </p:spPr>
+          <p:style>
+            <a:lnRef idx="2">
+              <a:schemeClr val="accent1">
+                <a:shade val="50000"/>
+              </a:schemeClr>
+            </a:lnRef>
+            <a:fillRef idx="1">
+              <a:schemeClr val="accent1"/>
+            </a:fillRef>
+            <a:effectRef idx="0">
+              <a:schemeClr val="accent1"/>
+            </a:effectRef>
+            <a:fontRef idx="minor">
+              <a:schemeClr val="lt1"/>
+            </a:fontRef>
+          </p:style>
+          <p:txBody>
+            <a:bodyPr rtlCol="0" anchor="ctr"/>
+            <a:lstStyle/>
+            <a:p>
+              <a:pPr algn="ctr"/>
+              <a:endParaRPr lang="en-US"/>
+            </a:p>
+          </p:txBody>
+        </p:sp>
+        <p:sp>
+          <p:nvSpPr>
+            <p:cNvPr id="115" name="Rectangle 114"/>
+            <p:cNvSpPr/>
+            <p:nvPr/>
+          </p:nvSpPr>
+          <p:spPr>
+            <a:xfrm>
+              <a:off x="3818590" y="2972475"/>
+              <a:ext cx="457599" cy="453839"/>
+            </a:xfrm>
+            <a:prstGeom prst="rect">
+              <a:avLst/>
+            </a:prstGeom>
+            <a:solidFill>
+              <a:schemeClr val="accent1">
+                <a:lumMod val="20000"/>
+                <a:lumOff val="80000"/>
+              </a:schemeClr>
+            </a:solidFill>
+          </p:spPr>
+          <p:style>
+            <a:lnRef idx="2">
+              <a:schemeClr val="accent1">
+                <a:shade val="50000"/>
+              </a:schemeClr>
+            </a:lnRef>
+            <a:fillRef idx="1">
+              <a:schemeClr val="accent1"/>
+            </a:fillRef>
+            <a:effectRef idx="0">
+              <a:schemeClr val="accent1"/>
+            </a:effectRef>
+            <a:fontRef idx="minor">
+              <a:schemeClr val="lt1"/>
+            </a:fontRef>
+          </p:style>
+          <p:txBody>
+            <a:bodyPr rtlCol="0" anchor="ctr"/>
+            <a:lstStyle/>
+            <a:p>
+              <a:pPr algn="ctr"/>
+              <a:endParaRPr lang="en-US"/>
+            </a:p>
+          </p:txBody>
+        </p:sp>
+        <p:sp>
+          <p:nvSpPr>
+            <p:cNvPr id="116" name="Rectangle 115"/>
+            <p:cNvSpPr/>
+            <p:nvPr/>
+          </p:nvSpPr>
+          <p:spPr>
+            <a:xfrm>
+              <a:off x="3360991" y="3426314"/>
+              <a:ext cx="457599" cy="453839"/>
+            </a:xfrm>
+            <a:prstGeom prst="rect">
+              <a:avLst/>
+            </a:prstGeom>
+            <a:solidFill>
+              <a:schemeClr val="accent1">
+                <a:lumMod val="20000"/>
+                <a:lumOff val="80000"/>
+              </a:schemeClr>
+            </a:solidFill>
+          </p:spPr>
+          <p:style>
+            <a:lnRef idx="2">
+              <a:schemeClr val="accent1">
+                <a:shade val="50000"/>
+              </a:schemeClr>
+            </a:lnRef>
+            <a:fillRef idx="1">
+              <a:schemeClr val="accent1"/>
+            </a:fillRef>
+            <a:effectRef idx="0">
+              <a:schemeClr val="accent1"/>
+            </a:effectRef>
+            <a:fontRef idx="minor">
+              <a:schemeClr val="lt1"/>
+            </a:fontRef>
+          </p:style>
+          <p:txBody>
+            <a:bodyPr rtlCol="0" anchor="ctr"/>
+            <a:lstStyle/>
+            <a:p>
+              <a:pPr algn="ctr"/>
+              <a:endParaRPr lang="en-US"/>
+            </a:p>
+          </p:txBody>
+        </p:sp>
+        <p:sp>
+          <p:nvSpPr>
+            <p:cNvPr id="117" name="Rectangle 116"/>
+            <p:cNvSpPr/>
+            <p:nvPr/>
+          </p:nvSpPr>
+          <p:spPr>
+            <a:xfrm>
+              <a:off x="3818590" y="3426314"/>
+              <a:ext cx="457599" cy="453839"/>
+            </a:xfrm>
+            <a:prstGeom prst="rect">
+              <a:avLst/>
+            </a:prstGeom>
+            <a:solidFill>
+              <a:schemeClr val="accent1">
+                <a:lumMod val="20000"/>
+                <a:lumOff val="80000"/>
+              </a:schemeClr>
+            </a:solidFill>
+          </p:spPr>
+          <p:style>
+            <a:lnRef idx="2">
+              <a:schemeClr val="accent1">
+                <a:shade val="50000"/>
+              </a:schemeClr>
+            </a:lnRef>
+            <a:fillRef idx="1">
+              <a:schemeClr val="accent1"/>
+            </a:fillRef>
+            <a:effectRef idx="0">
+              <a:schemeClr val="accent1"/>
+            </a:effectRef>
+            <a:fontRef idx="minor">
+              <a:schemeClr val="lt1"/>
+            </a:fontRef>
+          </p:style>
+          <p:txBody>
+            <a:bodyPr rtlCol="0" anchor="ctr"/>
+            <a:lstStyle/>
+            <a:p>
+              <a:pPr algn="ctr"/>
+              <a:endParaRPr lang="en-US"/>
+            </a:p>
+          </p:txBody>
+        </p:sp>
+        <p:sp>
+          <p:nvSpPr>
+            <p:cNvPr id="118" name="Rectangle 117"/>
+            <p:cNvSpPr/>
+            <p:nvPr/>
+          </p:nvSpPr>
+          <p:spPr>
+            <a:xfrm>
+              <a:off x="3817483" y="2518634"/>
+              <a:ext cx="457599" cy="453839"/>
+            </a:xfrm>
+            <a:prstGeom prst="rect">
+              <a:avLst/>
+            </a:prstGeom>
+            <a:solidFill>
+              <a:schemeClr val="accent6"/>
+            </a:solidFill>
+          </p:spPr>
+          <p:style>
+            <a:lnRef idx="2">
+              <a:schemeClr val="accent1">
+                <a:shade val="50000"/>
+              </a:schemeClr>
+            </a:lnRef>
+            <a:fillRef idx="1">
+              <a:schemeClr val="accent1"/>
+            </a:fillRef>
+            <a:effectRef idx="0">
+              <a:schemeClr val="accent1"/>
+            </a:effectRef>
+            <a:fontRef idx="minor">
+              <a:schemeClr val="lt1"/>
+            </a:fontRef>
+          </p:style>
+          <p:txBody>
+            <a:bodyPr rtlCol="0" anchor="ctr"/>
+            <a:lstStyle/>
+            <a:p>
+              <a:pPr algn="ctr"/>
+              <a:endParaRPr lang="en-US"/>
+            </a:p>
+          </p:txBody>
+        </p:sp>
+        <p:sp>
+          <p:nvSpPr>
+            <p:cNvPr id="119" name="Rectangle 118"/>
+            <p:cNvSpPr/>
+            <p:nvPr/>
+          </p:nvSpPr>
+          <p:spPr>
+            <a:xfrm>
+              <a:off x="3361630" y="2518634"/>
+              <a:ext cx="457599" cy="453839"/>
+            </a:xfrm>
+            <a:prstGeom prst="rect">
+              <a:avLst/>
+            </a:prstGeom>
+            <a:solidFill>
+              <a:schemeClr val="accent6"/>
+            </a:solidFill>
+          </p:spPr>
+          <p:style>
+            <a:lnRef idx="2">
+              <a:schemeClr val="accent1">
+                <a:shade val="50000"/>
+              </a:schemeClr>
+            </a:lnRef>
+            <a:fillRef idx="1">
+              <a:schemeClr val="accent1"/>
+            </a:fillRef>
+            <a:effectRef idx="0">
+              <a:schemeClr val="accent1"/>
+            </a:effectRef>
+            <a:fontRef idx="minor">
+              <a:schemeClr val="lt1"/>
+            </a:fontRef>
+          </p:style>
+          <p:txBody>
+            <a:bodyPr rtlCol="0" anchor="ctr"/>
+            <a:lstStyle/>
+            <a:p>
+              <a:pPr algn="ctr"/>
+              <a:endParaRPr lang="en-US" sz="900" dirty="0">
+                <a:effectLst>
+                  <a:outerShdw blurRad="38100" dist="38100" dir="2700000" algn="tl">
+                    <a:srgbClr val="000000">
+                      <a:alpha val="43137"/>
+                    </a:srgbClr>
+                  </a:outerShdw>
+                </a:effectLst>
+              </a:endParaRPr>
+            </a:p>
+          </p:txBody>
+        </p:sp>
+        <p:sp>
+          <p:nvSpPr>
+            <p:cNvPr id="120" name="Rectangle 119"/>
+            <p:cNvSpPr/>
+            <p:nvPr/>
+          </p:nvSpPr>
+          <p:spPr>
+            <a:xfrm>
+              <a:off x="2903759" y="2064797"/>
+              <a:ext cx="457599" cy="453839"/>
+            </a:xfrm>
+            <a:prstGeom prst="rect">
+              <a:avLst/>
+            </a:prstGeom>
+            <a:solidFill>
+              <a:schemeClr val="accent1">
+                <a:lumMod val="20000"/>
+                <a:lumOff val="80000"/>
+              </a:schemeClr>
+            </a:solidFill>
+          </p:spPr>
+          <p:style>
+            <a:lnRef idx="2">
+              <a:schemeClr val="accent1">
+                <a:shade val="50000"/>
+              </a:schemeClr>
+            </a:lnRef>
+            <a:fillRef idx="1">
+              <a:schemeClr val="accent1"/>
+            </a:fillRef>
+            <a:effectRef idx="0">
+              <a:schemeClr val="accent1"/>
+            </a:effectRef>
+            <a:fontRef idx="minor">
+              <a:schemeClr val="lt1"/>
+            </a:fontRef>
+          </p:style>
+          <p:txBody>
+            <a:bodyPr rtlCol="0" anchor="ctr"/>
+            <a:lstStyle/>
+            <a:p>
+              <a:pPr algn="ctr"/>
+              <a:endParaRPr lang="en-US"/>
+            </a:p>
+          </p:txBody>
+        </p:sp>
+        <p:sp>
+          <p:nvSpPr>
+            <p:cNvPr id="121" name="Rectangle 120"/>
+            <p:cNvSpPr/>
+            <p:nvPr/>
+          </p:nvSpPr>
+          <p:spPr>
+            <a:xfrm>
+              <a:off x="2903759" y="2518636"/>
+              <a:ext cx="457599" cy="453839"/>
+            </a:xfrm>
+            <a:prstGeom prst="rect">
+              <a:avLst/>
+            </a:prstGeom>
+            <a:solidFill>
+              <a:schemeClr val="accent6"/>
+            </a:solidFill>
+          </p:spPr>
+          <p:style>
+            <a:lnRef idx="2">
+              <a:schemeClr val="accent1">
+                <a:shade val="50000"/>
+              </a:schemeClr>
+            </a:lnRef>
+            <a:fillRef idx="1">
+              <a:schemeClr val="accent1"/>
+            </a:fillRef>
+            <a:effectRef idx="0">
+              <a:schemeClr val="accent1"/>
+            </a:effectRef>
+            <a:fontRef idx="minor">
+              <a:schemeClr val="lt1"/>
+            </a:fontRef>
+          </p:style>
+          <p:txBody>
+            <a:bodyPr rtlCol="0" anchor="ctr"/>
+            <a:lstStyle/>
+            <a:p>
+              <a:pPr algn="ctr"/>
+              <a:endParaRPr lang="en-US"/>
+            </a:p>
+          </p:txBody>
+        </p:sp>
+        <p:sp>
+          <p:nvSpPr>
+            <p:cNvPr id="122" name="Rectangle 121"/>
+            <p:cNvSpPr/>
+            <p:nvPr/>
+          </p:nvSpPr>
+          <p:spPr>
+            <a:xfrm>
+              <a:off x="2903759" y="2972475"/>
+              <a:ext cx="457599" cy="453839"/>
+            </a:xfrm>
+            <a:prstGeom prst="rect">
+              <a:avLst/>
+            </a:prstGeom>
+            <a:solidFill>
+              <a:schemeClr val="accent1">
+                <a:lumMod val="20000"/>
+                <a:lumOff val="80000"/>
+              </a:schemeClr>
+            </a:solidFill>
+          </p:spPr>
+          <p:style>
+            <a:lnRef idx="2">
+              <a:schemeClr val="accent1">
+                <a:shade val="50000"/>
+              </a:schemeClr>
+            </a:lnRef>
+            <a:fillRef idx="1">
+              <a:schemeClr val="accent1"/>
+            </a:fillRef>
+            <a:effectRef idx="0">
+              <a:schemeClr val="accent1"/>
+            </a:effectRef>
+            <a:fontRef idx="minor">
+              <a:schemeClr val="lt1"/>
+            </a:fontRef>
+          </p:style>
+          <p:txBody>
+            <a:bodyPr rtlCol="0" anchor="ctr"/>
+            <a:lstStyle/>
+            <a:p>
+              <a:pPr algn="ctr"/>
+              <a:endParaRPr lang="en-US"/>
+            </a:p>
+          </p:txBody>
+        </p:sp>
+        <p:sp>
+          <p:nvSpPr>
+            <p:cNvPr id="123" name="Rectangle 122"/>
+            <p:cNvSpPr/>
+            <p:nvPr/>
+          </p:nvSpPr>
+          <p:spPr>
+            <a:xfrm>
+              <a:off x="2903759" y="3426314"/>
+              <a:ext cx="457599" cy="453839"/>
+            </a:xfrm>
+            <a:prstGeom prst="rect">
+              <a:avLst/>
+            </a:prstGeom>
+            <a:solidFill>
+              <a:schemeClr val="accent1">
+                <a:lumMod val="20000"/>
+                <a:lumOff val="80000"/>
+              </a:schemeClr>
+            </a:solidFill>
+          </p:spPr>
+          <p:style>
+            <a:lnRef idx="2">
+              <a:schemeClr val="accent1">
+                <a:shade val="50000"/>
+              </a:schemeClr>
+            </a:lnRef>
+            <a:fillRef idx="1">
+              <a:schemeClr val="accent1"/>
+            </a:fillRef>
+            <a:effectRef idx="0">
+              <a:schemeClr val="accent1"/>
+            </a:effectRef>
+            <a:fontRef idx="minor">
+              <a:schemeClr val="lt1"/>
+            </a:fontRef>
+          </p:style>
+          <p:txBody>
+            <a:bodyPr rtlCol="0" anchor="ctr"/>
+            <a:lstStyle/>
+            <a:p>
+              <a:pPr algn="ctr"/>
+              <a:endParaRPr lang="en-US"/>
+            </a:p>
+          </p:txBody>
+        </p:sp>
+        <p:sp>
+          <p:nvSpPr>
+            <p:cNvPr id="124" name="Rectangle 123"/>
+            <p:cNvSpPr/>
+            <p:nvPr/>
+          </p:nvSpPr>
+          <p:spPr>
+            <a:xfrm>
+              <a:off x="4275547" y="3880153"/>
+              <a:ext cx="457599" cy="453839"/>
+            </a:xfrm>
+            <a:prstGeom prst="rect">
+              <a:avLst/>
+            </a:prstGeom>
+            <a:solidFill>
+              <a:schemeClr val="accent1">
+                <a:lumMod val="20000"/>
+                <a:lumOff val="80000"/>
+              </a:schemeClr>
+            </a:solidFill>
+          </p:spPr>
+          <p:style>
+            <a:lnRef idx="2">
+              <a:schemeClr val="accent1">
+                <a:shade val="50000"/>
+              </a:schemeClr>
+            </a:lnRef>
+            <a:fillRef idx="1">
+              <a:schemeClr val="accent1"/>
+            </a:fillRef>
+            <a:effectRef idx="0">
+              <a:schemeClr val="accent1"/>
+            </a:effectRef>
+            <a:fontRef idx="minor">
+              <a:schemeClr val="lt1"/>
+            </a:fontRef>
+          </p:style>
+          <p:txBody>
+            <a:bodyPr rtlCol="0" anchor="ctr"/>
+            <a:lstStyle/>
+            <a:p>
+              <a:pPr algn="ctr"/>
+              <a:endParaRPr lang="en-US"/>
+            </a:p>
+          </p:txBody>
+        </p:sp>
+        <p:sp>
+          <p:nvSpPr>
+            <p:cNvPr id="125" name="Rectangle 124"/>
+            <p:cNvSpPr/>
+            <p:nvPr/>
+          </p:nvSpPr>
+          <p:spPr>
+            <a:xfrm>
+              <a:off x="4733146" y="3880153"/>
+              <a:ext cx="457599" cy="453839"/>
+            </a:xfrm>
+            <a:prstGeom prst="rect">
+              <a:avLst/>
+            </a:prstGeom>
+            <a:solidFill>
+              <a:schemeClr val="accent1">
+                <a:lumMod val="20000"/>
+                <a:lumOff val="80000"/>
+              </a:schemeClr>
+            </a:solidFill>
+          </p:spPr>
+          <p:style>
+            <a:lnRef idx="2">
+              <a:schemeClr val="accent1">
+                <a:shade val="50000"/>
+              </a:schemeClr>
+            </a:lnRef>
+            <a:fillRef idx="1">
+              <a:schemeClr val="accent1"/>
+            </a:fillRef>
+            <a:effectRef idx="0">
+              <a:schemeClr val="accent1"/>
+            </a:effectRef>
+            <a:fontRef idx="minor">
+              <a:schemeClr val="lt1"/>
+            </a:fontRef>
+          </p:style>
+          <p:txBody>
+            <a:bodyPr rtlCol="0" anchor="ctr"/>
+            <a:lstStyle/>
+            <a:p>
+              <a:pPr algn="ctr"/>
+              <a:endParaRPr lang="en-US"/>
+            </a:p>
+          </p:txBody>
+        </p:sp>
+        <p:sp>
+          <p:nvSpPr>
+            <p:cNvPr id="126" name="Rectangle 125"/>
+            <p:cNvSpPr/>
+            <p:nvPr/>
+          </p:nvSpPr>
+          <p:spPr>
+            <a:xfrm>
+              <a:off x="3360991" y="3880153"/>
+              <a:ext cx="457599" cy="453839"/>
+            </a:xfrm>
+            <a:prstGeom prst="rect">
+              <a:avLst/>
+            </a:prstGeom>
+            <a:solidFill>
+              <a:schemeClr val="accent1">
+                <a:lumMod val="20000"/>
+                <a:lumOff val="80000"/>
+              </a:schemeClr>
+            </a:solidFill>
+          </p:spPr>
+          <p:style>
+            <a:lnRef idx="2">
+              <a:schemeClr val="accent1">
+                <a:shade val="50000"/>
+              </a:schemeClr>
+            </a:lnRef>
+            <a:fillRef idx="1">
+              <a:schemeClr val="accent1"/>
+            </a:fillRef>
+            <a:effectRef idx="0">
+              <a:schemeClr val="accent1"/>
+            </a:effectRef>
+            <a:fontRef idx="minor">
+              <a:schemeClr val="lt1"/>
+            </a:fontRef>
+          </p:style>
+          <p:txBody>
+            <a:bodyPr rtlCol="0" anchor="ctr"/>
+            <a:lstStyle/>
+            <a:p>
+              <a:pPr algn="ctr"/>
+              <a:endParaRPr lang="en-US"/>
+            </a:p>
+          </p:txBody>
+        </p:sp>
+        <p:sp>
+          <p:nvSpPr>
+            <p:cNvPr id="127" name="Rectangle 126"/>
+            <p:cNvSpPr/>
+            <p:nvPr/>
+          </p:nvSpPr>
+          <p:spPr>
+            <a:xfrm>
+              <a:off x="3818590" y="3880153"/>
+              <a:ext cx="457599" cy="453839"/>
+            </a:xfrm>
+            <a:prstGeom prst="rect">
+              <a:avLst/>
+            </a:prstGeom>
+            <a:solidFill>
+              <a:schemeClr val="accent1">
+                <a:lumMod val="20000"/>
+                <a:lumOff val="80000"/>
+              </a:schemeClr>
+            </a:solidFill>
+          </p:spPr>
+          <p:style>
+            <a:lnRef idx="2">
+              <a:schemeClr val="accent1">
+                <a:shade val="50000"/>
+              </a:schemeClr>
+            </a:lnRef>
+            <a:fillRef idx="1">
+              <a:schemeClr val="accent1"/>
+            </a:fillRef>
+            <a:effectRef idx="0">
+              <a:schemeClr val="accent1"/>
+            </a:effectRef>
+            <a:fontRef idx="minor">
+              <a:schemeClr val="lt1"/>
+            </a:fontRef>
+          </p:style>
+          <p:txBody>
+            <a:bodyPr rtlCol="0" anchor="ctr"/>
+            <a:lstStyle/>
+            <a:p>
+              <a:pPr algn="ctr"/>
+              <a:endParaRPr lang="en-US"/>
+            </a:p>
+          </p:txBody>
+        </p:sp>
+        <p:sp>
+          <p:nvSpPr>
+            <p:cNvPr id="128" name="Rectangle 127"/>
+            <p:cNvSpPr/>
+            <p:nvPr/>
+          </p:nvSpPr>
+          <p:spPr>
+            <a:xfrm>
+              <a:off x="2903759" y="3880153"/>
+              <a:ext cx="457599" cy="453839"/>
+            </a:xfrm>
+            <a:prstGeom prst="rect">
+              <a:avLst/>
+            </a:prstGeom>
+            <a:solidFill>
+              <a:schemeClr val="accent1">
+                <a:lumMod val="20000"/>
+                <a:lumOff val="80000"/>
+              </a:schemeClr>
+            </a:solidFill>
+          </p:spPr>
+          <p:style>
+            <a:lnRef idx="2">
+              <a:schemeClr val="accent1">
+                <a:shade val="50000"/>
+              </a:schemeClr>
+            </a:lnRef>
+            <a:fillRef idx="1">
+              <a:schemeClr val="accent1"/>
+            </a:fillRef>
+            <a:effectRef idx="0">
+              <a:schemeClr val="accent1"/>
+            </a:effectRef>
+            <a:fontRef idx="minor">
+              <a:schemeClr val="lt1"/>
+            </a:fontRef>
+          </p:style>
+          <p:txBody>
+            <a:bodyPr rtlCol="0" anchor="ctr"/>
+            <a:lstStyle/>
+            <a:p>
+              <a:pPr algn="ctr"/>
+              <a:endParaRPr lang="en-US"/>
+            </a:p>
+          </p:txBody>
+        </p:sp>
+        <p:sp>
+          <p:nvSpPr>
+            <p:cNvPr id="129" name="Rectangle 128"/>
+            <p:cNvSpPr/>
+            <p:nvPr/>
+          </p:nvSpPr>
+          <p:spPr>
+            <a:xfrm>
+              <a:off x="8433506" y="2518634"/>
+              <a:ext cx="457599" cy="453839"/>
+            </a:xfrm>
+            <a:prstGeom prst="rect">
+              <a:avLst/>
+            </a:prstGeom>
+            <a:solidFill>
+              <a:schemeClr val="accent6"/>
+            </a:solidFill>
+          </p:spPr>
+          <p:style>
+            <a:lnRef idx="2">
+              <a:schemeClr val="accent1">
+                <a:shade val="50000"/>
+              </a:schemeClr>
+            </a:lnRef>
+            <a:fillRef idx="1">
+              <a:schemeClr val="accent1"/>
+            </a:fillRef>
+            <a:effectRef idx="0">
+              <a:schemeClr val="accent1"/>
+            </a:effectRef>
+            <a:fontRef idx="minor">
+              <a:schemeClr val="lt1"/>
+            </a:fontRef>
+          </p:style>
+          <p:txBody>
+            <a:bodyPr rtlCol="0" anchor="ctr"/>
+            <a:lstStyle/>
+            <a:p>
+              <a:pPr algn="ctr"/>
+              <a:endParaRPr lang="en-US"/>
+            </a:p>
+          </p:txBody>
+        </p:sp>
+        <mc:AlternateContent xmlns:mc="http://schemas.openxmlformats.org/markup-compatibility/2006">
+          <mc:Choice xmlns:a14="http://schemas.microsoft.com/office/drawing/2010/main" Requires="a14">
+            <p:sp>
+              <p:nvSpPr>
+                <p:cNvPr id="130" name="Rectangle 129"/>
+                <p:cNvSpPr/>
+                <p:nvPr/>
+              </p:nvSpPr>
+              <p:spPr>
+                <a:xfrm>
+                  <a:off x="2852946" y="1131309"/>
+                  <a:ext cx="2528812" cy="872837"/>
+                </a:xfrm>
+                <a:prstGeom prst="rect">
+                  <a:avLst/>
+                </a:prstGeom>
+                <a:noFill/>
+                <a:ln>
+                  <a:noFill/>
+                </a:ln>
+              </p:spPr>
+              <p:style>
+                <a:lnRef idx="2">
+                  <a:schemeClr val="accent1">
+                    <a:shade val="50000"/>
+                  </a:schemeClr>
+                </a:lnRef>
+                <a:fillRef idx="1">
+                  <a:schemeClr val="accent1"/>
+                </a:fillRef>
+                <a:effectRef idx="0">
+                  <a:schemeClr val="accent1"/>
+                </a:effectRef>
+                <a:fontRef idx="minor">
+                  <a:schemeClr val="lt1"/>
+                </a:fontRef>
+              </p:style>
+              <p:txBody>
+                <a:bodyPr rtlCol="0" anchor="ctr"/>
+                <a:lstStyle/>
+                <a:p>
+                  <a:pPr algn="ctr"/>
+                  <a14:m>
+                    <m:oMathPara xmlns:m="http://schemas.openxmlformats.org/officeDocument/2006/math">
+                      <m:oMathParaPr>
+                        <m:jc m:val="centerGroup"/>
+                      </m:oMathParaPr>
+                      <m:oMath xmlns:m="http://schemas.openxmlformats.org/officeDocument/2006/math">
+                        <m:sSub>
+                          <m:sSubPr>
+                            <m:ctrlPr>
+                              <a:rPr lang="en-US" b="0" i="1" smtClean="0">
+                                <a:solidFill>
+                                  <a:schemeClr val="tx1"/>
+                                </a:solidFill>
+                                <a:latin typeface="Cambria Math" panose="02040503050406030204" pitchFamily="18" charset="0"/>
+                              </a:rPr>
+                            </m:ctrlPr>
+                          </m:sSubPr>
+                          <m:e>
+                            <m:r>
+                              <a:rPr lang="en-US" b="0" i="1" smtClean="0">
+                                <a:solidFill>
+                                  <a:schemeClr val="tx1"/>
+                                </a:solidFill>
+                                <a:latin typeface="Cambria Math" panose="02040503050406030204" pitchFamily="18" charset="0"/>
+                              </a:rPr>
+                              <m:t>𝑇</m:t>
+                            </m:r>
+                          </m:e>
+                          <m:sub>
+                            <m:r>
+                              <a:rPr lang="en-US" b="0" i="1" smtClean="0">
+                                <a:solidFill>
+                                  <a:schemeClr val="tx1"/>
+                                </a:solidFill>
+                                <a:latin typeface="Cambria Math" panose="02040503050406030204" pitchFamily="18" charset="0"/>
+                              </a:rPr>
+                              <m:t>𝑚</m:t>
+                            </m:r>
+                            <m:r>
+                              <a:rPr lang="en-US" b="0" i="1" smtClean="0">
+                                <a:solidFill>
+                                  <a:schemeClr val="tx1"/>
+                                </a:solidFill>
+                                <a:latin typeface="Cambria Math" panose="02040503050406030204" pitchFamily="18" charset="0"/>
+                              </a:rPr>
+                              <m:t>×</m:t>
+                            </m:r>
+                            <m:r>
+                              <a:rPr lang="en-US" b="0" i="1" smtClean="0">
+                                <a:solidFill>
+                                  <a:schemeClr val="tx1"/>
+                                </a:solidFill>
+                                <a:latin typeface="Cambria Math" panose="02040503050406030204" pitchFamily="18" charset="0"/>
+                              </a:rPr>
+                              <m:t>𝑚</m:t>
+                            </m:r>
+                          </m:sub>
+                        </m:sSub>
+                      </m:oMath>
+                    </m:oMathPara>
+                  </a14:m>
+                  <a:endParaRPr lang="en-US" dirty="0" smtClean="0">
+                    <a:solidFill>
+                      <a:schemeClr val="tx1"/>
+                    </a:solidFill>
+                  </a:endParaRPr>
+                </a:p>
+                <a:p>
+                  <a:pPr algn="ctr"/>
+                  <a:r>
+                    <a:rPr lang="en-US" dirty="0" smtClean="0">
+                      <a:solidFill>
+                        <a:schemeClr val="tx1"/>
+                      </a:solidFill>
+                    </a:rPr>
+                    <a:t>Base-state to </a:t>
+                  </a:r>
+                  <a:r>
+                    <a:rPr lang="en-US" dirty="0">
+                      <a:solidFill>
+                        <a:schemeClr val="tx1"/>
+                      </a:solidFill>
+                    </a:rPr>
+                    <a:t>b</a:t>
+                  </a:r>
+                  <a:r>
+                    <a:rPr lang="en-US" dirty="0" smtClean="0">
+                      <a:solidFill>
+                        <a:schemeClr val="tx1"/>
+                      </a:solidFill>
+                    </a:rPr>
+                    <a:t>ase-state transition matrix</a:t>
+                  </a:r>
+                  <a:endParaRPr lang="en-US" dirty="0">
+                    <a:solidFill>
+                      <a:schemeClr val="tx1"/>
+                    </a:solidFill>
+                  </a:endParaRPr>
+                </a:p>
+              </p:txBody>
+            </p:sp>
+          </mc:Choice>
+          <mc:Fallback>
+            <p:sp>
+              <p:nvSpPr>
+                <p:cNvPr id="130" name="Rectangle 129"/>
+                <p:cNvSpPr>
+                  <a:spLocks noRot="1" noChangeAspect="1" noMove="1" noResize="1" noEditPoints="1" noAdjustHandles="1" noChangeArrowheads="1" noChangeShapeType="1" noTextEdit="1"/>
+                </p:cNvSpPr>
+                <p:nvPr/>
+              </p:nvSpPr>
+              <p:spPr>
+                <a:xfrm>
+                  <a:off x="2852946" y="1131309"/>
+                  <a:ext cx="2528812" cy="872837"/>
+                </a:xfrm>
+                <a:prstGeom prst="rect">
+                  <a:avLst/>
+                </a:prstGeom>
+                <a:blipFill rotWithShape="0">
+                  <a:blip r:embed="rId2"/>
+                  <a:stretch>
+                    <a:fillRect r="-1446" b="-13194"/>
+                  </a:stretch>
+                </a:blipFill>
+                <a:ln>
+                  <a:noFill/>
+                </a:ln>
+              </p:spPr>
+              <p:txBody>
+                <a:bodyPr/>
+                <a:lstStyle/>
+                <a:p>
+                  <a:r>
+                    <a:rPr lang="en-US">
+                      <a:noFill/>
+                    </a:rPr>
+                    <a:t> </a:t>
+                  </a:r>
+                </a:p>
+              </p:txBody>
+            </p:sp>
+          </mc:Fallback>
+        </mc:AlternateContent>
+        <mc:AlternateContent xmlns:mc="http://schemas.openxmlformats.org/markup-compatibility/2006">
+          <mc:Choice xmlns:a14="http://schemas.microsoft.com/office/drawing/2010/main" Requires="a14">
+            <p:sp>
+              <p:nvSpPr>
+                <p:cNvPr id="132" name="Rectangle 131"/>
+                <p:cNvSpPr/>
+                <p:nvPr/>
+              </p:nvSpPr>
+              <p:spPr>
+                <a:xfrm>
+                  <a:off x="6113867" y="1191534"/>
+                  <a:ext cx="2518280" cy="923637"/>
+                </a:xfrm>
+                <a:prstGeom prst="rect">
+                  <a:avLst/>
+                </a:prstGeom>
+                <a:noFill/>
+                <a:ln>
+                  <a:noFill/>
+                </a:ln>
+              </p:spPr>
+              <p:style>
+                <a:lnRef idx="2">
+                  <a:schemeClr val="accent1">
+                    <a:shade val="50000"/>
+                  </a:schemeClr>
+                </a:lnRef>
+                <a:fillRef idx="1">
+                  <a:schemeClr val="accent1"/>
+                </a:fillRef>
+                <a:effectRef idx="0">
+                  <a:schemeClr val="accent1"/>
+                </a:effectRef>
+                <a:fontRef idx="minor">
+                  <a:schemeClr val="lt1"/>
+                </a:fontRef>
+              </p:style>
+              <p:txBody>
+                <a:bodyPr rtlCol="0" anchor="ctr"/>
+                <a:lstStyle/>
+                <a:p>
+                  <a:pPr algn="ctr"/>
+                  <a14:m>
+                    <m:oMathPara xmlns:m="http://schemas.openxmlformats.org/officeDocument/2006/math">
+                      <m:oMathParaPr>
+                        <m:jc m:val="centerGroup"/>
+                      </m:oMathParaPr>
+                      <m:oMath xmlns:m="http://schemas.openxmlformats.org/officeDocument/2006/math">
+                        <m:sSub>
+                          <m:sSubPr>
+                            <m:ctrlPr>
+                              <a:rPr lang="en-US" b="0" i="1" smtClean="0">
+                                <a:solidFill>
+                                  <a:schemeClr val="tx1"/>
+                                </a:solidFill>
+                                <a:latin typeface="Cambria Math" panose="02040503050406030204" pitchFamily="18" charset="0"/>
+                              </a:rPr>
+                            </m:ctrlPr>
+                          </m:sSubPr>
+                          <m:e>
+                            <m:r>
+                              <a:rPr lang="en-US" b="0" i="1" smtClean="0">
+                                <a:solidFill>
+                                  <a:schemeClr val="tx1"/>
+                                </a:solidFill>
+                                <a:latin typeface="Cambria Math" panose="02040503050406030204" pitchFamily="18" charset="0"/>
+                              </a:rPr>
+                              <m:t>𝐺</m:t>
+                            </m:r>
+                          </m:e>
+                          <m:sub>
+                            <m:r>
+                              <a:rPr lang="en-US" b="0" i="1" smtClean="0">
+                                <a:solidFill>
+                                  <a:schemeClr val="tx1"/>
+                                </a:solidFill>
+                                <a:latin typeface="Cambria Math" panose="02040503050406030204" pitchFamily="18" charset="0"/>
+                              </a:rPr>
+                              <m:t>𝑚</m:t>
+                            </m:r>
+                            <m:r>
+                              <a:rPr lang="en-US" b="0" i="1" smtClean="0">
+                                <a:solidFill>
+                                  <a:schemeClr val="tx1"/>
+                                </a:solidFill>
+                                <a:latin typeface="Cambria Math" panose="02040503050406030204" pitchFamily="18" charset="0"/>
+                              </a:rPr>
+                              <m:t>×</m:t>
+                            </m:r>
+                            <m:r>
+                              <a:rPr lang="en-US" b="0" i="1" smtClean="0">
+                                <a:solidFill>
+                                  <a:schemeClr val="tx1"/>
+                                </a:solidFill>
+                                <a:latin typeface="Cambria Math" panose="02040503050406030204" pitchFamily="18" charset="0"/>
+                              </a:rPr>
+                              <m:t>𝑘</m:t>
+                            </m:r>
+                          </m:sub>
+                        </m:sSub>
+                      </m:oMath>
+                    </m:oMathPara>
+                  </a14:m>
+                  <a:endParaRPr lang="en-US" dirty="0" smtClean="0">
+                    <a:solidFill>
+                      <a:schemeClr val="tx1"/>
+                    </a:solidFill>
+                  </a:endParaRPr>
+                </a:p>
+                <a:p>
+                  <a:pPr algn="ctr"/>
+                  <a:r>
+                    <a:rPr lang="en-US" dirty="0">
+                      <a:solidFill>
+                        <a:schemeClr val="tx1"/>
+                      </a:solidFill>
+                    </a:rPr>
+                    <a:t>Base-state </a:t>
+                  </a:r>
+                  <a:r>
+                    <a:rPr lang="en-US">
+                      <a:solidFill>
+                        <a:schemeClr val="tx1"/>
+                      </a:solidFill>
+                    </a:rPr>
+                    <a:t>to </a:t>
+                  </a:r>
+                  <a:r>
+                    <a:rPr lang="en-US" smtClean="0">
+                      <a:solidFill>
+                        <a:schemeClr val="tx1"/>
+                      </a:solidFill>
+                    </a:rPr>
+                    <a:t>sub-state </a:t>
+                  </a:r>
+                  <a:r>
+                    <a:rPr lang="en-US" dirty="0">
+                      <a:solidFill>
+                        <a:schemeClr val="tx1"/>
+                      </a:solidFill>
+                    </a:rPr>
+                    <a:t>transition matrix</a:t>
+                  </a:r>
+                </a:p>
+                <a:p>
+                  <a:pPr algn="ctr"/>
+                  <a:endParaRPr lang="en-US" dirty="0">
+                    <a:solidFill>
+                      <a:schemeClr val="tx1"/>
+                    </a:solidFill>
+                  </a:endParaRPr>
+                </a:p>
+              </p:txBody>
+            </p:sp>
+          </mc:Choice>
+          <mc:Fallback>
+            <p:sp>
+              <p:nvSpPr>
+                <p:cNvPr id="132" name="Rectangle 131"/>
+                <p:cNvSpPr>
+                  <a:spLocks noRot="1" noChangeAspect="1" noMove="1" noResize="1" noEditPoints="1" noAdjustHandles="1" noChangeArrowheads="1" noChangeShapeType="1" noTextEdit="1"/>
+                </p:cNvSpPr>
+                <p:nvPr/>
+              </p:nvSpPr>
+              <p:spPr>
+                <a:xfrm>
+                  <a:off x="6113867" y="1191534"/>
+                  <a:ext cx="2518280" cy="923637"/>
+                </a:xfrm>
+                <a:prstGeom prst="rect">
+                  <a:avLst/>
+                </a:prstGeom>
+                <a:blipFill rotWithShape="0">
+                  <a:blip r:embed="rId3"/>
+                  <a:stretch>
+                    <a:fillRect t="-7895"/>
+                  </a:stretch>
+                </a:blipFill>
+                <a:ln>
+                  <a:noFill/>
+                </a:ln>
+              </p:spPr>
+              <p:txBody>
+                <a:bodyPr/>
+                <a:lstStyle/>
+                <a:p>
+                  <a:r>
+                    <a:rPr lang="en-US">
+                      <a:noFill/>
+                    </a:rPr>
+                    <a:t> </a:t>
+                  </a:r>
+                </a:p>
+              </p:txBody>
+            </p:sp>
+          </mc:Fallback>
+        </mc:AlternateContent>
+        <mc:AlternateContent xmlns:mc="http://schemas.openxmlformats.org/markup-compatibility/2006">
+          <mc:Choice xmlns:a14="http://schemas.microsoft.com/office/drawing/2010/main" Requires="a14">
+            <p:sp>
+              <p:nvSpPr>
+                <p:cNvPr id="133" name="Rectangle 132"/>
+                <p:cNvSpPr/>
+                <p:nvPr/>
+              </p:nvSpPr>
+              <p:spPr>
+                <a:xfrm>
+                  <a:off x="9673915" y="2392469"/>
+                  <a:ext cx="2627746" cy="1260764"/>
+                </a:xfrm>
+                <a:prstGeom prst="rect">
+                  <a:avLst/>
+                </a:prstGeom>
+                <a:noFill/>
+                <a:ln>
+                  <a:noFill/>
+                </a:ln>
+              </p:spPr>
+              <p:style>
+                <a:lnRef idx="2">
+                  <a:schemeClr val="accent1">
+                    <a:shade val="50000"/>
+                  </a:schemeClr>
+                </a:lnRef>
+                <a:fillRef idx="1">
+                  <a:schemeClr val="accent1"/>
+                </a:fillRef>
+                <a:effectRef idx="0">
+                  <a:schemeClr val="accent1"/>
+                </a:effectRef>
+                <a:fontRef idx="minor">
+                  <a:schemeClr val="lt1"/>
+                </a:fontRef>
+              </p:style>
+              <p:txBody>
+                <a:bodyPr rtlCol="0" anchor="ctr"/>
+                <a:lstStyle/>
+                <a:p>
+                  <a:pPr algn="ctr"/>
+                  <a14:m>
+                    <m:oMathPara xmlns:m="http://schemas.openxmlformats.org/officeDocument/2006/math">
+                      <m:oMathParaPr>
+                        <m:jc m:val="centerGroup"/>
+                      </m:oMathParaPr>
+                      <m:oMath xmlns:m="http://schemas.openxmlformats.org/officeDocument/2006/math">
+                        <m:nary>
+                          <m:naryPr>
+                            <m:chr m:val="∑"/>
+                            <m:supHide m:val="on"/>
+                            <m:ctrlPr>
+                              <a:rPr lang="en-US" sz="1600" i="1" smtClean="0">
+                                <a:solidFill>
+                                  <a:schemeClr val="tx1"/>
+                                </a:solidFill>
+                                <a:latin typeface="Cambria Math" panose="02040503050406030204" pitchFamily="18" charset="0"/>
+                              </a:rPr>
+                            </m:ctrlPr>
+                          </m:naryPr>
+                          <m:sub>
+                            <m:r>
+                              <a:rPr lang="en-US" sz="1600" i="1">
+                                <a:solidFill>
+                                  <a:schemeClr val="tx1"/>
+                                </a:solidFill>
+                                <a:latin typeface="Cambria Math" panose="02040503050406030204" pitchFamily="18" charset="0"/>
+                              </a:rPr>
+                              <m:t>𝑖</m:t>
+                            </m:r>
+                            <m:r>
+                              <a:rPr lang="en-US" sz="1600" i="1">
+                                <a:solidFill>
+                                  <a:schemeClr val="tx1"/>
+                                </a:solidFill>
+                                <a:latin typeface="Cambria Math" panose="02040503050406030204" pitchFamily="18" charset="0"/>
+                              </a:rPr>
+                              <m:t>∈</m:t>
+                            </m:r>
+                            <m:d>
+                              <m:dPr>
+                                <m:begChr m:val="["/>
+                                <m:endChr m:val="]"/>
+                                <m:ctrlPr>
+                                  <a:rPr lang="en-US" sz="1600" i="1">
+                                    <a:solidFill>
+                                      <a:schemeClr val="tx1"/>
+                                    </a:solidFill>
+                                    <a:latin typeface="Cambria Math" panose="02040503050406030204" pitchFamily="18" charset="0"/>
+                                  </a:rPr>
+                                </m:ctrlPr>
+                              </m:dPr>
+                              <m:e>
+                                <m:r>
+                                  <a:rPr lang="en-US" sz="1600" b="0" i="1" smtClean="0">
+                                    <a:solidFill>
+                                      <a:schemeClr val="tx1"/>
+                                    </a:solidFill>
+                                    <a:latin typeface="Cambria Math" panose="02040503050406030204" pitchFamily="18" charset="0"/>
+                                  </a:rPr>
+                                  <m:t>𝑚</m:t>
+                                </m:r>
+                              </m:e>
+                            </m:d>
+                          </m:sub>
+                          <m:sup/>
+                          <m:e>
+                            <m:sSub>
+                              <m:sSubPr>
+                                <m:ctrlPr>
+                                  <a:rPr lang="en-US" sz="1600" i="1">
+                                    <a:solidFill>
+                                      <a:schemeClr val="tx1"/>
+                                    </a:solidFill>
+                                    <a:latin typeface="Cambria Math" panose="02040503050406030204" pitchFamily="18" charset="0"/>
+                                  </a:rPr>
+                                </m:ctrlPr>
+                              </m:sSubPr>
+                              <m:e>
+                                <m:r>
+                                  <a:rPr lang="en-US" sz="1600" b="0" i="1" smtClean="0">
+                                    <a:solidFill>
+                                      <a:schemeClr val="tx1"/>
+                                    </a:solidFill>
+                                    <a:latin typeface="Cambria Math" panose="02040503050406030204" pitchFamily="18" charset="0"/>
+                                  </a:rPr>
+                                  <m:t>𝑇</m:t>
+                                </m:r>
+                              </m:e>
+                              <m:sub>
+                                <m:r>
+                                  <a:rPr lang="en-US" sz="1600" i="1">
+                                    <a:solidFill>
+                                      <a:schemeClr val="tx1"/>
+                                    </a:solidFill>
+                                    <a:latin typeface="Cambria Math" panose="02040503050406030204" pitchFamily="18" charset="0"/>
+                                  </a:rPr>
+                                  <m:t>𝑗</m:t>
+                                </m:r>
+                                <m:r>
+                                  <a:rPr lang="en-US" sz="1600" i="1">
+                                    <a:solidFill>
+                                      <a:schemeClr val="tx1"/>
+                                    </a:solidFill>
+                                    <a:latin typeface="Cambria Math" panose="02040503050406030204" pitchFamily="18" charset="0"/>
+                                  </a:rPr>
+                                  <m:t>,</m:t>
+                                </m:r>
+                                <m:r>
+                                  <a:rPr lang="en-US" sz="1600" i="1">
+                                    <a:solidFill>
+                                      <a:schemeClr val="tx1"/>
+                                    </a:solidFill>
+                                    <a:latin typeface="Cambria Math" panose="02040503050406030204" pitchFamily="18" charset="0"/>
+                                  </a:rPr>
+                                  <m:t>𝑖</m:t>
+                                </m:r>
+                              </m:sub>
+                            </m:sSub>
+                          </m:e>
+                        </m:nary>
+                        <m:r>
+                          <a:rPr lang="en-US" sz="1600" b="0" i="1" smtClean="0">
+                            <a:solidFill>
+                              <a:schemeClr val="tx1"/>
+                            </a:solidFill>
+                            <a:latin typeface="Cambria Math" panose="02040503050406030204" pitchFamily="18" charset="0"/>
+                          </a:rPr>
+                          <m:t>+</m:t>
+                        </m:r>
+                        <m:nary>
+                          <m:naryPr>
+                            <m:chr m:val="∑"/>
+                            <m:supHide m:val="on"/>
+                            <m:ctrlPr>
+                              <a:rPr lang="en-US" sz="1600" i="1">
+                                <a:solidFill>
+                                  <a:schemeClr val="tx1"/>
+                                </a:solidFill>
+                                <a:latin typeface="Cambria Math" panose="02040503050406030204" pitchFamily="18" charset="0"/>
+                              </a:rPr>
+                            </m:ctrlPr>
+                          </m:naryPr>
+                          <m:sub>
+                            <m:r>
+                              <a:rPr lang="en-US" sz="1600" i="1">
+                                <a:solidFill>
+                                  <a:schemeClr val="tx1"/>
+                                </a:solidFill>
+                                <a:latin typeface="Cambria Math" panose="02040503050406030204" pitchFamily="18" charset="0"/>
+                              </a:rPr>
+                              <m:t>𝑖</m:t>
+                            </m:r>
+                            <m:r>
+                              <a:rPr lang="en-US" sz="1600" i="1">
+                                <a:solidFill>
+                                  <a:schemeClr val="tx1"/>
+                                </a:solidFill>
+                                <a:latin typeface="Cambria Math" panose="02040503050406030204" pitchFamily="18" charset="0"/>
+                              </a:rPr>
+                              <m:t>∈</m:t>
+                            </m:r>
+                            <m:d>
+                              <m:dPr>
+                                <m:begChr m:val="["/>
+                                <m:endChr m:val="]"/>
+                                <m:ctrlPr>
+                                  <a:rPr lang="en-US" sz="1600" i="1">
+                                    <a:solidFill>
+                                      <a:schemeClr val="tx1"/>
+                                    </a:solidFill>
+                                    <a:latin typeface="Cambria Math" panose="02040503050406030204" pitchFamily="18" charset="0"/>
+                                  </a:rPr>
+                                </m:ctrlPr>
+                              </m:dPr>
+                              <m:e>
+                                <m:r>
+                                  <a:rPr lang="en-US" sz="1600" i="1">
+                                    <a:solidFill>
+                                      <a:schemeClr val="tx1"/>
+                                    </a:solidFill>
+                                    <a:latin typeface="Cambria Math" panose="02040503050406030204" pitchFamily="18" charset="0"/>
+                                  </a:rPr>
+                                  <m:t>𝑘</m:t>
+                                </m:r>
+                              </m:e>
+                            </m:d>
+                          </m:sub>
+                          <m:sup/>
+                          <m:e>
+                            <m:sSub>
+                              <m:sSubPr>
+                                <m:ctrlPr>
+                                  <a:rPr lang="en-US" sz="1600" i="1">
+                                    <a:solidFill>
+                                      <a:schemeClr val="tx1"/>
+                                    </a:solidFill>
+                                    <a:latin typeface="Cambria Math" panose="02040503050406030204" pitchFamily="18" charset="0"/>
+                                  </a:rPr>
+                                </m:ctrlPr>
+                              </m:sSubPr>
+                              <m:e>
+                                <m:r>
+                                  <a:rPr lang="en-US" sz="1600" i="1">
+                                    <a:solidFill>
+                                      <a:schemeClr val="tx1"/>
+                                    </a:solidFill>
+                                    <a:latin typeface="Cambria Math" panose="02040503050406030204" pitchFamily="18" charset="0"/>
+                                  </a:rPr>
+                                  <m:t>𝐺</m:t>
+                                </m:r>
+                              </m:e>
+                              <m:sub>
+                                <m:r>
+                                  <a:rPr lang="en-US" sz="1600" i="1">
+                                    <a:solidFill>
+                                      <a:schemeClr val="tx1"/>
+                                    </a:solidFill>
+                                    <a:latin typeface="Cambria Math" panose="02040503050406030204" pitchFamily="18" charset="0"/>
+                                  </a:rPr>
+                                  <m:t>𝑗</m:t>
+                                </m:r>
+                                <m:r>
+                                  <a:rPr lang="en-US" sz="1600" i="1">
+                                    <a:solidFill>
+                                      <a:schemeClr val="tx1"/>
+                                    </a:solidFill>
+                                    <a:latin typeface="Cambria Math" panose="02040503050406030204" pitchFamily="18" charset="0"/>
+                                  </a:rPr>
+                                  <m:t>,</m:t>
+                                </m:r>
+                                <m:r>
+                                  <a:rPr lang="en-US" sz="1600" i="1">
+                                    <a:solidFill>
+                                      <a:schemeClr val="tx1"/>
+                                    </a:solidFill>
+                                    <a:latin typeface="Cambria Math" panose="02040503050406030204" pitchFamily="18" charset="0"/>
+                                  </a:rPr>
+                                  <m:t>𝑖</m:t>
+                                </m:r>
+                              </m:sub>
+                            </m:sSub>
+                          </m:e>
+                        </m:nary>
+                        <m:r>
+                          <a:rPr lang="en-US" sz="1600" b="0" i="1" smtClean="0">
+                            <a:solidFill>
+                              <a:schemeClr val="tx1"/>
+                            </a:solidFill>
+                            <a:latin typeface="Cambria Math" panose="02040503050406030204" pitchFamily="18" charset="0"/>
+                          </a:rPr>
+                          <m:t>=</m:t>
+                        </m:r>
+                        <m:r>
+                          <a:rPr lang="en-US" sz="1600" b="0" i="1" smtClean="0">
+                            <a:solidFill>
+                              <a:schemeClr val="tx1"/>
+                            </a:solidFill>
+                            <a:latin typeface="Cambria Math" panose="02040503050406030204" pitchFamily="18" charset="0"/>
+                          </a:rPr>
+                          <m:t>1</m:t>
+                        </m:r>
+                      </m:oMath>
+                    </m:oMathPara>
+                  </a14:m>
+                  <a:endParaRPr lang="en-US" sz="1600" dirty="0" smtClean="0">
+                    <a:solidFill>
+                      <a:schemeClr val="tx1"/>
+                    </a:solidFill>
+                  </a:endParaRPr>
+                </a:p>
+                <a:p>
+                  <a:pPr algn="ctr"/>
+                  <a:endParaRPr lang="en-US" sz="1600" dirty="0" smtClean="0">
+                    <a:solidFill>
+                      <a:schemeClr val="tx1"/>
+                    </a:solidFill>
+                  </a:endParaRPr>
+                </a:p>
+                <a:p>
+                  <a:pPr algn="ctr"/>
+                  <a:r>
+                    <a:rPr lang="en-US" sz="1600" dirty="0" smtClean="0">
+                      <a:solidFill>
+                        <a:schemeClr val="tx1"/>
+                      </a:solidFill>
+                    </a:rPr>
+                    <a:t>Transition probability from (j,0) to other states</a:t>
+                  </a:r>
+                  <a:endParaRPr lang="en-US" sz="1600" dirty="0">
+                    <a:solidFill>
+                      <a:schemeClr val="tx1"/>
+                    </a:solidFill>
+                  </a:endParaRPr>
+                </a:p>
+              </p:txBody>
+            </p:sp>
+          </mc:Choice>
+          <mc:Fallback>
+            <p:sp>
+              <p:nvSpPr>
+                <p:cNvPr id="133" name="Rectangle 132"/>
+                <p:cNvSpPr>
+                  <a:spLocks noRot="1" noChangeAspect="1" noMove="1" noResize="1" noEditPoints="1" noAdjustHandles="1" noChangeArrowheads="1" noChangeShapeType="1" noTextEdit="1"/>
+                </p:cNvSpPr>
+                <p:nvPr/>
+              </p:nvSpPr>
+              <p:spPr>
+                <a:xfrm>
+                  <a:off x="9673915" y="2392469"/>
+                  <a:ext cx="2627746" cy="1260764"/>
+                </a:xfrm>
+                <a:prstGeom prst="rect">
+                  <a:avLst/>
+                </a:prstGeom>
+                <a:blipFill rotWithShape="0">
+                  <a:blip r:embed="rId4"/>
+                  <a:stretch>
+                    <a:fillRect b="-13527"/>
+                  </a:stretch>
+                </a:blipFill>
+                <a:ln>
+                  <a:noFill/>
+                </a:ln>
+              </p:spPr>
+              <p:txBody>
+                <a:bodyPr/>
+                <a:lstStyle/>
+                <a:p>
+                  <a:r>
+                    <a:rPr lang="en-US">
+                      <a:noFill/>
+                    </a:rPr>
+                    <a:t> </a:t>
+                  </a:r>
+                </a:p>
+              </p:txBody>
+            </p:sp>
+          </mc:Fallback>
+        </mc:AlternateContent>
+        <p:sp>
+          <p:nvSpPr>
+            <p:cNvPr id="134" name="Rectangle 133"/>
+            <p:cNvSpPr/>
+            <p:nvPr/>
+          </p:nvSpPr>
+          <p:spPr>
+            <a:xfrm>
+              <a:off x="9348705" y="2064797"/>
+              <a:ext cx="457599" cy="453839"/>
+            </a:xfrm>
+            <a:prstGeom prst="rect">
+              <a:avLst/>
+            </a:prstGeom>
+            <a:solidFill>
+              <a:schemeClr val="accent1">
+                <a:lumMod val="40000"/>
+                <a:lumOff val="60000"/>
+              </a:schemeClr>
+            </a:solidFill>
+          </p:spPr>
+          <p:style>
+            <a:lnRef idx="2">
+              <a:schemeClr val="accent1">
+                <a:shade val="50000"/>
+              </a:schemeClr>
+            </a:lnRef>
+            <a:fillRef idx="1">
+              <a:schemeClr val="accent1"/>
+            </a:fillRef>
+            <a:effectRef idx="0">
+              <a:schemeClr val="accent1"/>
+            </a:effectRef>
+            <a:fontRef idx="minor">
+              <a:schemeClr val="lt1"/>
+            </a:fontRef>
+          </p:style>
+          <p:txBody>
+            <a:bodyPr rtlCol="0" anchor="ctr"/>
+            <a:lstStyle/>
+            <a:p>
+              <a:pPr algn="ctr"/>
+              <a:endParaRPr lang="en-US"/>
+            </a:p>
+          </p:txBody>
+        </p:sp>
+        <p:sp>
+          <p:nvSpPr>
+            <p:cNvPr id="135" name="Rectangle 134"/>
+            <p:cNvSpPr/>
+            <p:nvPr/>
+          </p:nvSpPr>
+          <p:spPr>
+            <a:xfrm>
+              <a:off x="9348705" y="2518636"/>
+              <a:ext cx="457599" cy="453839"/>
+            </a:xfrm>
+            <a:prstGeom prst="rect">
+              <a:avLst/>
+            </a:prstGeom>
+            <a:solidFill>
+              <a:schemeClr val="accent6"/>
+            </a:solidFill>
+          </p:spPr>
+          <p:style>
+            <a:lnRef idx="2">
+              <a:schemeClr val="accent1">
+                <a:shade val="50000"/>
+              </a:schemeClr>
+            </a:lnRef>
+            <a:fillRef idx="1">
+              <a:schemeClr val="accent1"/>
+            </a:fillRef>
+            <a:effectRef idx="0">
+              <a:schemeClr val="accent1"/>
+            </a:effectRef>
+            <a:fontRef idx="minor">
+              <a:schemeClr val="lt1"/>
+            </a:fontRef>
+          </p:style>
+          <p:txBody>
+            <a:bodyPr rtlCol="0" anchor="ctr"/>
+            <a:lstStyle/>
+            <a:p>
+              <a:pPr algn="ctr"/>
+              <a:endParaRPr lang="en-US"/>
+            </a:p>
+          </p:txBody>
+        </p:sp>
+        <p:sp>
+          <p:nvSpPr>
+            <p:cNvPr id="136" name="Rectangle 135"/>
+            <p:cNvSpPr/>
+            <p:nvPr/>
+          </p:nvSpPr>
+          <p:spPr>
+            <a:xfrm>
+              <a:off x="9348705" y="2972475"/>
+              <a:ext cx="457599" cy="453839"/>
+            </a:xfrm>
+            <a:prstGeom prst="rect">
+              <a:avLst/>
+            </a:prstGeom>
+            <a:solidFill>
+              <a:schemeClr val="accent1">
+                <a:lumMod val="40000"/>
+                <a:lumOff val="60000"/>
+              </a:schemeClr>
+            </a:solidFill>
+          </p:spPr>
+          <p:style>
+            <a:lnRef idx="2">
+              <a:schemeClr val="accent1">
+                <a:shade val="50000"/>
+              </a:schemeClr>
+            </a:lnRef>
+            <a:fillRef idx="1">
+              <a:schemeClr val="accent1"/>
+            </a:fillRef>
+            <a:effectRef idx="0">
+              <a:schemeClr val="accent1"/>
+            </a:effectRef>
+            <a:fontRef idx="minor">
+              <a:schemeClr val="lt1"/>
+            </a:fontRef>
+          </p:style>
+          <p:txBody>
+            <a:bodyPr rtlCol="0" anchor="ctr"/>
+            <a:lstStyle/>
+            <a:p>
+              <a:pPr algn="ctr"/>
+              <a:endParaRPr lang="en-US"/>
+            </a:p>
+          </p:txBody>
+        </p:sp>
+        <p:sp>
+          <p:nvSpPr>
+            <p:cNvPr id="137" name="Rectangle 136"/>
+            <p:cNvSpPr/>
+            <p:nvPr/>
+          </p:nvSpPr>
+          <p:spPr>
+            <a:xfrm>
+              <a:off x="9348705" y="3426314"/>
+              <a:ext cx="457599" cy="453839"/>
+            </a:xfrm>
+            <a:prstGeom prst="rect">
+              <a:avLst/>
+            </a:prstGeom>
+            <a:solidFill>
+              <a:schemeClr val="accent1">
+                <a:lumMod val="40000"/>
+                <a:lumOff val="60000"/>
+              </a:schemeClr>
+            </a:solidFill>
+          </p:spPr>
+          <p:style>
+            <a:lnRef idx="2">
+              <a:schemeClr val="accent1">
+                <a:shade val="50000"/>
+              </a:schemeClr>
+            </a:lnRef>
+            <a:fillRef idx="1">
+              <a:schemeClr val="accent1"/>
+            </a:fillRef>
+            <a:effectRef idx="0">
+              <a:schemeClr val="accent1"/>
+            </a:effectRef>
+            <a:fontRef idx="minor">
+              <a:schemeClr val="lt1"/>
+            </a:fontRef>
+          </p:style>
+          <p:txBody>
+            <a:bodyPr rtlCol="0" anchor="ctr"/>
+            <a:lstStyle/>
+            <a:p>
+              <a:pPr algn="ctr"/>
+              <a:endParaRPr lang="en-US"/>
+            </a:p>
+          </p:txBody>
+        </p:sp>
+        <p:sp>
+          <p:nvSpPr>
+            <p:cNvPr id="138" name="Rectangle 137"/>
+            <p:cNvSpPr/>
+            <p:nvPr/>
+          </p:nvSpPr>
+          <p:spPr>
+            <a:xfrm>
+              <a:off x="9348705" y="3880153"/>
+              <a:ext cx="457599" cy="453839"/>
+            </a:xfrm>
+            <a:prstGeom prst="rect">
+              <a:avLst/>
+            </a:prstGeom>
+            <a:solidFill>
+              <a:schemeClr val="accent1">
+                <a:lumMod val="40000"/>
+                <a:lumOff val="60000"/>
+              </a:schemeClr>
+            </a:solidFill>
+          </p:spPr>
+          <p:style>
+            <a:lnRef idx="2">
+              <a:schemeClr val="accent1">
+                <a:shade val="50000"/>
+              </a:schemeClr>
+            </a:lnRef>
+            <a:fillRef idx="1">
+              <a:schemeClr val="accent1"/>
+            </a:fillRef>
+            <a:effectRef idx="0">
+              <a:schemeClr val="accent1"/>
+            </a:effectRef>
+            <a:fontRef idx="minor">
+              <a:schemeClr val="lt1"/>
+            </a:fontRef>
+          </p:style>
+          <p:txBody>
+            <a:bodyPr rtlCol="0" anchor="ctr"/>
+            <a:lstStyle/>
+            <a:p>
+              <a:pPr algn="ctr"/>
+              <a:endParaRPr lang="en-US"/>
+            </a:p>
+          </p:txBody>
+        </p:sp>
+        <mc:AlternateContent xmlns:mc="http://schemas.openxmlformats.org/markup-compatibility/2006">
+          <mc:Choice xmlns:a14="http://schemas.microsoft.com/office/drawing/2010/main" Requires="a14">
+            <p:sp>
+              <p:nvSpPr>
+                <p:cNvPr id="139" name="Rectangle 138"/>
+                <p:cNvSpPr/>
+                <p:nvPr/>
+              </p:nvSpPr>
+              <p:spPr>
+                <a:xfrm>
+                  <a:off x="2561530" y="2518634"/>
+                  <a:ext cx="301651" cy="394336"/>
+                </a:xfrm>
+                <a:prstGeom prst="rect">
+                  <a:avLst/>
+                </a:prstGeom>
+                <a:noFill/>
+                <a:ln>
+                  <a:noFill/>
+                </a:ln>
+              </p:spPr>
+              <p:style>
+                <a:lnRef idx="2">
+                  <a:schemeClr val="accent1">
+                    <a:shade val="50000"/>
+                  </a:schemeClr>
+                </a:lnRef>
+                <a:fillRef idx="1">
+                  <a:schemeClr val="accent1"/>
+                </a:fillRef>
+                <a:effectRef idx="0">
+                  <a:schemeClr val="accent1"/>
+                </a:effectRef>
+                <a:fontRef idx="minor">
+                  <a:schemeClr val="lt1"/>
+                </a:fontRef>
+              </p:style>
+              <p:txBody>
+                <a:bodyPr rtlCol="0" anchor="ctr"/>
+                <a:lstStyle/>
+                <a:p>
+                  <a:pPr algn="ctr"/>
+                  <a14:m>
+                    <m:oMathPara xmlns:m="http://schemas.openxmlformats.org/officeDocument/2006/math">
+                      <m:oMathParaPr>
+                        <m:jc m:val="centerGroup"/>
+                      </m:oMathParaPr>
+                      <m:oMath xmlns:m="http://schemas.openxmlformats.org/officeDocument/2006/math">
+                        <m:r>
+                          <a:rPr lang="en-US" b="0" i="1" smtClean="0">
+                            <a:solidFill>
+                              <a:schemeClr val="tx1"/>
+                            </a:solidFill>
+                            <a:latin typeface="Cambria Math" panose="02040503050406030204" pitchFamily="18" charset="0"/>
+                          </a:rPr>
+                          <m:t>𝑗</m:t>
+                        </m:r>
+                      </m:oMath>
+                    </m:oMathPara>
+                  </a14:m>
+                  <a:endParaRPr lang="en-US" dirty="0">
+                    <a:solidFill>
+                      <a:schemeClr val="tx1"/>
+                    </a:solidFill>
+                  </a:endParaRPr>
+                </a:p>
+              </p:txBody>
+            </p:sp>
+          </mc:Choice>
+          <mc:Fallback>
+            <p:sp>
+              <p:nvSpPr>
+                <p:cNvPr id="139" name="Rectangle 138"/>
+                <p:cNvSpPr>
+                  <a:spLocks noRot="1" noChangeAspect="1" noMove="1" noResize="1" noEditPoints="1" noAdjustHandles="1" noChangeArrowheads="1" noChangeShapeType="1" noTextEdit="1"/>
+                </p:cNvSpPr>
+                <p:nvPr/>
+              </p:nvSpPr>
+              <p:spPr>
+                <a:xfrm>
+                  <a:off x="2561530" y="2518634"/>
+                  <a:ext cx="301651" cy="394336"/>
+                </a:xfrm>
+                <a:prstGeom prst="rect">
+                  <a:avLst/>
+                </a:prstGeom>
+                <a:blipFill rotWithShape="0">
+                  <a:blip r:embed="rId5"/>
+                  <a:stretch>
+                    <a:fillRect l="-8000" b="-9231"/>
+                  </a:stretch>
+                </a:blipFill>
+                <a:ln>
+                  <a:noFill/>
+                </a:ln>
+              </p:spPr>
+              <p:txBody>
+                <a:bodyPr/>
+                <a:lstStyle/>
+                <a:p>
+                  <a:r>
+                    <a:rPr lang="en-US">
+                      <a:noFill/>
+                    </a:rPr>
+                    <a:t> </a:t>
+                  </a:r>
+                </a:p>
+              </p:txBody>
+            </p:sp>
+          </mc:Fallback>
+        </mc:AlternateContent>
+      </p:grpSp>
+    </p:spTree>
+    <p:extLst>
+      <p:ext uri="{BB962C8B-B14F-4D97-AF65-F5344CB8AC3E}">
+        <p14:creationId xmlns:p14="http://schemas.microsoft.com/office/powerpoint/2010/main" val="1152675676"/>
+      </p:ext>
+    </p:extLst>
+  </p:cSld>
+  <p:clrMapOvr>
+    <a:masterClrMapping/>
+  </p:clrMapOvr>
+  <p:timing>
+    <p:tnLst>
+      <p:par>
+        <p:cTn id="1" dur="indefinite" restart="never" nodeType="tmRoot"/>
+      </p:par>
+    </p:tnLst>
+  </p:timing>
+</p:sld>
+</file>
+
+<file path=ppt/slides/slide5.xml><?xml version="1.0" encoding="utf-8"?>
 <p:sld xmlns:a="http://schemas.openxmlformats.org/drawingml/2006/main" xmlns:r="http://schemas.openxmlformats.org/officeDocument/2006/relationships" xmlns:p="http://schemas.openxmlformats.org/presentationml/2006/main">
   <p:cSld>
     <p:spTree>
@@ -12435,7 +16790,7 @@
 </p:sld>
 </file>
 
-<file path=ppt/slides/slide5.xml><?xml version="1.0" encoding="utf-8"?>
+<file path=ppt/slides/slide6.xml><?xml version="1.0" encoding="utf-8"?>
 <p:sld xmlns:a="http://schemas.openxmlformats.org/drawingml/2006/main" xmlns:r="http://schemas.openxmlformats.org/officeDocument/2006/relationships" xmlns:p="http://schemas.openxmlformats.org/presentationml/2006/main">
   <p:cSld>
     <p:spTree>
@@ -13593,7 +17948,7 @@
 </p:sld>
 </file>
 
-<file path=ppt/slides/slide6.xml><?xml version="1.0" encoding="utf-8"?>
+<file path=ppt/slides/slide7.xml><?xml version="1.0" encoding="utf-8"?>
 <p:sld xmlns:a="http://schemas.openxmlformats.org/drawingml/2006/main" xmlns:r="http://schemas.openxmlformats.org/officeDocument/2006/relationships" xmlns:p="http://schemas.openxmlformats.org/presentationml/2006/main">
   <p:cSld>
     <p:spTree>
@@ -17132,7 +21487,7 @@
 </p:sld>
 </file>
 
-<file path=ppt/slides/slide7.xml><?xml version="1.0" encoding="utf-8"?>
+<file path=ppt/slides/slide8.xml><?xml version="1.0" encoding="utf-8"?>
 <p:sld xmlns:a="http://schemas.openxmlformats.org/drawingml/2006/main" xmlns:r="http://schemas.openxmlformats.org/officeDocument/2006/relationships" xmlns:p="http://schemas.openxmlformats.org/presentationml/2006/main">
   <p:cSld>
     <p:spTree>
@@ -21402,7 +25757,7 @@
 </p:sld>
 </file>
 
-<file path=ppt/slides/slide8.xml><?xml version="1.0" encoding="utf-8"?>
+<file path=ppt/slides/slide9.xml><?xml version="1.0" encoding="utf-8"?>
 <p:sld xmlns:a="http://schemas.openxmlformats.org/drawingml/2006/main" xmlns:r="http://schemas.openxmlformats.org/officeDocument/2006/relationships" xmlns:p="http://schemas.openxmlformats.org/presentationml/2006/main">
   <p:cSld>
     <p:spTree>

</xml_diff>

<commit_message>
PWM section added script that generates PWM and other things for figure added new figure for PWM added
</commit_message>
<xml_diff>
--- a/Help/Figures.pptx
+++ b/Help/Figures.pptx
@@ -16,6 +16,9 @@
     <p:sldId id="259" r:id="rId10"/>
     <p:sldId id="262" r:id="rId11"/>
     <p:sldId id="263" r:id="rId12"/>
+    <p:sldId id="269" r:id="rId13"/>
+    <p:sldId id="271" r:id="rId14"/>
+    <p:sldId id="270" r:id="rId15"/>
   </p:sldIdLst>
   <p:sldSz cx="12192000" cy="6858000"/>
   <p:notesSz cx="6858000" cy="9144000"/>
@@ -253,7 +256,7 @@
           <a:p>
             <a:fld id="{2DC2A043-560F-4D2E-8D1E-02B02E053659}" type="datetimeFigureOut">
               <a:rPr lang="en-US" smtClean="0"/>
-              <a:t>2019-02-04</a:t>
+              <a:t>2019-02-14</a:t>
             </a:fld>
             <a:endParaRPr lang="en-US"/>
           </a:p>
@@ -423,7 +426,7 @@
           <a:p>
             <a:fld id="{2DC2A043-560F-4D2E-8D1E-02B02E053659}" type="datetimeFigureOut">
               <a:rPr lang="en-US" smtClean="0"/>
-              <a:t>2019-02-04</a:t>
+              <a:t>2019-02-14</a:t>
             </a:fld>
             <a:endParaRPr lang="en-US"/>
           </a:p>
@@ -603,7 +606,7 @@
           <a:p>
             <a:fld id="{2DC2A043-560F-4D2E-8D1E-02B02E053659}" type="datetimeFigureOut">
               <a:rPr lang="en-US" smtClean="0"/>
-              <a:t>2019-02-04</a:t>
+              <a:t>2019-02-14</a:t>
             </a:fld>
             <a:endParaRPr lang="en-US"/>
           </a:p>
@@ -773,7 +776,7 @@
           <a:p>
             <a:fld id="{2DC2A043-560F-4D2E-8D1E-02B02E053659}" type="datetimeFigureOut">
               <a:rPr lang="en-US" smtClean="0"/>
-              <a:t>2019-02-04</a:t>
+              <a:t>2019-02-14</a:t>
             </a:fld>
             <a:endParaRPr lang="en-US"/>
           </a:p>
@@ -1019,7 +1022,7 @@
           <a:p>
             <a:fld id="{2DC2A043-560F-4D2E-8D1E-02B02E053659}" type="datetimeFigureOut">
               <a:rPr lang="en-US" smtClean="0"/>
-              <a:t>2019-02-04</a:t>
+              <a:t>2019-02-14</a:t>
             </a:fld>
             <a:endParaRPr lang="en-US"/>
           </a:p>
@@ -1251,7 +1254,7 @@
           <a:p>
             <a:fld id="{2DC2A043-560F-4D2E-8D1E-02B02E053659}" type="datetimeFigureOut">
               <a:rPr lang="en-US" smtClean="0"/>
-              <a:t>2019-02-04</a:t>
+              <a:t>2019-02-14</a:t>
             </a:fld>
             <a:endParaRPr lang="en-US"/>
           </a:p>
@@ -1618,7 +1621,7 @@
           <a:p>
             <a:fld id="{2DC2A043-560F-4D2E-8D1E-02B02E053659}" type="datetimeFigureOut">
               <a:rPr lang="en-US" smtClean="0"/>
-              <a:t>2019-02-04</a:t>
+              <a:t>2019-02-14</a:t>
             </a:fld>
             <a:endParaRPr lang="en-US"/>
           </a:p>
@@ -1736,7 +1739,7 @@
           <a:p>
             <a:fld id="{2DC2A043-560F-4D2E-8D1E-02B02E053659}" type="datetimeFigureOut">
               <a:rPr lang="en-US" smtClean="0"/>
-              <a:t>2019-02-04</a:t>
+              <a:t>2019-02-14</a:t>
             </a:fld>
             <a:endParaRPr lang="en-US"/>
           </a:p>
@@ -1831,7 +1834,7 @@
           <a:p>
             <a:fld id="{2DC2A043-560F-4D2E-8D1E-02B02E053659}" type="datetimeFigureOut">
               <a:rPr lang="en-US" smtClean="0"/>
-              <a:t>2019-02-04</a:t>
+              <a:t>2019-02-14</a:t>
             </a:fld>
             <a:endParaRPr lang="en-US"/>
           </a:p>
@@ -2108,7 +2111,7 @@
           <a:p>
             <a:fld id="{2DC2A043-560F-4D2E-8D1E-02B02E053659}" type="datetimeFigureOut">
               <a:rPr lang="en-US" smtClean="0"/>
-              <a:t>2019-02-04</a:t>
+              <a:t>2019-02-14</a:t>
             </a:fld>
             <a:endParaRPr lang="en-US"/>
           </a:p>
@@ -2361,7 +2364,7 @@
           <a:p>
             <a:fld id="{2DC2A043-560F-4D2E-8D1E-02B02E053659}" type="datetimeFigureOut">
               <a:rPr lang="en-US" smtClean="0"/>
-              <a:t>2019-02-04</a:t>
+              <a:t>2019-02-14</a:t>
             </a:fld>
             <a:endParaRPr lang="en-US"/>
           </a:p>
@@ -2574,7 +2577,7 @@
           <a:p>
             <a:fld id="{2DC2A043-560F-4D2E-8D1E-02B02E053659}" type="datetimeFigureOut">
               <a:rPr lang="en-US" smtClean="0"/>
-              <a:t>2019-02-04</a:t>
+              <a:t>2019-02-14</a:t>
             </a:fld>
             <a:endParaRPr lang="en-US"/>
           </a:p>
@@ -20325,6 +20328,3730 @@
     <p:extLst>
       <p:ext uri="{BB962C8B-B14F-4D97-AF65-F5344CB8AC3E}">
         <p14:creationId xmlns:p14="http://schemas.microsoft.com/office/powerpoint/2010/main" val="2074429266"/>
+      </p:ext>
+    </p:extLst>
+  </p:cSld>
+  <p:clrMapOvr>
+    <a:masterClrMapping/>
+  </p:clrMapOvr>
+</p:sld>
+</file>
+
+<file path=ppt/slides/slide12.xml><?xml version="1.0" encoding="utf-8"?>
+<p:sld xmlns:a="http://schemas.openxmlformats.org/drawingml/2006/main" xmlns:r="http://schemas.openxmlformats.org/officeDocument/2006/relationships" xmlns:p="http://schemas.openxmlformats.org/presentationml/2006/main">
+  <p:cSld>
+    <p:spTree>
+      <p:nvGrpSpPr>
+        <p:cNvPr id="1" name=""/>
+        <p:cNvGrpSpPr/>
+        <p:nvPr/>
+      </p:nvGrpSpPr>
+      <p:grpSpPr>
+        <a:xfrm>
+          <a:off x="0" y="0"/>
+          <a:ext cx="0" cy="0"/>
+          <a:chOff x="0" y="0"/>
+          <a:chExt cx="0" cy="0"/>
+        </a:xfrm>
+      </p:grpSpPr>
+      <p:sp>
+        <p:nvSpPr>
+          <p:cNvPr id="127" name="Rectangle 126"/>
+          <p:cNvSpPr/>
+          <p:nvPr/>
+        </p:nvSpPr>
+        <p:spPr>
+          <a:xfrm>
+            <a:off x="2604764" y="2249539"/>
+            <a:ext cx="457599" cy="453839"/>
+          </a:xfrm>
+          <a:prstGeom prst="rect">
+            <a:avLst/>
+          </a:prstGeom>
+          <a:solidFill>
+            <a:schemeClr val="accent1">
+              <a:lumMod val="75000"/>
+            </a:schemeClr>
+          </a:solidFill>
+        </p:spPr>
+        <p:style>
+          <a:lnRef idx="2">
+            <a:schemeClr val="accent1">
+              <a:shade val="50000"/>
+            </a:schemeClr>
+          </a:lnRef>
+          <a:fillRef idx="1">
+            <a:schemeClr val="accent1"/>
+          </a:fillRef>
+          <a:effectRef idx="0">
+            <a:schemeClr val="accent1"/>
+          </a:effectRef>
+          <a:fontRef idx="minor">
+            <a:schemeClr val="lt1"/>
+          </a:fontRef>
+        </p:style>
+        <p:txBody>
+          <a:bodyPr rtlCol="0" anchor="ctr"/>
+          <a:lstStyle/>
+          <a:p>
+            <a:pPr algn="ctr"/>
+            <a:r>
+              <a:rPr lang="en-US" dirty="0" smtClean="0"/>
+              <a:t>1</a:t>
+            </a:r>
+            <a:endParaRPr lang="en-US" dirty="0"/>
+          </a:p>
+        </p:txBody>
+      </p:sp>
+      <p:sp>
+        <p:nvSpPr>
+          <p:cNvPr id="128" name="Rectangle 127"/>
+          <p:cNvSpPr/>
+          <p:nvPr/>
+        </p:nvSpPr>
+        <p:spPr>
+          <a:xfrm>
+            <a:off x="3062363" y="2249539"/>
+            <a:ext cx="457599" cy="453839"/>
+          </a:xfrm>
+          <a:prstGeom prst="rect">
+            <a:avLst/>
+          </a:prstGeom>
+          <a:solidFill>
+            <a:schemeClr val="bg1"/>
+          </a:solidFill>
+        </p:spPr>
+        <p:style>
+          <a:lnRef idx="2">
+            <a:schemeClr val="accent1">
+              <a:shade val="50000"/>
+            </a:schemeClr>
+          </a:lnRef>
+          <a:fillRef idx="1">
+            <a:schemeClr val="accent1"/>
+          </a:fillRef>
+          <a:effectRef idx="0">
+            <a:schemeClr val="accent1"/>
+          </a:effectRef>
+          <a:fontRef idx="minor">
+            <a:schemeClr val="lt1"/>
+          </a:fontRef>
+        </p:style>
+        <p:txBody>
+          <a:bodyPr rtlCol="0" anchor="ctr"/>
+          <a:lstStyle/>
+          <a:p>
+            <a:pPr algn="ctr"/>
+            <a:r>
+              <a:rPr lang="en-US" dirty="0" smtClean="0">
+                <a:solidFill>
+                  <a:sysClr val="windowText" lastClr="000000"/>
+                </a:solidFill>
+              </a:rPr>
+              <a:t>0</a:t>
+            </a:r>
+            <a:endParaRPr lang="en-US" dirty="0">
+              <a:solidFill>
+                <a:sysClr val="windowText" lastClr="000000"/>
+              </a:solidFill>
+            </a:endParaRPr>
+          </a:p>
+        </p:txBody>
+      </p:sp>
+      <p:sp>
+        <p:nvSpPr>
+          <p:cNvPr id="130" name="Rectangle 129"/>
+          <p:cNvSpPr/>
+          <p:nvPr/>
+        </p:nvSpPr>
+        <p:spPr>
+          <a:xfrm>
+            <a:off x="3062363" y="2703378"/>
+            <a:ext cx="457599" cy="453839"/>
+          </a:xfrm>
+          <a:prstGeom prst="rect">
+            <a:avLst/>
+          </a:prstGeom>
+          <a:solidFill>
+            <a:schemeClr val="accent1">
+              <a:lumMod val="75000"/>
+            </a:schemeClr>
+          </a:solidFill>
+        </p:spPr>
+        <p:style>
+          <a:lnRef idx="2">
+            <a:schemeClr val="accent1">
+              <a:shade val="50000"/>
+            </a:schemeClr>
+          </a:lnRef>
+          <a:fillRef idx="1">
+            <a:schemeClr val="accent1"/>
+          </a:fillRef>
+          <a:effectRef idx="0">
+            <a:schemeClr val="accent1"/>
+          </a:effectRef>
+          <a:fontRef idx="minor">
+            <a:schemeClr val="lt1"/>
+          </a:fontRef>
+        </p:style>
+        <p:txBody>
+          <a:bodyPr rtlCol="0" anchor="ctr"/>
+          <a:lstStyle/>
+          <a:p>
+            <a:pPr algn="ctr"/>
+            <a:r>
+              <a:rPr lang="en-US" dirty="0" smtClean="0"/>
+              <a:t>1</a:t>
+            </a:r>
+            <a:endParaRPr lang="en-US" dirty="0"/>
+          </a:p>
+        </p:txBody>
+      </p:sp>
+      <p:sp>
+        <p:nvSpPr>
+          <p:cNvPr id="131" name="Rectangle 130"/>
+          <p:cNvSpPr/>
+          <p:nvPr/>
+        </p:nvSpPr>
+        <p:spPr>
+          <a:xfrm>
+            <a:off x="3519962" y="2249539"/>
+            <a:ext cx="457599" cy="453839"/>
+          </a:xfrm>
+          <a:prstGeom prst="rect">
+            <a:avLst/>
+          </a:prstGeom>
+          <a:solidFill>
+            <a:schemeClr val="bg1"/>
+          </a:solidFill>
+        </p:spPr>
+        <p:style>
+          <a:lnRef idx="2">
+            <a:schemeClr val="accent1">
+              <a:shade val="50000"/>
+            </a:schemeClr>
+          </a:lnRef>
+          <a:fillRef idx="1">
+            <a:schemeClr val="accent1"/>
+          </a:fillRef>
+          <a:effectRef idx="0">
+            <a:schemeClr val="accent1"/>
+          </a:effectRef>
+          <a:fontRef idx="minor">
+            <a:schemeClr val="lt1"/>
+          </a:fontRef>
+        </p:style>
+        <p:txBody>
+          <a:bodyPr rtlCol="0" anchor="ctr"/>
+          <a:lstStyle/>
+          <a:p>
+            <a:pPr algn="ctr"/>
+            <a:r>
+              <a:rPr lang="en-US" dirty="0" smtClean="0">
+                <a:solidFill>
+                  <a:sysClr val="windowText" lastClr="000000"/>
+                </a:solidFill>
+              </a:rPr>
+              <a:t>0</a:t>
+            </a:r>
+            <a:endParaRPr lang="en-US" dirty="0">
+              <a:solidFill>
+                <a:sysClr val="windowText" lastClr="000000"/>
+              </a:solidFill>
+            </a:endParaRPr>
+          </a:p>
+        </p:txBody>
+      </p:sp>
+      <p:sp>
+        <p:nvSpPr>
+          <p:cNvPr id="133" name="Rectangle 132"/>
+          <p:cNvSpPr/>
+          <p:nvPr/>
+        </p:nvSpPr>
+        <p:spPr>
+          <a:xfrm>
+            <a:off x="3977561" y="2249539"/>
+            <a:ext cx="457599" cy="453839"/>
+          </a:xfrm>
+          <a:prstGeom prst="rect">
+            <a:avLst/>
+          </a:prstGeom>
+          <a:solidFill>
+            <a:schemeClr val="bg1"/>
+          </a:solidFill>
+        </p:spPr>
+        <p:style>
+          <a:lnRef idx="2">
+            <a:schemeClr val="accent1">
+              <a:shade val="50000"/>
+            </a:schemeClr>
+          </a:lnRef>
+          <a:fillRef idx="1">
+            <a:schemeClr val="accent1"/>
+          </a:fillRef>
+          <a:effectRef idx="0">
+            <a:schemeClr val="accent1"/>
+          </a:effectRef>
+          <a:fontRef idx="minor">
+            <a:schemeClr val="lt1"/>
+          </a:fontRef>
+        </p:style>
+        <p:txBody>
+          <a:bodyPr rtlCol="0" anchor="ctr"/>
+          <a:lstStyle/>
+          <a:p>
+            <a:pPr algn="ctr"/>
+            <a:r>
+              <a:rPr lang="en-US" dirty="0" smtClean="0">
+                <a:solidFill>
+                  <a:sysClr val="windowText" lastClr="000000"/>
+                </a:solidFill>
+              </a:rPr>
+              <a:t>0</a:t>
+            </a:r>
+            <a:endParaRPr lang="en-US" dirty="0">
+              <a:solidFill>
+                <a:sysClr val="windowText" lastClr="000000"/>
+              </a:solidFill>
+            </a:endParaRPr>
+          </a:p>
+        </p:txBody>
+      </p:sp>
+      <p:sp>
+        <p:nvSpPr>
+          <p:cNvPr id="135" name="Rectangle 134"/>
+          <p:cNvSpPr/>
+          <p:nvPr/>
+        </p:nvSpPr>
+        <p:spPr>
+          <a:xfrm>
+            <a:off x="3519962" y="2703378"/>
+            <a:ext cx="457599" cy="453839"/>
+          </a:xfrm>
+          <a:prstGeom prst="rect">
+            <a:avLst/>
+          </a:prstGeom>
+          <a:solidFill>
+            <a:schemeClr val="bg1"/>
+          </a:solidFill>
+        </p:spPr>
+        <p:style>
+          <a:lnRef idx="2">
+            <a:schemeClr val="accent1">
+              <a:shade val="50000"/>
+            </a:schemeClr>
+          </a:lnRef>
+          <a:fillRef idx="1">
+            <a:schemeClr val="accent1"/>
+          </a:fillRef>
+          <a:effectRef idx="0">
+            <a:schemeClr val="accent1"/>
+          </a:effectRef>
+          <a:fontRef idx="minor">
+            <a:schemeClr val="lt1"/>
+          </a:fontRef>
+        </p:style>
+        <p:txBody>
+          <a:bodyPr rtlCol="0" anchor="ctr"/>
+          <a:lstStyle/>
+          <a:p>
+            <a:pPr algn="ctr"/>
+            <a:r>
+              <a:rPr lang="en-US" dirty="0" smtClean="0">
+                <a:solidFill>
+                  <a:sysClr val="windowText" lastClr="000000"/>
+                </a:solidFill>
+              </a:rPr>
+              <a:t>0</a:t>
+            </a:r>
+            <a:endParaRPr lang="en-US" dirty="0">
+              <a:solidFill>
+                <a:sysClr val="windowText" lastClr="000000"/>
+              </a:solidFill>
+            </a:endParaRPr>
+          </a:p>
+        </p:txBody>
+      </p:sp>
+      <p:sp>
+        <p:nvSpPr>
+          <p:cNvPr id="137" name="Rectangle 136"/>
+          <p:cNvSpPr/>
+          <p:nvPr/>
+        </p:nvSpPr>
+        <p:spPr>
+          <a:xfrm>
+            <a:off x="3977561" y="2703378"/>
+            <a:ext cx="457599" cy="453839"/>
+          </a:xfrm>
+          <a:prstGeom prst="rect">
+            <a:avLst/>
+          </a:prstGeom>
+          <a:solidFill>
+            <a:schemeClr val="accent1">
+              <a:lumMod val="75000"/>
+            </a:schemeClr>
+          </a:solidFill>
+        </p:spPr>
+        <p:style>
+          <a:lnRef idx="2">
+            <a:schemeClr val="accent1">
+              <a:shade val="50000"/>
+            </a:schemeClr>
+          </a:lnRef>
+          <a:fillRef idx="1">
+            <a:schemeClr val="accent1"/>
+          </a:fillRef>
+          <a:effectRef idx="0">
+            <a:schemeClr val="accent1"/>
+          </a:effectRef>
+          <a:fontRef idx="minor">
+            <a:schemeClr val="lt1"/>
+          </a:fontRef>
+        </p:style>
+        <p:txBody>
+          <a:bodyPr rtlCol="0" anchor="ctr"/>
+          <a:lstStyle/>
+          <a:p>
+            <a:pPr algn="ctr"/>
+            <a:r>
+              <a:rPr lang="en-US" dirty="0" smtClean="0"/>
+              <a:t>1</a:t>
+            </a:r>
+            <a:endParaRPr lang="en-US" dirty="0"/>
+          </a:p>
+        </p:txBody>
+      </p:sp>
+      <p:sp>
+        <p:nvSpPr>
+          <p:cNvPr id="164" name="Rectangle 163"/>
+          <p:cNvSpPr/>
+          <p:nvPr/>
+        </p:nvSpPr>
+        <p:spPr>
+          <a:xfrm>
+            <a:off x="2604764" y="3157217"/>
+            <a:ext cx="457599" cy="453839"/>
+          </a:xfrm>
+          <a:prstGeom prst="rect">
+            <a:avLst/>
+          </a:prstGeom>
+          <a:solidFill>
+            <a:schemeClr val="bg1"/>
+          </a:solidFill>
+        </p:spPr>
+        <p:style>
+          <a:lnRef idx="2">
+            <a:schemeClr val="accent1">
+              <a:shade val="50000"/>
+            </a:schemeClr>
+          </a:lnRef>
+          <a:fillRef idx="1">
+            <a:schemeClr val="accent1"/>
+          </a:fillRef>
+          <a:effectRef idx="0">
+            <a:schemeClr val="accent1"/>
+          </a:effectRef>
+          <a:fontRef idx="minor">
+            <a:schemeClr val="lt1"/>
+          </a:fontRef>
+        </p:style>
+        <p:txBody>
+          <a:bodyPr rtlCol="0" anchor="ctr"/>
+          <a:lstStyle/>
+          <a:p>
+            <a:pPr algn="ctr"/>
+            <a:r>
+              <a:rPr lang="en-US" dirty="0" smtClean="0">
+                <a:solidFill>
+                  <a:sysClr val="windowText" lastClr="000000"/>
+                </a:solidFill>
+              </a:rPr>
+              <a:t>0</a:t>
+            </a:r>
+            <a:endParaRPr lang="en-US" dirty="0">
+              <a:solidFill>
+                <a:sysClr val="windowText" lastClr="000000"/>
+              </a:solidFill>
+            </a:endParaRPr>
+          </a:p>
+        </p:txBody>
+      </p:sp>
+      <p:sp>
+        <p:nvSpPr>
+          <p:cNvPr id="165" name="Rectangle 164"/>
+          <p:cNvSpPr/>
+          <p:nvPr/>
+        </p:nvSpPr>
+        <p:spPr>
+          <a:xfrm>
+            <a:off x="3062363" y="3157217"/>
+            <a:ext cx="457599" cy="453839"/>
+          </a:xfrm>
+          <a:prstGeom prst="rect">
+            <a:avLst/>
+          </a:prstGeom>
+          <a:solidFill>
+            <a:schemeClr val="bg1"/>
+          </a:solidFill>
+        </p:spPr>
+        <p:style>
+          <a:lnRef idx="2">
+            <a:schemeClr val="accent1">
+              <a:shade val="50000"/>
+            </a:schemeClr>
+          </a:lnRef>
+          <a:fillRef idx="1">
+            <a:schemeClr val="accent1"/>
+          </a:fillRef>
+          <a:effectRef idx="0">
+            <a:schemeClr val="accent1"/>
+          </a:effectRef>
+          <a:fontRef idx="minor">
+            <a:schemeClr val="lt1"/>
+          </a:fontRef>
+        </p:style>
+        <p:txBody>
+          <a:bodyPr rtlCol="0" anchor="ctr"/>
+          <a:lstStyle/>
+          <a:p>
+            <a:pPr algn="ctr"/>
+            <a:r>
+              <a:rPr lang="en-US" dirty="0" smtClean="0">
+                <a:solidFill>
+                  <a:sysClr val="windowText" lastClr="000000"/>
+                </a:solidFill>
+              </a:rPr>
+              <a:t>0</a:t>
+            </a:r>
+            <a:endParaRPr lang="en-US" dirty="0">
+              <a:solidFill>
+                <a:sysClr val="windowText" lastClr="000000"/>
+              </a:solidFill>
+            </a:endParaRPr>
+          </a:p>
+        </p:txBody>
+      </p:sp>
+      <p:sp>
+        <p:nvSpPr>
+          <p:cNvPr id="166" name="Rectangle 165"/>
+          <p:cNvSpPr/>
+          <p:nvPr/>
+        </p:nvSpPr>
+        <p:spPr>
+          <a:xfrm>
+            <a:off x="2604764" y="3611056"/>
+            <a:ext cx="457599" cy="453839"/>
+          </a:xfrm>
+          <a:prstGeom prst="rect">
+            <a:avLst/>
+          </a:prstGeom>
+          <a:solidFill>
+            <a:schemeClr val="bg1"/>
+          </a:solidFill>
+        </p:spPr>
+        <p:style>
+          <a:lnRef idx="2">
+            <a:schemeClr val="accent1">
+              <a:shade val="50000"/>
+            </a:schemeClr>
+          </a:lnRef>
+          <a:fillRef idx="1">
+            <a:schemeClr val="accent1"/>
+          </a:fillRef>
+          <a:effectRef idx="0">
+            <a:schemeClr val="accent1"/>
+          </a:effectRef>
+          <a:fontRef idx="minor">
+            <a:schemeClr val="lt1"/>
+          </a:fontRef>
+        </p:style>
+        <p:txBody>
+          <a:bodyPr rtlCol="0" anchor="ctr"/>
+          <a:lstStyle/>
+          <a:p>
+            <a:pPr algn="ctr"/>
+            <a:r>
+              <a:rPr lang="en-US" dirty="0" smtClean="0">
+                <a:solidFill>
+                  <a:sysClr val="windowText" lastClr="000000"/>
+                </a:solidFill>
+              </a:rPr>
+              <a:t>0</a:t>
+            </a:r>
+            <a:endParaRPr lang="en-US" dirty="0">
+              <a:solidFill>
+                <a:sysClr val="windowText" lastClr="000000"/>
+              </a:solidFill>
+            </a:endParaRPr>
+          </a:p>
+        </p:txBody>
+      </p:sp>
+      <p:sp>
+        <p:nvSpPr>
+          <p:cNvPr id="167" name="Rectangle 166"/>
+          <p:cNvSpPr/>
+          <p:nvPr/>
+        </p:nvSpPr>
+        <p:spPr>
+          <a:xfrm>
+            <a:off x="3062363" y="3611056"/>
+            <a:ext cx="457599" cy="453839"/>
+          </a:xfrm>
+          <a:prstGeom prst="rect">
+            <a:avLst/>
+          </a:prstGeom>
+          <a:solidFill>
+            <a:schemeClr val="bg1"/>
+          </a:solidFill>
+        </p:spPr>
+        <p:style>
+          <a:lnRef idx="2">
+            <a:schemeClr val="accent1">
+              <a:shade val="50000"/>
+            </a:schemeClr>
+          </a:lnRef>
+          <a:fillRef idx="1">
+            <a:schemeClr val="accent1"/>
+          </a:fillRef>
+          <a:effectRef idx="0">
+            <a:schemeClr val="accent1"/>
+          </a:effectRef>
+          <a:fontRef idx="minor">
+            <a:schemeClr val="lt1"/>
+          </a:fontRef>
+        </p:style>
+        <p:txBody>
+          <a:bodyPr rtlCol="0" anchor="ctr"/>
+          <a:lstStyle/>
+          <a:p>
+            <a:pPr algn="ctr"/>
+            <a:r>
+              <a:rPr lang="en-US" dirty="0" smtClean="0">
+                <a:solidFill>
+                  <a:sysClr val="windowText" lastClr="000000"/>
+                </a:solidFill>
+              </a:rPr>
+              <a:t>0</a:t>
+            </a:r>
+            <a:endParaRPr lang="en-US" dirty="0">
+              <a:solidFill>
+                <a:sysClr val="windowText" lastClr="000000"/>
+              </a:solidFill>
+            </a:endParaRPr>
+          </a:p>
+        </p:txBody>
+      </p:sp>
+      <p:sp>
+        <p:nvSpPr>
+          <p:cNvPr id="172" name="Rectangle 171"/>
+          <p:cNvSpPr/>
+          <p:nvPr/>
+        </p:nvSpPr>
+        <p:spPr>
+          <a:xfrm>
+            <a:off x="3519962" y="3157217"/>
+            <a:ext cx="457599" cy="453839"/>
+          </a:xfrm>
+          <a:prstGeom prst="rect">
+            <a:avLst/>
+          </a:prstGeom>
+          <a:solidFill>
+            <a:schemeClr val="bg1"/>
+          </a:solidFill>
+        </p:spPr>
+        <p:style>
+          <a:lnRef idx="2">
+            <a:schemeClr val="accent1">
+              <a:shade val="50000"/>
+            </a:schemeClr>
+          </a:lnRef>
+          <a:fillRef idx="1">
+            <a:schemeClr val="accent1"/>
+          </a:fillRef>
+          <a:effectRef idx="0">
+            <a:schemeClr val="accent1"/>
+          </a:effectRef>
+          <a:fontRef idx="minor">
+            <a:schemeClr val="lt1"/>
+          </a:fontRef>
+        </p:style>
+        <p:txBody>
+          <a:bodyPr rtlCol="0" anchor="ctr"/>
+          <a:lstStyle/>
+          <a:p>
+            <a:pPr algn="ctr"/>
+            <a:r>
+              <a:rPr lang="en-US" dirty="0" smtClean="0">
+                <a:solidFill>
+                  <a:sysClr val="windowText" lastClr="000000"/>
+                </a:solidFill>
+              </a:rPr>
+              <a:t>0</a:t>
+            </a:r>
+            <a:endParaRPr lang="en-US" dirty="0">
+              <a:solidFill>
+                <a:sysClr val="windowText" lastClr="000000"/>
+              </a:solidFill>
+            </a:endParaRPr>
+          </a:p>
+        </p:txBody>
+      </p:sp>
+      <p:sp>
+        <p:nvSpPr>
+          <p:cNvPr id="173" name="Rectangle 172"/>
+          <p:cNvSpPr/>
+          <p:nvPr/>
+        </p:nvSpPr>
+        <p:spPr>
+          <a:xfrm>
+            <a:off x="3977561" y="3157217"/>
+            <a:ext cx="457599" cy="453839"/>
+          </a:xfrm>
+          <a:prstGeom prst="rect">
+            <a:avLst/>
+          </a:prstGeom>
+          <a:solidFill>
+            <a:schemeClr val="bg1"/>
+          </a:solidFill>
+        </p:spPr>
+        <p:style>
+          <a:lnRef idx="2">
+            <a:schemeClr val="accent1">
+              <a:shade val="50000"/>
+            </a:schemeClr>
+          </a:lnRef>
+          <a:fillRef idx="1">
+            <a:schemeClr val="accent1"/>
+          </a:fillRef>
+          <a:effectRef idx="0">
+            <a:schemeClr val="accent1"/>
+          </a:effectRef>
+          <a:fontRef idx="minor">
+            <a:schemeClr val="lt1"/>
+          </a:fontRef>
+        </p:style>
+        <p:txBody>
+          <a:bodyPr rtlCol="0" anchor="ctr"/>
+          <a:lstStyle/>
+          <a:p>
+            <a:pPr algn="ctr"/>
+            <a:r>
+              <a:rPr lang="en-US" dirty="0" smtClean="0">
+                <a:solidFill>
+                  <a:sysClr val="windowText" lastClr="000000"/>
+                </a:solidFill>
+              </a:rPr>
+              <a:t>0</a:t>
+            </a:r>
+            <a:endParaRPr lang="en-US" dirty="0">
+              <a:solidFill>
+                <a:sysClr val="windowText" lastClr="000000"/>
+              </a:solidFill>
+            </a:endParaRPr>
+          </a:p>
+        </p:txBody>
+      </p:sp>
+      <p:sp>
+        <p:nvSpPr>
+          <p:cNvPr id="178" name="Rectangle 177"/>
+          <p:cNvSpPr/>
+          <p:nvPr/>
+        </p:nvSpPr>
+        <p:spPr>
+          <a:xfrm>
+            <a:off x="3519962" y="3611056"/>
+            <a:ext cx="457599" cy="453839"/>
+          </a:xfrm>
+          <a:prstGeom prst="rect">
+            <a:avLst/>
+          </a:prstGeom>
+          <a:solidFill>
+            <a:schemeClr val="accent1">
+              <a:lumMod val="75000"/>
+            </a:schemeClr>
+          </a:solidFill>
+        </p:spPr>
+        <p:style>
+          <a:lnRef idx="2">
+            <a:schemeClr val="accent1">
+              <a:shade val="50000"/>
+            </a:schemeClr>
+          </a:lnRef>
+          <a:fillRef idx="1">
+            <a:schemeClr val="accent1"/>
+          </a:fillRef>
+          <a:effectRef idx="0">
+            <a:schemeClr val="accent1"/>
+          </a:effectRef>
+          <a:fontRef idx="minor">
+            <a:schemeClr val="lt1"/>
+          </a:fontRef>
+        </p:style>
+        <p:txBody>
+          <a:bodyPr rtlCol="0" anchor="ctr"/>
+          <a:lstStyle/>
+          <a:p>
+            <a:pPr algn="ctr"/>
+            <a:r>
+              <a:rPr lang="en-US" dirty="0" smtClean="0"/>
+              <a:t>1</a:t>
+            </a:r>
+            <a:endParaRPr lang="en-US" dirty="0"/>
+          </a:p>
+        </p:txBody>
+      </p:sp>
+      <p:sp>
+        <p:nvSpPr>
+          <p:cNvPr id="180" name="Rectangle 179"/>
+          <p:cNvSpPr/>
+          <p:nvPr/>
+        </p:nvSpPr>
+        <p:spPr>
+          <a:xfrm>
+            <a:off x="3977561" y="3611056"/>
+            <a:ext cx="457599" cy="453839"/>
+          </a:xfrm>
+          <a:prstGeom prst="rect">
+            <a:avLst/>
+          </a:prstGeom>
+          <a:solidFill>
+            <a:schemeClr val="bg1"/>
+          </a:solidFill>
+        </p:spPr>
+        <p:style>
+          <a:lnRef idx="2">
+            <a:schemeClr val="accent1">
+              <a:shade val="50000"/>
+            </a:schemeClr>
+          </a:lnRef>
+          <a:fillRef idx="1">
+            <a:schemeClr val="accent1"/>
+          </a:fillRef>
+          <a:effectRef idx="0">
+            <a:schemeClr val="accent1"/>
+          </a:effectRef>
+          <a:fontRef idx="minor">
+            <a:schemeClr val="lt1"/>
+          </a:fontRef>
+        </p:style>
+        <p:txBody>
+          <a:bodyPr rtlCol="0" anchor="ctr"/>
+          <a:lstStyle/>
+          <a:p>
+            <a:pPr algn="ctr"/>
+            <a:r>
+              <a:rPr lang="en-US" dirty="0" smtClean="0">
+                <a:solidFill>
+                  <a:sysClr val="windowText" lastClr="000000"/>
+                </a:solidFill>
+              </a:rPr>
+              <a:t>0</a:t>
+            </a:r>
+            <a:endParaRPr lang="en-US" dirty="0">
+              <a:solidFill>
+                <a:sysClr val="windowText" lastClr="000000"/>
+              </a:solidFill>
+            </a:endParaRPr>
+          </a:p>
+        </p:txBody>
+      </p:sp>
+      <p:sp>
+        <p:nvSpPr>
+          <p:cNvPr id="181" name="Rectangle 180"/>
+          <p:cNvSpPr/>
+          <p:nvPr/>
+        </p:nvSpPr>
+        <p:spPr>
+          <a:xfrm>
+            <a:off x="4435160" y="2249539"/>
+            <a:ext cx="457599" cy="453839"/>
+          </a:xfrm>
+          <a:prstGeom prst="rect">
+            <a:avLst/>
+          </a:prstGeom>
+          <a:solidFill>
+            <a:schemeClr val="bg1"/>
+          </a:solidFill>
+        </p:spPr>
+        <p:style>
+          <a:lnRef idx="2">
+            <a:schemeClr val="accent1">
+              <a:shade val="50000"/>
+            </a:schemeClr>
+          </a:lnRef>
+          <a:fillRef idx="1">
+            <a:schemeClr val="accent1"/>
+          </a:fillRef>
+          <a:effectRef idx="0">
+            <a:schemeClr val="accent1"/>
+          </a:effectRef>
+          <a:fontRef idx="minor">
+            <a:schemeClr val="lt1"/>
+          </a:fontRef>
+        </p:style>
+        <p:txBody>
+          <a:bodyPr rtlCol="0" anchor="ctr"/>
+          <a:lstStyle/>
+          <a:p>
+            <a:pPr algn="ctr"/>
+            <a:r>
+              <a:rPr lang="en-US" dirty="0" smtClean="0">
+                <a:solidFill>
+                  <a:sysClr val="windowText" lastClr="000000"/>
+                </a:solidFill>
+              </a:rPr>
+              <a:t>0</a:t>
+            </a:r>
+            <a:endParaRPr lang="en-US" dirty="0">
+              <a:solidFill>
+                <a:sysClr val="windowText" lastClr="000000"/>
+              </a:solidFill>
+            </a:endParaRPr>
+          </a:p>
+        </p:txBody>
+      </p:sp>
+      <p:sp>
+        <p:nvSpPr>
+          <p:cNvPr id="182" name="Rectangle 181"/>
+          <p:cNvSpPr/>
+          <p:nvPr/>
+        </p:nvSpPr>
+        <p:spPr>
+          <a:xfrm>
+            <a:off x="4892759" y="2249539"/>
+            <a:ext cx="457599" cy="453839"/>
+          </a:xfrm>
+          <a:prstGeom prst="rect">
+            <a:avLst/>
+          </a:prstGeom>
+          <a:solidFill>
+            <a:schemeClr val="bg1"/>
+          </a:solidFill>
+        </p:spPr>
+        <p:style>
+          <a:lnRef idx="2">
+            <a:schemeClr val="accent1">
+              <a:shade val="50000"/>
+            </a:schemeClr>
+          </a:lnRef>
+          <a:fillRef idx="1">
+            <a:schemeClr val="accent1"/>
+          </a:fillRef>
+          <a:effectRef idx="0">
+            <a:schemeClr val="accent1"/>
+          </a:effectRef>
+          <a:fontRef idx="minor">
+            <a:schemeClr val="lt1"/>
+          </a:fontRef>
+        </p:style>
+        <p:txBody>
+          <a:bodyPr rtlCol="0" anchor="ctr"/>
+          <a:lstStyle/>
+          <a:p>
+            <a:pPr algn="ctr"/>
+            <a:r>
+              <a:rPr lang="en-US" dirty="0" smtClean="0">
+                <a:solidFill>
+                  <a:sysClr val="windowText" lastClr="000000"/>
+                </a:solidFill>
+              </a:rPr>
+              <a:t>0</a:t>
+            </a:r>
+            <a:endParaRPr lang="en-US" dirty="0">
+              <a:solidFill>
+                <a:sysClr val="windowText" lastClr="000000"/>
+              </a:solidFill>
+            </a:endParaRPr>
+          </a:p>
+        </p:txBody>
+      </p:sp>
+      <p:sp>
+        <p:nvSpPr>
+          <p:cNvPr id="183" name="Rectangle 182"/>
+          <p:cNvSpPr/>
+          <p:nvPr/>
+        </p:nvSpPr>
+        <p:spPr>
+          <a:xfrm>
+            <a:off x="4435160" y="2703378"/>
+            <a:ext cx="457599" cy="453839"/>
+          </a:xfrm>
+          <a:prstGeom prst="rect">
+            <a:avLst/>
+          </a:prstGeom>
+          <a:solidFill>
+            <a:schemeClr val="bg1"/>
+          </a:solidFill>
+        </p:spPr>
+        <p:style>
+          <a:lnRef idx="2">
+            <a:schemeClr val="accent1">
+              <a:shade val="50000"/>
+            </a:schemeClr>
+          </a:lnRef>
+          <a:fillRef idx="1">
+            <a:schemeClr val="accent1"/>
+          </a:fillRef>
+          <a:effectRef idx="0">
+            <a:schemeClr val="accent1"/>
+          </a:effectRef>
+          <a:fontRef idx="minor">
+            <a:schemeClr val="lt1"/>
+          </a:fontRef>
+        </p:style>
+        <p:txBody>
+          <a:bodyPr rtlCol="0" anchor="ctr"/>
+          <a:lstStyle/>
+          <a:p>
+            <a:pPr algn="ctr"/>
+            <a:r>
+              <a:rPr lang="en-US" dirty="0" smtClean="0">
+                <a:solidFill>
+                  <a:sysClr val="windowText" lastClr="000000"/>
+                </a:solidFill>
+              </a:rPr>
+              <a:t>0</a:t>
+            </a:r>
+            <a:endParaRPr lang="en-US" dirty="0">
+              <a:solidFill>
+                <a:sysClr val="windowText" lastClr="000000"/>
+              </a:solidFill>
+            </a:endParaRPr>
+          </a:p>
+        </p:txBody>
+      </p:sp>
+      <p:sp>
+        <p:nvSpPr>
+          <p:cNvPr id="184" name="Rectangle 183"/>
+          <p:cNvSpPr/>
+          <p:nvPr/>
+        </p:nvSpPr>
+        <p:spPr>
+          <a:xfrm>
+            <a:off x="4892759" y="2703378"/>
+            <a:ext cx="457599" cy="453839"/>
+          </a:xfrm>
+          <a:prstGeom prst="rect">
+            <a:avLst/>
+          </a:prstGeom>
+          <a:solidFill>
+            <a:schemeClr val="bg1"/>
+          </a:solidFill>
+        </p:spPr>
+        <p:style>
+          <a:lnRef idx="2">
+            <a:schemeClr val="accent1">
+              <a:shade val="50000"/>
+            </a:schemeClr>
+          </a:lnRef>
+          <a:fillRef idx="1">
+            <a:schemeClr val="accent1"/>
+          </a:fillRef>
+          <a:effectRef idx="0">
+            <a:schemeClr val="accent1"/>
+          </a:effectRef>
+          <a:fontRef idx="minor">
+            <a:schemeClr val="lt1"/>
+          </a:fontRef>
+        </p:style>
+        <p:txBody>
+          <a:bodyPr rtlCol="0" anchor="ctr"/>
+          <a:lstStyle/>
+          <a:p>
+            <a:pPr algn="ctr"/>
+            <a:r>
+              <a:rPr lang="en-US" dirty="0" smtClean="0">
+                <a:solidFill>
+                  <a:sysClr val="windowText" lastClr="000000"/>
+                </a:solidFill>
+              </a:rPr>
+              <a:t>0</a:t>
+            </a:r>
+            <a:endParaRPr lang="en-US" dirty="0">
+              <a:solidFill>
+                <a:sysClr val="windowText" lastClr="000000"/>
+              </a:solidFill>
+            </a:endParaRPr>
+          </a:p>
+        </p:txBody>
+      </p:sp>
+      <p:sp>
+        <p:nvSpPr>
+          <p:cNvPr id="185" name="Rectangle 184"/>
+          <p:cNvSpPr/>
+          <p:nvPr/>
+        </p:nvSpPr>
+        <p:spPr>
+          <a:xfrm>
+            <a:off x="4435160" y="3157217"/>
+            <a:ext cx="457599" cy="453839"/>
+          </a:xfrm>
+          <a:prstGeom prst="rect">
+            <a:avLst/>
+          </a:prstGeom>
+          <a:solidFill>
+            <a:schemeClr val="bg1"/>
+          </a:solidFill>
+        </p:spPr>
+        <p:style>
+          <a:lnRef idx="2">
+            <a:schemeClr val="accent1">
+              <a:shade val="50000"/>
+            </a:schemeClr>
+          </a:lnRef>
+          <a:fillRef idx="1">
+            <a:schemeClr val="accent1"/>
+          </a:fillRef>
+          <a:effectRef idx="0">
+            <a:schemeClr val="accent1"/>
+          </a:effectRef>
+          <a:fontRef idx="minor">
+            <a:schemeClr val="lt1"/>
+          </a:fontRef>
+        </p:style>
+        <p:txBody>
+          <a:bodyPr rtlCol="0" anchor="ctr"/>
+          <a:lstStyle/>
+          <a:p>
+            <a:pPr algn="ctr"/>
+            <a:r>
+              <a:rPr lang="en-US" dirty="0" smtClean="0">
+                <a:solidFill>
+                  <a:sysClr val="windowText" lastClr="000000"/>
+                </a:solidFill>
+              </a:rPr>
+              <a:t>0</a:t>
+            </a:r>
+            <a:endParaRPr lang="en-US" dirty="0">
+              <a:solidFill>
+                <a:sysClr val="windowText" lastClr="000000"/>
+              </a:solidFill>
+            </a:endParaRPr>
+          </a:p>
+        </p:txBody>
+      </p:sp>
+      <p:sp>
+        <p:nvSpPr>
+          <p:cNvPr id="186" name="Rectangle 185"/>
+          <p:cNvSpPr/>
+          <p:nvPr/>
+        </p:nvSpPr>
+        <p:spPr>
+          <a:xfrm>
+            <a:off x="4892759" y="3157217"/>
+            <a:ext cx="457599" cy="453839"/>
+          </a:xfrm>
+          <a:prstGeom prst="rect">
+            <a:avLst/>
+          </a:prstGeom>
+          <a:solidFill>
+            <a:schemeClr val="accent1">
+              <a:lumMod val="75000"/>
+            </a:schemeClr>
+          </a:solidFill>
+        </p:spPr>
+        <p:style>
+          <a:lnRef idx="2">
+            <a:schemeClr val="accent1">
+              <a:shade val="50000"/>
+            </a:schemeClr>
+          </a:lnRef>
+          <a:fillRef idx="1">
+            <a:schemeClr val="accent1"/>
+          </a:fillRef>
+          <a:effectRef idx="0">
+            <a:schemeClr val="accent1"/>
+          </a:effectRef>
+          <a:fontRef idx="minor">
+            <a:schemeClr val="lt1"/>
+          </a:fontRef>
+        </p:style>
+        <p:txBody>
+          <a:bodyPr rtlCol="0" anchor="ctr"/>
+          <a:lstStyle/>
+          <a:p>
+            <a:pPr algn="ctr"/>
+            <a:r>
+              <a:rPr lang="en-US" dirty="0" smtClean="0"/>
+              <a:t>1</a:t>
+            </a:r>
+            <a:endParaRPr lang="en-US" dirty="0"/>
+          </a:p>
+        </p:txBody>
+      </p:sp>
+      <p:sp>
+        <p:nvSpPr>
+          <p:cNvPr id="187" name="Rectangle 186"/>
+          <p:cNvSpPr/>
+          <p:nvPr/>
+        </p:nvSpPr>
+        <p:spPr>
+          <a:xfrm>
+            <a:off x="4435160" y="3611056"/>
+            <a:ext cx="457599" cy="453839"/>
+          </a:xfrm>
+          <a:prstGeom prst="rect">
+            <a:avLst/>
+          </a:prstGeom>
+          <a:solidFill>
+            <a:schemeClr val="accent1">
+              <a:lumMod val="75000"/>
+            </a:schemeClr>
+          </a:solidFill>
+        </p:spPr>
+        <p:style>
+          <a:lnRef idx="2">
+            <a:schemeClr val="accent1">
+              <a:shade val="50000"/>
+            </a:schemeClr>
+          </a:lnRef>
+          <a:fillRef idx="1">
+            <a:schemeClr val="accent1"/>
+          </a:fillRef>
+          <a:effectRef idx="0">
+            <a:schemeClr val="accent1"/>
+          </a:effectRef>
+          <a:fontRef idx="minor">
+            <a:schemeClr val="lt1"/>
+          </a:fontRef>
+        </p:style>
+        <p:txBody>
+          <a:bodyPr rtlCol="0" anchor="ctr"/>
+          <a:lstStyle/>
+          <a:p>
+            <a:pPr algn="ctr"/>
+            <a:r>
+              <a:rPr lang="en-US" dirty="0" smtClean="0"/>
+              <a:t>1</a:t>
+            </a:r>
+            <a:endParaRPr lang="en-US" dirty="0"/>
+          </a:p>
+        </p:txBody>
+      </p:sp>
+      <p:sp>
+        <p:nvSpPr>
+          <p:cNvPr id="188" name="Rectangle 187"/>
+          <p:cNvSpPr/>
+          <p:nvPr/>
+        </p:nvSpPr>
+        <p:spPr>
+          <a:xfrm>
+            <a:off x="4892759" y="3611056"/>
+            <a:ext cx="457599" cy="453839"/>
+          </a:xfrm>
+          <a:prstGeom prst="rect">
+            <a:avLst/>
+          </a:prstGeom>
+          <a:solidFill>
+            <a:schemeClr val="bg1"/>
+          </a:solidFill>
+        </p:spPr>
+        <p:style>
+          <a:lnRef idx="2">
+            <a:schemeClr val="accent1">
+              <a:shade val="50000"/>
+            </a:schemeClr>
+          </a:lnRef>
+          <a:fillRef idx="1">
+            <a:schemeClr val="accent1"/>
+          </a:fillRef>
+          <a:effectRef idx="0">
+            <a:schemeClr val="accent1"/>
+          </a:effectRef>
+          <a:fontRef idx="minor">
+            <a:schemeClr val="lt1"/>
+          </a:fontRef>
+        </p:style>
+        <p:txBody>
+          <a:bodyPr rtlCol="0" anchor="ctr"/>
+          <a:lstStyle/>
+          <a:p>
+            <a:pPr algn="ctr"/>
+            <a:r>
+              <a:rPr lang="en-US" dirty="0" smtClean="0">
+                <a:solidFill>
+                  <a:sysClr val="windowText" lastClr="000000"/>
+                </a:solidFill>
+              </a:rPr>
+              <a:t>0</a:t>
+            </a:r>
+            <a:endParaRPr lang="en-US" dirty="0">
+              <a:solidFill>
+                <a:sysClr val="windowText" lastClr="000000"/>
+              </a:solidFill>
+            </a:endParaRPr>
+          </a:p>
+        </p:txBody>
+      </p:sp>
+      <p:sp>
+        <p:nvSpPr>
+          <p:cNvPr id="191" name="Rectangle 190"/>
+          <p:cNvSpPr/>
+          <p:nvPr/>
+        </p:nvSpPr>
+        <p:spPr>
+          <a:xfrm>
+            <a:off x="1690208" y="2249539"/>
+            <a:ext cx="457599" cy="453839"/>
+          </a:xfrm>
+          <a:prstGeom prst="rect">
+            <a:avLst/>
+          </a:prstGeom>
+          <a:solidFill>
+            <a:schemeClr val="bg1"/>
+          </a:solidFill>
+        </p:spPr>
+        <p:style>
+          <a:lnRef idx="2">
+            <a:schemeClr val="accent1">
+              <a:shade val="50000"/>
+            </a:schemeClr>
+          </a:lnRef>
+          <a:fillRef idx="1">
+            <a:schemeClr val="accent1"/>
+          </a:fillRef>
+          <a:effectRef idx="0">
+            <a:schemeClr val="accent1"/>
+          </a:effectRef>
+          <a:fontRef idx="minor">
+            <a:schemeClr val="lt1"/>
+          </a:fontRef>
+        </p:style>
+        <p:txBody>
+          <a:bodyPr rtlCol="0" anchor="ctr"/>
+          <a:lstStyle/>
+          <a:p>
+            <a:pPr algn="ctr"/>
+            <a:r>
+              <a:rPr lang="en-US" dirty="0" smtClean="0">
+                <a:solidFill>
+                  <a:sysClr val="windowText" lastClr="000000"/>
+                </a:solidFill>
+              </a:rPr>
+              <a:t>0</a:t>
+            </a:r>
+            <a:endParaRPr lang="en-US" dirty="0">
+              <a:solidFill>
+                <a:sysClr val="windowText" lastClr="000000"/>
+              </a:solidFill>
+            </a:endParaRPr>
+          </a:p>
+        </p:txBody>
+      </p:sp>
+      <p:sp>
+        <p:nvSpPr>
+          <p:cNvPr id="192" name="Rectangle 191"/>
+          <p:cNvSpPr/>
+          <p:nvPr/>
+        </p:nvSpPr>
+        <p:spPr>
+          <a:xfrm>
+            <a:off x="2147807" y="2249539"/>
+            <a:ext cx="457599" cy="453839"/>
+          </a:xfrm>
+          <a:prstGeom prst="rect">
+            <a:avLst/>
+          </a:prstGeom>
+          <a:solidFill>
+            <a:schemeClr val="bg1"/>
+          </a:solidFill>
+        </p:spPr>
+        <p:style>
+          <a:lnRef idx="2">
+            <a:schemeClr val="accent1">
+              <a:shade val="50000"/>
+            </a:schemeClr>
+          </a:lnRef>
+          <a:fillRef idx="1">
+            <a:schemeClr val="accent1"/>
+          </a:fillRef>
+          <a:effectRef idx="0">
+            <a:schemeClr val="accent1"/>
+          </a:effectRef>
+          <a:fontRef idx="minor">
+            <a:schemeClr val="lt1"/>
+          </a:fontRef>
+        </p:style>
+        <p:txBody>
+          <a:bodyPr rtlCol="0" anchor="ctr"/>
+          <a:lstStyle/>
+          <a:p>
+            <a:pPr algn="ctr"/>
+            <a:r>
+              <a:rPr lang="en-US" dirty="0" smtClean="0">
+                <a:solidFill>
+                  <a:sysClr val="windowText" lastClr="000000"/>
+                </a:solidFill>
+              </a:rPr>
+              <a:t>0</a:t>
+            </a:r>
+            <a:endParaRPr lang="en-US" dirty="0">
+              <a:solidFill>
+                <a:sysClr val="windowText" lastClr="000000"/>
+              </a:solidFill>
+            </a:endParaRPr>
+          </a:p>
+        </p:txBody>
+      </p:sp>
+      <p:sp>
+        <p:nvSpPr>
+          <p:cNvPr id="193" name="Rectangle 192"/>
+          <p:cNvSpPr/>
+          <p:nvPr/>
+        </p:nvSpPr>
+        <p:spPr>
+          <a:xfrm>
+            <a:off x="1690208" y="3157217"/>
+            <a:ext cx="457599" cy="453839"/>
+          </a:xfrm>
+          <a:prstGeom prst="rect">
+            <a:avLst/>
+          </a:prstGeom>
+          <a:solidFill>
+            <a:schemeClr val="bg1"/>
+          </a:solidFill>
+        </p:spPr>
+        <p:style>
+          <a:lnRef idx="2">
+            <a:schemeClr val="accent1">
+              <a:shade val="50000"/>
+            </a:schemeClr>
+          </a:lnRef>
+          <a:fillRef idx="1">
+            <a:schemeClr val="accent1"/>
+          </a:fillRef>
+          <a:effectRef idx="0">
+            <a:schemeClr val="accent1"/>
+          </a:effectRef>
+          <a:fontRef idx="minor">
+            <a:schemeClr val="lt1"/>
+          </a:fontRef>
+        </p:style>
+        <p:txBody>
+          <a:bodyPr rtlCol="0" anchor="ctr"/>
+          <a:lstStyle/>
+          <a:p>
+            <a:pPr algn="ctr"/>
+            <a:r>
+              <a:rPr lang="en-US" dirty="0" smtClean="0">
+                <a:solidFill>
+                  <a:sysClr val="windowText" lastClr="000000"/>
+                </a:solidFill>
+              </a:rPr>
+              <a:t>0</a:t>
+            </a:r>
+            <a:endParaRPr lang="en-US" dirty="0">
+              <a:solidFill>
+                <a:sysClr val="windowText" lastClr="000000"/>
+              </a:solidFill>
+            </a:endParaRPr>
+          </a:p>
+        </p:txBody>
+      </p:sp>
+      <p:sp>
+        <p:nvSpPr>
+          <p:cNvPr id="194" name="Rectangle 193"/>
+          <p:cNvSpPr/>
+          <p:nvPr/>
+        </p:nvSpPr>
+        <p:spPr>
+          <a:xfrm>
+            <a:off x="2147807" y="3157217"/>
+            <a:ext cx="457599" cy="453839"/>
+          </a:xfrm>
+          <a:prstGeom prst="rect">
+            <a:avLst/>
+          </a:prstGeom>
+          <a:solidFill>
+            <a:schemeClr val="bg1"/>
+          </a:solidFill>
+        </p:spPr>
+        <p:style>
+          <a:lnRef idx="2">
+            <a:schemeClr val="accent1">
+              <a:shade val="50000"/>
+            </a:schemeClr>
+          </a:lnRef>
+          <a:fillRef idx="1">
+            <a:schemeClr val="accent1"/>
+          </a:fillRef>
+          <a:effectRef idx="0">
+            <a:schemeClr val="accent1"/>
+          </a:effectRef>
+          <a:fontRef idx="minor">
+            <a:schemeClr val="lt1"/>
+          </a:fontRef>
+        </p:style>
+        <p:txBody>
+          <a:bodyPr rtlCol="0" anchor="ctr"/>
+          <a:lstStyle/>
+          <a:p>
+            <a:pPr algn="ctr"/>
+            <a:r>
+              <a:rPr lang="en-US" dirty="0" smtClean="0">
+                <a:solidFill>
+                  <a:sysClr val="windowText" lastClr="000000"/>
+                </a:solidFill>
+              </a:rPr>
+              <a:t>0</a:t>
+            </a:r>
+            <a:endParaRPr lang="en-US" dirty="0">
+              <a:solidFill>
+                <a:sysClr val="windowText" lastClr="000000"/>
+              </a:solidFill>
+            </a:endParaRPr>
+          </a:p>
+        </p:txBody>
+      </p:sp>
+      <p:sp>
+        <p:nvSpPr>
+          <p:cNvPr id="195" name="Rectangle 194"/>
+          <p:cNvSpPr/>
+          <p:nvPr/>
+        </p:nvSpPr>
+        <p:spPr>
+          <a:xfrm>
+            <a:off x="1690208" y="3611056"/>
+            <a:ext cx="457599" cy="453839"/>
+          </a:xfrm>
+          <a:prstGeom prst="rect">
+            <a:avLst/>
+          </a:prstGeom>
+          <a:solidFill>
+            <a:schemeClr val="bg1"/>
+          </a:solidFill>
+        </p:spPr>
+        <p:style>
+          <a:lnRef idx="2">
+            <a:schemeClr val="accent1">
+              <a:shade val="50000"/>
+            </a:schemeClr>
+          </a:lnRef>
+          <a:fillRef idx="1">
+            <a:schemeClr val="accent1"/>
+          </a:fillRef>
+          <a:effectRef idx="0">
+            <a:schemeClr val="accent1"/>
+          </a:effectRef>
+          <a:fontRef idx="minor">
+            <a:schemeClr val="lt1"/>
+          </a:fontRef>
+        </p:style>
+        <p:txBody>
+          <a:bodyPr rtlCol="0" anchor="ctr"/>
+          <a:lstStyle/>
+          <a:p>
+            <a:pPr algn="ctr"/>
+            <a:r>
+              <a:rPr lang="en-US" dirty="0" smtClean="0">
+                <a:solidFill>
+                  <a:sysClr val="windowText" lastClr="000000"/>
+                </a:solidFill>
+              </a:rPr>
+              <a:t>0</a:t>
+            </a:r>
+            <a:endParaRPr lang="en-US" dirty="0">
+              <a:solidFill>
+                <a:sysClr val="windowText" lastClr="000000"/>
+              </a:solidFill>
+            </a:endParaRPr>
+          </a:p>
+        </p:txBody>
+      </p:sp>
+      <p:sp>
+        <p:nvSpPr>
+          <p:cNvPr id="196" name="Rectangle 195"/>
+          <p:cNvSpPr/>
+          <p:nvPr/>
+        </p:nvSpPr>
+        <p:spPr>
+          <a:xfrm>
+            <a:off x="2147807" y="3611056"/>
+            <a:ext cx="457599" cy="453839"/>
+          </a:xfrm>
+          <a:prstGeom prst="rect">
+            <a:avLst/>
+          </a:prstGeom>
+          <a:solidFill>
+            <a:schemeClr val="accent1">
+              <a:lumMod val="75000"/>
+            </a:schemeClr>
+          </a:solidFill>
+        </p:spPr>
+        <p:style>
+          <a:lnRef idx="2">
+            <a:schemeClr val="accent1">
+              <a:shade val="50000"/>
+            </a:schemeClr>
+          </a:lnRef>
+          <a:fillRef idx="1">
+            <a:schemeClr val="accent1"/>
+          </a:fillRef>
+          <a:effectRef idx="0">
+            <a:schemeClr val="accent1"/>
+          </a:effectRef>
+          <a:fontRef idx="minor">
+            <a:schemeClr val="lt1"/>
+          </a:fontRef>
+        </p:style>
+        <p:txBody>
+          <a:bodyPr rtlCol="0" anchor="ctr"/>
+          <a:lstStyle/>
+          <a:p>
+            <a:pPr algn="ctr"/>
+            <a:r>
+              <a:rPr lang="en-US" dirty="0" smtClean="0"/>
+              <a:t>1</a:t>
+            </a:r>
+            <a:endParaRPr lang="en-US" dirty="0"/>
+          </a:p>
+        </p:txBody>
+      </p:sp>
+      <p:sp>
+        <p:nvSpPr>
+          <p:cNvPr id="197" name="Rectangle 196"/>
+          <p:cNvSpPr/>
+          <p:nvPr/>
+        </p:nvSpPr>
+        <p:spPr>
+          <a:xfrm>
+            <a:off x="2146700" y="2703376"/>
+            <a:ext cx="457599" cy="453839"/>
+          </a:xfrm>
+          <a:prstGeom prst="rect">
+            <a:avLst/>
+          </a:prstGeom>
+          <a:solidFill>
+            <a:schemeClr val="bg1"/>
+          </a:solidFill>
+        </p:spPr>
+        <p:style>
+          <a:lnRef idx="2">
+            <a:schemeClr val="accent1">
+              <a:shade val="50000"/>
+            </a:schemeClr>
+          </a:lnRef>
+          <a:fillRef idx="1">
+            <a:schemeClr val="accent1"/>
+          </a:fillRef>
+          <a:effectRef idx="0">
+            <a:schemeClr val="accent1"/>
+          </a:effectRef>
+          <a:fontRef idx="minor">
+            <a:schemeClr val="lt1"/>
+          </a:fontRef>
+        </p:style>
+        <p:txBody>
+          <a:bodyPr rtlCol="0" anchor="ctr"/>
+          <a:lstStyle/>
+          <a:p>
+            <a:pPr algn="ctr"/>
+            <a:r>
+              <a:rPr lang="en-US" dirty="0" smtClean="0">
+                <a:solidFill>
+                  <a:sysClr val="windowText" lastClr="000000"/>
+                </a:solidFill>
+              </a:rPr>
+              <a:t>0</a:t>
+            </a:r>
+            <a:endParaRPr lang="en-US" dirty="0">
+              <a:solidFill>
+                <a:sysClr val="windowText" lastClr="000000"/>
+              </a:solidFill>
+            </a:endParaRPr>
+          </a:p>
+        </p:txBody>
+      </p:sp>
+      <p:sp>
+        <p:nvSpPr>
+          <p:cNvPr id="198" name="Rectangle 197"/>
+          <p:cNvSpPr/>
+          <p:nvPr/>
+        </p:nvSpPr>
+        <p:spPr>
+          <a:xfrm>
+            <a:off x="1690847" y="2703376"/>
+            <a:ext cx="457599" cy="453839"/>
+          </a:xfrm>
+          <a:prstGeom prst="rect">
+            <a:avLst/>
+          </a:prstGeom>
+          <a:solidFill>
+            <a:schemeClr val="accent1">
+              <a:lumMod val="75000"/>
+            </a:schemeClr>
+          </a:solidFill>
+        </p:spPr>
+        <p:style>
+          <a:lnRef idx="2">
+            <a:schemeClr val="accent1">
+              <a:shade val="50000"/>
+            </a:schemeClr>
+          </a:lnRef>
+          <a:fillRef idx="1">
+            <a:schemeClr val="accent1"/>
+          </a:fillRef>
+          <a:effectRef idx="0">
+            <a:schemeClr val="accent1"/>
+          </a:effectRef>
+          <a:fontRef idx="minor">
+            <a:schemeClr val="lt1"/>
+          </a:fontRef>
+        </p:style>
+        <p:txBody>
+          <a:bodyPr rtlCol="0" anchor="ctr"/>
+          <a:lstStyle/>
+          <a:p>
+            <a:pPr algn="ctr"/>
+            <a:r>
+              <a:rPr lang="en-US" dirty="0" smtClean="0">
+                <a:effectLst>
+                  <a:outerShdw blurRad="38100" dist="38100" dir="2700000" algn="tl">
+                    <a:srgbClr val="000000">
+                      <a:alpha val="43137"/>
+                    </a:srgbClr>
+                  </a:outerShdw>
+                </a:effectLst>
+              </a:rPr>
+              <a:t>1</a:t>
+            </a:r>
+            <a:endParaRPr lang="en-US" dirty="0">
+              <a:effectLst>
+                <a:outerShdw blurRad="38100" dist="38100" dir="2700000" algn="tl">
+                  <a:srgbClr val="000000">
+                    <a:alpha val="43137"/>
+                  </a:srgbClr>
+                </a:outerShdw>
+              </a:effectLst>
+            </a:endParaRPr>
+          </a:p>
+        </p:txBody>
+      </p:sp>
+      <p:sp>
+        <p:nvSpPr>
+          <p:cNvPr id="200" name="Rectangle 199"/>
+          <p:cNvSpPr/>
+          <p:nvPr/>
+        </p:nvSpPr>
+        <p:spPr>
+          <a:xfrm>
+            <a:off x="1232976" y="2249539"/>
+            <a:ext cx="457599" cy="453839"/>
+          </a:xfrm>
+          <a:prstGeom prst="rect">
+            <a:avLst/>
+          </a:prstGeom>
+          <a:solidFill>
+            <a:schemeClr val="bg1"/>
+          </a:solidFill>
+        </p:spPr>
+        <p:style>
+          <a:lnRef idx="2">
+            <a:schemeClr val="accent1">
+              <a:shade val="50000"/>
+            </a:schemeClr>
+          </a:lnRef>
+          <a:fillRef idx="1">
+            <a:schemeClr val="accent1"/>
+          </a:fillRef>
+          <a:effectRef idx="0">
+            <a:schemeClr val="accent1"/>
+          </a:effectRef>
+          <a:fontRef idx="minor">
+            <a:schemeClr val="lt1"/>
+          </a:fontRef>
+        </p:style>
+        <p:txBody>
+          <a:bodyPr rtlCol="0" anchor="ctr"/>
+          <a:lstStyle/>
+          <a:p>
+            <a:pPr algn="ctr"/>
+            <a:r>
+              <a:rPr lang="en-US" dirty="0" smtClean="0">
+                <a:solidFill>
+                  <a:sysClr val="windowText" lastClr="000000"/>
+                </a:solidFill>
+              </a:rPr>
+              <a:t>0</a:t>
+            </a:r>
+            <a:endParaRPr lang="en-US" dirty="0">
+              <a:solidFill>
+                <a:sysClr val="windowText" lastClr="000000"/>
+              </a:solidFill>
+            </a:endParaRPr>
+          </a:p>
+        </p:txBody>
+      </p:sp>
+      <p:sp>
+        <p:nvSpPr>
+          <p:cNvPr id="201" name="Rectangle 200"/>
+          <p:cNvSpPr/>
+          <p:nvPr/>
+        </p:nvSpPr>
+        <p:spPr>
+          <a:xfrm>
+            <a:off x="1232976" y="2703378"/>
+            <a:ext cx="457599" cy="453839"/>
+          </a:xfrm>
+          <a:prstGeom prst="rect">
+            <a:avLst/>
+          </a:prstGeom>
+          <a:solidFill>
+            <a:schemeClr val="bg1"/>
+          </a:solidFill>
+        </p:spPr>
+        <p:style>
+          <a:lnRef idx="2">
+            <a:schemeClr val="accent1">
+              <a:shade val="50000"/>
+            </a:schemeClr>
+          </a:lnRef>
+          <a:fillRef idx="1">
+            <a:schemeClr val="accent1"/>
+          </a:fillRef>
+          <a:effectRef idx="0">
+            <a:schemeClr val="accent1"/>
+          </a:effectRef>
+          <a:fontRef idx="minor">
+            <a:schemeClr val="lt1"/>
+          </a:fontRef>
+        </p:style>
+        <p:txBody>
+          <a:bodyPr rtlCol="0" anchor="ctr"/>
+          <a:lstStyle/>
+          <a:p>
+            <a:pPr algn="ctr"/>
+            <a:r>
+              <a:rPr lang="en-US" dirty="0" smtClean="0">
+                <a:solidFill>
+                  <a:sysClr val="windowText" lastClr="000000"/>
+                </a:solidFill>
+              </a:rPr>
+              <a:t>0</a:t>
+            </a:r>
+            <a:endParaRPr lang="en-US" dirty="0">
+              <a:solidFill>
+                <a:sysClr val="windowText" lastClr="000000"/>
+              </a:solidFill>
+            </a:endParaRPr>
+          </a:p>
+        </p:txBody>
+      </p:sp>
+      <p:sp>
+        <p:nvSpPr>
+          <p:cNvPr id="202" name="Rectangle 201"/>
+          <p:cNvSpPr/>
+          <p:nvPr/>
+        </p:nvSpPr>
+        <p:spPr>
+          <a:xfrm>
+            <a:off x="1232976" y="3157217"/>
+            <a:ext cx="457599" cy="453839"/>
+          </a:xfrm>
+          <a:prstGeom prst="rect">
+            <a:avLst/>
+          </a:prstGeom>
+          <a:solidFill>
+            <a:schemeClr val="accent1">
+              <a:lumMod val="75000"/>
+            </a:schemeClr>
+          </a:solidFill>
+        </p:spPr>
+        <p:style>
+          <a:lnRef idx="2">
+            <a:schemeClr val="accent1">
+              <a:shade val="50000"/>
+            </a:schemeClr>
+          </a:lnRef>
+          <a:fillRef idx="1">
+            <a:schemeClr val="accent1"/>
+          </a:fillRef>
+          <a:effectRef idx="0">
+            <a:schemeClr val="accent1"/>
+          </a:effectRef>
+          <a:fontRef idx="minor">
+            <a:schemeClr val="lt1"/>
+          </a:fontRef>
+        </p:style>
+        <p:txBody>
+          <a:bodyPr rtlCol="0" anchor="ctr"/>
+          <a:lstStyle/>
+          <a:p>
+            <a:pPr algn="ctr"/>
+            <a:r>
+              <a:rPr lang="en-US" dirty="0" smtClean="0"/>
+              <a:t>1</a:t>
+            </a:r>
+            <a:endParaRPr lang="en-US" dirty="0"/>
+          </a:p>
+        </p:txBody>
+      </p:sp>
+      <p:sp>
+        <p:nvSpPr>
+          <p:cNvPr id="203" name="Rectangle 202"/>
+          <p:cNvSpPr/>
+          <p:nvPr/>
+        </p:nvSpPr>
+        <p:spPr>
+          <a:xfrm>
+            <a:off x="1232976" y="3611056"/>
+            <a:ext cx="457599" cy="453839"/>
+          </a:xfrm>
+          <a:prstGeom prst="rect">
+            <a:avLst/>
+          </a:prstGeom>
+          <a:solidFill>
+            <a:schemeClr val="bg1"/>
+          </a:solidFill>
+        </p:spPr>
+        <p:style>
+          <a:lnRef idx="2">
+            <a:schemeClr val="accent1">
+              <a:shade val="50000"/>
+            </a:schemeClr>
+          </a:lnRef>
+          <a:fillRef idx="1">
+            <a:schemeClr val="accent1"/>
+          </a:fillRef>
+          <a:effectRef idx="0">
+            <a:schemeClr val="accent1"/>
+          </a:effectRef>
+          <a:fontRef idx="minor">
+            <a:schemeClr val="lt1"/>
+          </a:fontRef>
+        </p:style>
+        <p:txBody>
+          <a:bodyPr rtlCol="0" anchor="ctr"/>
+          <a:lstStyle/>
+          <a:p>
+            <a:pPr algn="ctr"/>
+            <a:r>
+              <a:rPr lang="en-US" dirty="0" smtClean="0">
+                <a:solidFill>
+                  <a:sysClr val="windowText" lastClr="000000"/>
+                </a:solidFill>
+              </a:rPr>
+              <a:t>0</a:t>
+            </a:r>
+            <a:endParaRPr lang="en-US" dirty="0">
+              <a:solidFill>
+                <a:sysClr val="windowText" lastClr="000000"/>
+              </a:solidFill>
+            </a:endParaRPr>
+          </a:p>
+        </p:txBody>
+      </p:sp>
+      <p:sp>
+        <p:nvSpPr>
+          <p:cNvPr id="228" name="Rectangle 227"/>
+          <p:cNvSpPr/>
+          <p:nvPr/>
+        </p:nvSpPr>
+        <p:spPr>
+          <a:xfrm>
+            <a:off x="904081" y="952169"/>
+            <a:ext cx="4572000" cy="606467"/>
+          </a:xfrm>
+          <a:prstGeom prst="rect">
+            <a:avLst/>
+          </a:prstGeom>
+          <a:noFill/>
+          <a:ln>
+            <a:noFill/>
+          </a:ln>
+        </p:spPr>
+        <p:style>
+          <a:lnRef idx="2">
+            <a:schemeClr val="accent1">
+              <a:shade val="50000"/>
+            </a:schemeClr>
+          </a:lnRef>
+          <a:fillRef idx="1">
+            <a:schemeClr val="accent1"/>
+          </a:fillRef>
+          <a:effectRef idx="0">
+            <a:schemeClr val="accent1"/>
+          </a:effectRef>
+          <a:fontRef idx="minor">
+            <a:schemeClr val="lt1"/>
+          </a:fontRef>
+        </p:style>
+        <p:txBody>
+          <a:bodyPr rtlCol="0" anchor="ctr"/>
+          <a:lstStyle/>
+          <a:p>
+            <a:pPr algn="ctr"/>
+            <a:r>
+              <a:rPr lang="en-US" sz="2800" b="1" spc="600" dirty="0" smtClean="0">
+                <a:solidFill>
+                  <a:schemeClr val="bg2">
+                    <a:lumMod val="75000"/>
+                  </a:schemeClr>
+                </a:solidFill>
+                <a:latin typeface="Courier New" panose="02070309020205020404" pitchFamily="49" charset="0"/>
+                <a:cs typeface="Courier New" panose="02070309020205020404" pitchFamily="49" charset="0"/>
+              </a:rPr>
+              <a:t>…CG</a:t>
+            </a:r>
+            <a:r>
+              <a:rPr lang="en-US" sz="2800" b="1" spc="600" dirty="0" smtClean="0">
+                <a:solidFill>
+                  <a:sysClr val="windowText" lastClr="000000"/>
+                </a:solidFill>
+                <a:latin typeface="Courier New" panose="02070309020205020404" pitchFamily="49" charset="0"/>
+                <a:cs typeface="Courier New" panose="02070309020205020404" pitchFamily="49" charset="0"/>
+              </a:rPr>
+              <a:t>GCTACTCTG</a:t>
+            </a:r>
+            <a:r>
+              <a:rPr lang="en-US" sz="2800" b="1" spc="600" dirty="0" smtClean="0">
+                <a:solidFill>
+                  <a:schemeClr val="bg2">
+                    <a:lumMod val="75000"/>
+                  </a:schemeClr>
+                </a:solidFill>
+                <a:latin typeface="Courier New" panose="02070309020205020404" pitchFamily="49" charset="0"/>
+                <a:cs typeface="Courier New" panose="02070309020205020404" pitchFamily="49" charset="0"/>
+              </a:rPr>
+              <a:t>TA…</a:t>
+            </a:r>
+            <a:endParaRPr lang="en-US" sz="2800" b="1" spc="600" dirty="0">
+              <a:solidFill>
+                <a:schemeClr val="bg2">
+                  <a:lumMod val="75000"/>
+                </a:schemeClr>
+              </a:solidFill>
+              <a:latin typeface="Courier New" panose="02070309020205020404" pitchFamily="49" charset="0"/>
+              <a:cs typeface="Courier New" panose="02070309020205020404" pitchFamily="49" charset="0"/>
+            </a:endParaRPr>
+          </a:p>
+        </p:txBody>
+      </p:sp>
+      <p:sp>
+        <p:nvSpPr>
+          <p:cNvPr id="2" name="Rectangle 1"/>
+          <p:cNvSpPr/>
+          <p:nvPr/>
+        </p:nvSpPr>
+        <p:spPr>
+          <a:xfrm>
+            <a:off x="1849120" y="1032525"/>
+            <a:ext cx="2588975" cy="450835"/>
+          </a:xfrm>
+          <a:prstGeom prst="rect">
+            <a:avLst/>
+          </a:prstGeom>
+          <a:noFill/>
+          <a:ln w="38100">
+            <a:solidFill>
+              <a:srgbClr val="C00000"/>
+            </a:solidFill>
+          </a:ln>
+        </p:spPr>
+        <p:style>
+          <a:lnRef idx="2">
+            <a:schemeClr val="accent1">
+              <a:shade val="50000"/>
+            </a:schemeClr>
+          </a:lnRef>
+          <a:fillRef idx="1">
+            <a:schemeClr val="accent1"/>
+          </a:fillRef>
+          <a:effectRef idx="0">
+            <a:schemeClr val="accent1"/>
+          </a:effectRef>
+          <a:fontRef idx="minor">
+            <a:schemeClr val="lt1"/>
+          </a:fontRef>
+        </p:style>
+        <p:txBody>
+          <a:bodyPr rtlCol="0" anchor="ctr"/>
+          <a:lstStyle/>
+          <a:p>
+            <a:pPr algn="ctr"/>
+            <a:endParaRPr lang="en-US"/>
+          </a:p>
+        </p:txBody>
+      </p:sp>
+      <p:pic>
+        <p:nvPicPr>
+          <p:cNvPr id="5" name="Picture 4"/>
+          <p:cNvPicPr>
+            <a:picLocks noChangeAspect="1"/>
+          </p:cNvPicPr>
+          <p:nvPr/>
+        </p:nvPicPr>
+        <p:blipFill rotWithShape="1">
+          <a:blip r:embed="rId2" cstate="print">
+            <a:extLst>
+              <a:ext uri="{28A0092B-C50C-407E-A947-70E740481C1C}">
+                <a14:useLocalDpi xmlns:a14="http://schemas.microsoft.com/office/drawing/2010/main" val="0"/>
+              </a:ext>
+            </a:extLst>
+          </a:blip>
+          <a:srcRect l="12284" t="13746" r="9399" b="14361"/>
+          <a:stretch/>
+        </p:blipFill>
+        <p:spPr>
+          <a:xfrm>
+            <a:off x="5979733" y="2217962"/>
+            <a:ext cx="4197647" cy="1878506"/>
+          </a:xfrm>
+          <a:prstGeom prst="rect">
+            <a:avLst/>
+          </a:prstGeom>
+        </p:spPr>
+      </p:pic>
+      <p:cxnSp>
+        <p:nvCxnSpPr>
+          <p:cNvPr id="7" name="Straight Arrow Connector 6"/>
+          <p:cNvCxnSpPr/>
+          <p:nvPr/>
+        </p:nvCxnSpPr>
+        <p:spPr>
+          <a:xfrm>
+            <a:off x="4206360" y="876893"/>
+            <a:ext cx="901161" cy="3397"/>
+          </a:xfrm>
+          <a:prstGeom prst="straightConnector1">
+            <a:avLst/>
+          </a:prstGeom>
+          <a:ln w="57150">
+            <a:solidFill>
+              <a:srgbClr val="C00000"/>
+            </a:solidFill>
+            <a:tailEnd type="triangle"/>
+          </a:ln>
+        </p:spPr>
+        <p:style>
+          <a:lnRef idx="1">
+            <a:schemeClr val="accent1"/>
+          </a:lnRef>
+          <a:fillRef idx="0">
+            <a:schemeClr val="accent1"/>
+          </a:fillRef>
+          <a:effectRef idx="0">
+            <a:schemeClr val="accent1"/>
+          </a:effectRef>
+          <a:fontRef idx="minor">
+            <a:schemeClr val="tx1"/>
+          </a:fontRef>
+        </p:style>
+      </p:cxnSp>
+      <p:sp>
+        <p:nvSpPr>
+          <p:cNvPr id="265" name="Rectangle 264"/>
+          <p:cNvSpPr/>
+          <p:nvPr/>
+        </p:nvSpPr>
+        <p:spPr>
+          <a:xfrm>
+            <a:off x="2604531" y="2703376"/>
+            <a:ext cx="457599" cy="453839"/>
+          </a:xfrm>
+          <a:prstGeom prst="rect">
+            <a:avLst/>
+          </a:prstGeom>
+          <a:solidFill>
+            <a:schemeClr val="bg1"/>
+          </a:solidFill>
+        </p:spPr>
+        <p:style>
+          <a:lnRef idx="2">
+            <a:schemeClr val="accent1">
+              <a:shade val="50000"/>
+            </a:schemeClr>
+          </a:lnRef>
+          <a:fillRef idx="1">
+            <a:schemeClr val="accent1"/>
+          </a:fillRef>
+          <a:effectRef idx="0">
+            <a:schemeClr val="accent1"/>
+          </a:effectRef>
+          <a:fontRef idx="minor">
+            <a:schemeClr val="lt1"/>
+          </a:fontRef>
+        </p:style>
+        <p:txBody>
+          <a:bodyPr rtlCol="0" anchor="ctr"/>
+          <a:lstStyle/>
+          <a:p>
+            <a:pPr algn="ctr"/>
+            <a:r>
+              <a:rPr lang="en-US" dirty="0" smtClean="0">
+                <a:solidFill>
+                  <a:sysClr val="windowText" lastClr="000000"/>
+                </a:solidFill>
+              </a:rPr>
+              <a:t>0</a:t>
+            </a:r>
+            <a:endParaRPr lang="en-US" dirty="0">
+              <a:solidFill>
+                <a:sysClr val="windowText" lastClr="000000"/>
+              </a:solidFill>
+            </a:endParaRPr>
+          </a:p>
+        </p:txBody>
+      </p:sp>
+      <p:sp>
+        <p:nvSpPr>
+          <p:cNvPr id="11" name="Oval 10"/>
+          <p:cNvSpPr/>
+          <p:nvPr/>
+        </p:nvSpPr>
+        <p:spPr>
+          <a:xfrm>
+            <a:off x="5600102" y="2989580"/>
+            <a:ext cx="150832" cy="167635"/>
+          </a:xfrm>
+          <a:prstGeom prst="ellipse">
+            <a:avLst/>
+          </a:prstGeom>
+          <a:solidFill>
+            <a:schemeClr val="bg1"/>
+          </a:solidFill>
+          <a:ln w="57150">
+            <a:solidFill>
+              <a:schemeClr val="tx1"/>
+            </a:solidFill>
+          </a:ln>
+        </p:spPr>
+        <p:style>
+          <a:lnRef idx="2">
+            <a:schemeClr val="accent1">
+              <a:shade val="50000"/>
+            </a:schemeClr>
+          </a:lnRef>
+          <a:fillRef idx="1">
+            <a:schemeClr val="accent1"/>
+          </a:fillRef>
+          <a:effectRef idx="0">
+            <a:schemeClr val="accent1"/>
+          </a:effectRef>
+          <a:fontRef idx="minor">
+            <a:schemeClr val="lt1"/>
+          </a:fontRef>
+        </p:style>
+        <p:txBody>
+          <a:bodyPr rtlCol="0" anchor="ctr"/>
+          <a:lstStyle/>
+          <a:p>
+            <a:pPr algn="ctr"/>
+            <a:endParaRPr lang="en-US"/>
+          </a:p>
+        </p:txBody>
+      </p:sp>
+      <p:sp>
+        <p:nvSpPr>
+          <p:cNvPr id="12" name="Equal 11"/>
+          <p:cNvSpPr/>
+          <p:nvPr/>
+        </p:nvSpPr>
+        <p:spPr>
+          <a:xfrm>
+            <a:off x="10332122" y="2905760"/>
+            <a:ext cx="571500" cy="251455"/>
+          </a:xfrm>
+          <a:prstGeom prst="mathEqual">
+            <a:avLst>
+              <a:gd name="adj1" fmla="val 26550"/>
+              <a:gd name="adj2" fmla="val 36003"/>
+            </a:avLst>
+          </a:prstGeom>
+          <a:solidFill>
+            <a:schemeClr val="tx1"/>
+          </a:solidFill>
+          <a:ln>
+            <a:solidFill>
+              <a:schemeClr val="tx1"/>
+            </a:solidFill>
+          </a:ln>
+        </p:spPr>
+        <p:style>
+          <a:lnRef idx="2">
+            <a:schemeClr val="accent1">
+              <a:shade val="50000"/>
+            </a:schemeClr>
+          </a:lnRef>
+          <a:fillRef idx="1">
+            <a:schemeClr val="accent1"/>
+          </a:fillRef>
+          <a:effectRef idx="0">
+            <a:schemeClr val="accent1"/>
+          </a:effectRef>
+          <a:fontRef idx="minor">
+            <a:schemeClr val="lt1"/>
+          </a:fontRef>
+        </p:style>
+        <p:txBody>
+          <a:bodyPr rtlCol="0" anchor="ctr"/>
+          <a:lstStyle/>
+          <a:p>
+            <a:pPr algn="ctr"/>
+            <a:endParaRPr lang="en-US">
+              <a:solidFill>
+                <a:schemeClr val="tx1"/>
+              </a:solidFill>
+            </a:endParaRPr>
+          </a:p>
+        </p:txBody>
+      </p:sp>
+      <p:cxnSp>
+        <p:nvCxnSpPr>
+          <p:cNvPr id="21" name="Straight Connector 20"/>
+          <p:cNvCxnSpPr/>
+          <p:nvPr/>
+        </p:nvCxnSpPr>
+        <p:spPr>
+          <a:xfrm flipH="1">
+            <a:off x="1232976" y="1032525"/>
+            <a:ext cx="616144" cy="1217014"/>
+          </a:xfrm>
+          <a:prstGeom prst="line">
+            <a:avLst/>
+          </a:prstGeom>
+          <a:ln w="12700">
+            <a:solidFill>
+              <a:srgbClr val="C00000"/>
+            </a:solidFill>
+          </a:ln>
+        </p:spPr>
+        <p:style>
+          <a:lnRef idx="1">
+            <a:schemeClr val="accent1"/>
+          </a:lnRef>
+          <a:fillRef idx="0">
+            <a:schemeClr val="accent1"/>
+          </a:fillRef>
+          <a:effectRef idx="0">
+            <a:schemeClr val="accent1"/>
+          </a:effectRef>
+          <a:fontRef idx="minor">
+            <a:schemeClr val="tx1"/>
+          </a:fontRef>
+        </p:style>
+      </p:cxnSp>
+      <p:cxnSp>
+        <p:nvCxnSpPr>
+          <p:cNvPr id="266" name="Straight Connector 265"/>
+          <p:cNvCxnSpPr/>
+          <p:nvPr/>
+        </p:nvCxnSpPr>
+        <p:spPr>
+          <a:xfrm>
+            <a:off x="4435160" y="1032525"/>
+            <a:ext cx="915198" cy="1185437"/>
+          </a:xfrm>
+          <a:prstGeom prst="line">
+            <a:avLst/>
+          </a:prstGeom>
+          <a:ln w="12700">
+            <a:solidFill>
+              <a:srgbClr val="C00000"/>
+            </a:solidFill>
+          </a:ln>
+        </p:spPr>
+        <p:style>
+          <a:lnRef idx="1">
+            <a:schemeClr val="accent1"/>
+          </a:lnRef>
+          <a:fillRef idx="0">
+            <a:schemeClr val="accent1"/>
+          </a:fillRef>
+          <a:effectRef idx="0">
+            <a:schemeClr val="accent1"/>
+          </a:effectRef>
+          <a:fontRef idx="minor">
+            <a:schemeClr val="tx1"/>
+          </a:fontRef>
+        </p:style>
+      </p:cxnSp>
+      <p:sp>
+        <p:nvSpPr>
+          <p:cNvPr id="267" name="Rectangle 266"/>
+          <p:cNvSpPr/>
+          <p:nvPr/>
+        </p:nvSpPr>
+        <p:spPr>
+          <a:xfrm>
+            <a:off x="5804976" y="1596897"/>
+            <a:ext cx="4572000" cy="606467"/>
+          </a:xfrm>
+          <a:prstGeom prst="rect">
+            <a:avLst/>
+          </a:prstGeom>
+          <a:noFill/>
+          <a:ln>
+            <a:noFill/>
+          </a:ln>
+        </p:spPr>
+        <p:style>
+          <a:lnRef idx="2">
+            <a:schemeClr val="accent1">
+              <a:shade val="50000"/>
+            </a:schemeClr>
+          </a:lnRef>
+          <a:fillRef idx="1">
+            <a:schemeClr val="accent1"/>
+          </a:fillRef>
+          <a:effectRef idx="0">
+            <a:schemeClr val="accent1"/>
+          </a:effectRef>
+          <a:fontRef idx="minor">
+            <a:schemeClr val="lt1"/>
+          </a:fontRef>
+        </p:style>
+        <p:txBody>
+          <a:bodyPr rtlCol="0" anchor="ctr"/>
+          <a:lstStyle/>
+          <a:p>
+            <a:pPr algn="ctr"/>
+            <a:r>
+              <a:rPr lang="en-US" sz="2800" dirty="0" smtClean="0">
+                <a:ln w="0"/>
+                <a:solidFill>
+                  <a:schemeClr val="accent1"/>
+                </a:solidFill>
+                <a:effectLst>
+                  <a:outerShdw blurRad="38100" dist="25400" dir="5400000" algn="ctr" rotWithShape="0">
+                    <a:srgbClr val="6E747A">
+                      <a:alpha val="43000"/>
+                    </a:srgbClr>
+                  </a:outerShdw>
+                </a:effectLst>
+                <a:latin typeface="Courier New" panose="02070309020205020404" pitchFamily="49" charset="0"/>
+                <a:cs typeface="Courier New" panose="02070309020205020404" pitchFamily="49" charset="0"/>
+              </a:rPr>
+              <a:t>PWM</a:t>
+            </a:r>
+            <a:endParaRPr lang="en-US" sz="2800" dirty="0">
+              <a:ln w="0"/>
+              <a:solidFill>
+                <a:schemeClr val="accent1"/>
+              </a:solidFill>
+              <a:effectLst>
+                <a:outerShdw blurRad="38100" dist="25400" dir="5400000" algn="ctr" rotWithShape="0">
+                  <a:srgbClr val="6E747A">
+                    <a:alpha val="43000"/>
+                  </a:srgbClr>
+                </a:outerShdw>
+              </a:effectLst>
+              <a:latin typeface="Courier New" panose="02070309020205020404" pitchFamily="49" charset="0"/>
+              <a:cs typeface="Courier New" panose="02070309020205020404" pitchFamily="49" charset="0"/>
+            </a:endParaRPr>
+          </a:p>
+        </p:txBody>
+      </p:sp>
+    </p:spTree>
+    <p:extLst>
+      <p:ext uri="{BB962C8B-B14F-4D97-AF65-F5344CB8AC3E}">
+        <p14:creationId xmlns:p14="http://schemas.microsoft.com/office/powerpoint/2010/main" val="3361739492"/>
+      </p:ext>
+    </p:extLst>
+  </p:cSld>
+  <p:clrMapOvr>
+    <a:masterClrMapping/>
+  </p:clrMapOvr>
+</p:sld>
+</file>
+
+<file path=ppt/slides/slide13.xml><?xml version="1.0" encoding="utf-8"?>
+<p:sld xmlns:a="http://schemas.openxmlformats.org/drawingml/2006/main" xmlns:r="http://schemas.openxmlformats.org/officeDocument/2006/relationships" xmlns:p="http://schemas.openxmlformats.org/presentationml/2006/main">
+  <p:cSld>
+    <p:spTree>
+      <p:nvGrpSpPr>
+        <p:cNvPr id="1" name=""/>
+        <p:cNvGrpSpPr/>
+        <p:nvPr/>
+      </p:nvGrpSpPr>
+      <p:grpSpPr>
+        <a:xfrm>
+          <a:off x="0" y="0"/>
+          <a:ext cx="0" cy="0"/>
+          <a:chOff x="0" y="0"/>
+          <a:chExt cx="0" cy="0"/>
+        </a:xfrm>
+      </p:grpSpPr>
+      <p:grpSp>
+        <p:nvGrpSpPr>
+          <p:cNvPr id="39" name="Group 38"/>
+          <p:cNvGrpSpPr/>
+          <p:nvPr/>
+        </p:nvGrpSpPr>
+        <p:grpSpPr>
+          <a:xfrm>
+            <a:off x="-448166" y="369796"/>
+            <a:ext cx="12818953" cy="5092508"/>
+            <a:chOff x="-448166" y="369796"/>
+            <a:chExt cx="12818953" cy="5092508"/>
+          </a:xfrm>
+        </p:grpSpPr>
+        <p:grpSp>
+          <p:nvGrpSpPr>
+            <p:cNvPr id="29" name="Group 28"/>
+            <p:cNvGrpSpPr/>
+            <p:nvPr/>
+          </p:nvGrpSpPr>
+          <p:grpSpPr>
+            <a:xfrm>
+              <a:off x="47999" y="980563"/>
+              <a:ext cx="12322788" cy="2873555"/>
+              <a:chOff x="105149" y="980563"/>
+              <a:chExt cx="12322788" cy="2873555"/>
+            </a:xfrm>
+          </p:grpSpPr>
+          <p:sp>
+            <p:nvSpPr>
+              <p:cNvPr id="11" name="Oval 10"/>
+              <p:cNvSpPr/>
+              <p:nvPr/>
+            </p:nvSpPr>
+            <p:spPr>
+              <a:xfrm>
+                <a:off x="3877757" y="2714081"/>
+                <a:ext cx="150832" cy="167635"/>
+              </a:xfrm>
+              <a:prstGeom prst="ellipse">
+                <a:avLst/>
+              </a:prstGeom>
+              <a:solidFill>
+                <a:schemeClr val="bg1"/>
+              </a:solidFill>
+              <a:ln w="57150">
+                <a:solidFill>
+                  <a:schemeClr val="tx1"/>
+                </a:solidFill>
+              </a:ln>
+            </p:spPr>
+            <p:style>
+              <a:lnRef idx="2">
+                <a:schemeClr val="accent1">
+                  <a:shade val="50000"/>
+                </a:schemeClr>
+              </a:lnRef>
+              <a:fillRef idx="1">
+                <a:schemeClr val="accent1"/>
+              </a:fillRef>
+              <a:effectRef idx="0">
+                <a:schemeClr val="accent1"/>
+              </a:effectRef>
+              <a:fontRef idx="minor">
+                <a:schemeClr val="lt1"/>
+              </a:fontRef>
+            </p:style>
+            <p:txBody>
+              <a:bodyPr rtlCol="0" anchor="ctr"/>
+              <a:lstStyle/>
+              <a:p>
+                <a:pPr algn="ctr"/>
+                <a:endParaRPr lang="en-US"/>
+              </a:p>
+            </p:txBody>
+          </p:sp>
+          <p:sp>
+            <p:nvSpPr>
+              <p:cNvPr id="12" name="Equal 11"/>
+              <p:cNvSpPr/>
+              <p:nvPr/>
+            </p:nvSpPr>
+            <p:spPr>
+              <a:xfrm>
+                <a:off x="7872443" y="2681060"/>
+                <a:ext cx="438009" cy="233675"/>
+              </a:xfrm>
+              <a:prstGeom prst="mathEqual">
+                <a:avLst>
+                  <a:gd name="adj1" fmla="val 26550"/>
+                  <a:gd name="adj2" fmla="val 36003"/>
+                </a:avLst>
+              </a:prstGeom>
+              <a:solidFill>
+                <a:schemeClr val="tx1"/>
+              </a:solidFill>
+              <a:ln>
+                <a:solidFill>
+                  <a:schemeClr val="tx1"/>
+                </a:solidFill>
+              </a:ln>
+            </p:spPr>
+            <p:style>
+              <a:lnRef idx="2">
+                <a:schemeClr val="accent1">
+                  <a:shade val="50000"/>
+                </a:schemeClr>
+              </a:lnRef>
+              <a:fillRef idx="1">
+                <a:schemeClr val="accent1"/>
+              </a:fillRef>
+              <a:effectRef idx="0">
+                <a:schemeClr val="accent1"/>
+              </a:effectRef>
+              <a:fontRef idx="minor">
+                <a:schemeClr val="lt1"/>
+              </a:fontRef>
+            </p:style>
+            <p:txBody>
+              <a:bodyPr rtlCol="0" anchor="ctr"/>
+              <a:lstStyle/>
+              <a:p>
+                <a:pPr algn="ctr"/>
+                <a:endParaRPr lang="en-US">
+                  <a:solidFill>
+                    <a:schemeClr val="tx1"/>
+                  </a:solidFill>
+                </a:endParaRPr>
+              </a:p>
+            </p:txBody>
+          </p:sp>
+          <p:cxnSp>
+            <p:nvCxnSpPr>
+              <p:cNvPr id="21" name="Straight Connector 20"/>
+              <p:cNvCxnSpPr/>
+              <p:nvPr/>
+            </p:nvCxnSpPr>
+            <p:spPr>
+              <a:xfrm flipH="1">
+                <a:off x="105149" y="981725"/>
+                <a:ext cx="585731" cy="1054546"/>
+              </a:xfrm>
+              <a:prstGeom prst="line">
+                <a:avLst/>
+              </a:prstGeom>
+              <a:ln w="12700">
+                <a:solidFill>
+                  <a:schemeClr val="tx1"/>
+                </a:solidFill>
+              </a:ln>
+            </p:spPr>
+            <p:style>
+              <a:lnRef idx="1">
+                <a:schemeClr val="accent1"/>
+              </a:lnRef>
+              <a:fillRef idx="0">
+                <a:schemeClr val="accent1"/>
+              </a:fillRef>
+              <a:effectRef idx="0">
+                <a:schemeClr val="accent1"/>
+              </a:effectRef>
+              <a:fontRef idx="minor">
+                <a:schemeClr val="tx1"/>
+              </a:fontRef>
+            </p:style>
+          </p:cxnSp>
+          <p:cxnSp>
+            <p:nvCxnSpPr>
+              <p:cNvPr id="266" name="Straight Connector 265"/>
+              <p:cNvCxnSpPr/>
+              <p:nvPr/>
+            </p:nvCxnSpPr>
+            <p:spPr>
+              <a:xfrm>
+                <a:off x="3020438" y="980563"/>
+                <a:ext cx="672361" cy="1054546"/>
+              </a:xfrm>
+              <a:prstGeom prst="line">
+                <a:avLst/>
+              </a:prstGeom>
+              <a:ln w="12700">
+                <a:solidFill>
+                  <a:schemeClr val="tx1"/>
+                </a:solidFill>
+              </a:ln>
+            </p:spPr>
+            <p:style>
+              <a:lnRef idx="1">
+                <a:schemeClr val="accent1"/>
+              </a:lnRef>
+              <a:fillRef idx="0">
+                <a:schemeClr val="accent1"/>
+              </a:fillRef>
+              <a:effectRef idx="0">
+                <a:schemeClr val="accent1"/>
+              </a:effectRef>
+              <a:fontRef idx="minor">
+                <a:schemeClr val="tx1"/>
+              </a:fontRef>
+            </p:style>
+          </p:cxnSp>
+          <p:sp>
+            <p:nvSpPr>
+              <p:cNvPr id="267" name="Rectangle 266"/>
+              <p:cNvSpPr/>
+              <p:nvPr/>
+            </p:nvSpPr>
+            <p:spPr>
+              <a:xfrm>
+                <a:off x="3681695" y="1468820"/>
+                <a:ext cx="4572000" cy="606467"/>
+              </a:xfrm>
+              <a:prstGeom prst="rect">
+                <a:avLst/>
+              </a:prstGeom>
+              <a:noFill/>
+              <a:ln>
+                <a:noFill/>
+              </a:ln>
+            </p:spPr>
+            <p:style>
+              <a:lnRef idx="2">
+                <a:schemeClr val="accent1">
+                  <a:shade val="50000"/>
+                </a:schemeClr>
+              </a:lnRef>
+              <a:fillRef idx="1">
+                <a:schemeClr val="accent1"/>
+              </a:fillRef>
+              <a:effectRef idx="0">
+                <a:schemeClr val="accent1"/>
+              </a:effectRef>
+              <a:fontRef idx="minor">
+                <a:schemeClr val="lt1"/>
+              </a:fontRef>
+            </p:style>
+            <p:txBody>
+              <a:bodyPr rtlCol="0" anchor="ctr"/>
+              <a:lstStyle/>
+              <a:p>
+                <a:pPr algn="ctr"/>
+                <a:r>
+                  <a:rPr lang="en-US" sz="2800" dirty="0" smtClean="0">
+                    <a:ln w="0"/>
+                    <a:solidFill>
+                      <a:schemeClr val="accent1"/>
+                    </a:solidFill>
+                    <a:effectLst>
+                      <a:outerShdw blurRad="38100" dist="25400" dir="5400000" algn="ctr" rotWithShape="0">
+                        <a:srgbClr val="6E747A">
+                          <a:alpha val="43000"/>
+                        </a:srgbClr>
+                      </a:outerShdw>
+                    </a:effectLst>
+                    <a:latin typeface="Courier New" panose="02070309020205020404" pitchFamily="49" charset="0"/>
+                    <a:cs typeface="Courier New" panose="02070309020205020404" pitchFamily="49" charset="0"/>
+                  </a:rPr>
+                  <a:t>PWM</a:t>
+                </a:r>
+                <a:endParaRPr lang="en-US" sz="2800" dirty="0">
+                  <a:ln w="0"/>
+                  <a:solidFill>
+                    <a:schemeClr val="accent1"/>
+                  </a:solidFill>
+                  <a:effectLst>
+                    <a:outerShdw blurRad="38100" dist="25400" dir="5400000" algn="ctr" rotWithShape="0">
+                      <a:srgbClr val="6E747A">
+                        <a:alpha val="43000"/>
+                      </a:srgbClr>
+                    </a:outerShdw>
+                  </a:effectLst>
+                  <a:latin typeface="Courier New" panose="02070309020205020404" pitchFamily="49" charset="0"/>
+                  <a:cs typeface="Courier New" panose="02070309020205020404" pitchFamily="49" charset="0"/>
+                </a:endParaRPr>
+              </a:p>
+            </p:txBody>
+          </p:sp>
+          <p:sp>
+            <p:nvSpPr>
+              <p:cNvPr id="61" name="Rectangle 60"/>
+              <p:cNvSpPr/>
+              <p:nvPr/>
+            </p:nvSpPr>
+            <p:spPr>
+              <a:xfrm>
+                <a:off x="7855937" y="1484983"/>
+                <a:ext cx="4572000" cy="606467"/>
+              </a:xfrm>
+              <a:prstGeom prst="rect">
+                <a:avLst/>
+              </a:prstGeom>
+              <a:noFill/>
+              <a:ln>
+                <a:noFill/>
+              </a:ln>
+            </p:spPr>
+            <p:style>
+              <a:lnRef idx="2">
+                <a:schemeClr val="accent1">
+                  <a:shade val="50000"/>
+                </a:schemeClr>
+              </a:lnRef>
+              <a:fillRef idx="1">
+                <a:schemeClr val="accent1"/>
+              </a:fillRef>
+              <a:effectRef idx="0">
+                <a:schemeClr val="accent1"/>
+              </a:effectRef>
+              <a:fontRef idx="minor">
+                <a:schemeClr val="lt1"/>
+              </a:fontRef>
+            </p:style>
+            <p:txBody>
+              <a:bodyPr rtlCol="0" anchor="ctr"/>
+              <a:lstStyle/>
+              <a:p>
+                <a:pPr algn="ctr"/>
+                <a:r>
+                  <a:rPr lang="en-US" sz="2800" dirty="0" smtClean="0">
+                    <a:ln w="0"/>
+                    <a:solidFill>
+                      <a:schemeClr val="accent1"/>
+                    </a:solidFill>
+                    <a:effectLst>
+                      <a:outerShdw blurRad="38100" dist="25400" dir="5400000" algn="ctr" rotWithShape="0">
+                        <a:srgbClr val="6E747A">
+                          <a:alpha val="43000"/>
+                        </a:srgbClr>
+                      </a:outerShdw>
+                    </a:effectLst>
+                    <a:latin typeface="Courier New" panose="02070309020205020404" pitchFamily="49" charset="0"/>
+                    <a:cs typeface="Courier New" panose="02070309020205020404" pitchFamily="49" charset="0"/>
+                  </a:rPr>
+                  <a:t>M</a:t>
+                </a:r>
+                <a:endParaRPr lang="en-US" sz="2800" dirty="0">
+                  <a:ln w="0"/>
+                  <a:solidFill>
+                    <a:schemeClr val="accent1"/>
+                  </a:solidFill>
+                  <a:effectLst>
+                    <a:outerShdw blurRad="38100" dist="25400" dir="5400000" algn="ctr" rotWithShape="0">
+                      <a:srgbClr val="6E747A">
+                        <a:alpha val="43000"/>
+                      </a:srgbClr>
+                    </a:outerShdw>
+                  </a:effectLst>
+                  <a:latin typeface="Courier New" panose="02070309020205020404" pitchFamily="49" charset="0"/>
+                  <a:cs typeface="Courier New" panose="02070309020205020404" pitchFamily="49" charset="0"/>
+                </a:endParaRPr>
+              </a:p>
+            </p:txBody>
+          </p:sp>
+          <p:pic>
+            <p:nvPicPr>
+              <p:cNvPr id="26" name="Picture 25"/>
+              <p:cNvPicPr>
+                <a:picLocks noChangeAspect="1"/>
+              </p:cNvPicPr>
+              <p:nvPr/>
+            </p:nvPicPr>
+            <p:blipFill rotWithShape="1">
+              <a:blip r:embed="rId2" cstate="print">
+                <a:extLst>
+                  <a:ext uri="{28A0092B-C50C-407E-A947-70E740481C1C}">
+                    <a14:useLocalDpi xmlns:a14="http://schemas.microsoft.com/office/drawing/2010/main" val="0"/>
+                  </a:ext>
+                </a:extLst>
+              </a:blip>
+              <a:srcRect l="3977" t="2455" r="4030" b="2291"/>
+              <a:stretch/>
+            </p:blipFill>
+            <p:spPr>
+              <a:xfrm>
+                <a:off x="8392584" y="2055661"/>
+                <a:ext cx="3558464" cy="1796249"/>
+              </a:xfrm>
+              <a:prstGeom prst="rect">
+                <a:avLst/>
+              </a:prstGeom>
+              <a:ln>
+                <a:solidFill>
+                  <a:schemeClr val="bg1"/>
+                </a:solidFill>
+              </a:ln>
+            </p:spPr>
+          </p:pic>
+          <p:pic>
+            <p:nvPicPr>
+              <p:cNvPr id="27" name="Picture 26"/>
+              <p:cNvPicPr>
+                <a:picLocks noChangeAspect="1"/>
+              </p:cNvPicPr>
+              <p:nvPr/>
+            </p:nvPicPr>
+            <p:blipFill rotWithShape="1">
+              <a:blip r:embed="rId3" cstate="print">
+                <a:extLst>
+                  <a:ext uri="{28A0092B-C50C-407E-A947-70E740481C1C}">
+                    <a14:useLocalDpi xmlns:a14="http://schemas.microsoft.com/office/drawing/2010/main" val="0"/>
+                  </a:ext>
+                </a:extLst>
+              </a:blip>
+              <a:srcRect l="4123" t="2855" r="3983" b="2292"/>
+              <a:stretch/>
+            </p:blipFill>
+            <p:spPr>
+              <a:xfrm>
+                <a:off x="144780" y="2032829"/>
+                <a:ext cx="3615086" cy="1819081"/>
+              </a:xfrm>
+              <a:prstGeom prst="rect">
+                <a:avLst/>
+              </a:prstGeom>
+              <a:noFill/>
+              <a:ln>
+                <a:noFill/>
+              </a:ln>
+            </p:spPr>
+          </p:pic>
+          <p:pic>
+            <p:nvPicPr>
+              <p:cNvPr id="28" name="Picture 27"/>
+              <p:cNvPicPr>
+                <a:picLocks noChangeAspect="1"/>
+              </p:cNvPicPr>
+              <p:nvPr/>
+            </p:nvPicPr>
+            <p:blipFill rotWithShape="1">
+              <a:blip r:embed="rId4" cstate="print">
+                <a:extLst>
+                  <a:ext uri="{28A0092B-C50C-407E-A947-70E740481C1C}">
+                    <a14:useLocalDpi xmlns:a14="http://schemas.microsoft.com/office/drawing/2010/main" val="0"/>
+                  </a:ext>
+                </a:extLst>
+              </a:blip>
+              <a:srcRect l="3903" t="2455" r="3811" b="2692"/>
+              <a:stretch/>
+            </p:blipFill>
+            <p:spPr>
+              <a:xfrm>
+                <a:off x="4146480" y="2035109"/>
+                <a:ext cx="3630326" cy="1819009"/>
+              </a:xfrm>
+              <a:prstGeom prst="rect">
+                <a:avLst/>
+              </a:prstGeom>
+              <a:ln>
+                <a:solidFill>
+                  <a:schemeClr val="bg1"/>
+                </a:solidFill>
+              </a:ln>
+            </p:spPr>
+          </p:pic>
+        </p:grpSp>
+        <p:grpSp>
+          <p:nvGrpSpPr>
+            <p:cNvPr id="32" name="Group 31"/>
+            <p:cNvGrpSpPr/>
+            <p:nvPr/>
+          </p:nvGrpSpPr>
+          <p:grpSpPr>
+            <a:xfrm>
+              <a:off x="-448166" y="369796"/>
+              <a:ext cx="4572000" cy="681743"/>
+              <a:chOff x="0" y="4222025"/>
+              <a:chExt cx="4572000" cy="681743"/>
+            </a:xfrm>
+          </p:grpSpPr>
+          <p:sp>
+            <p:nvSpPr>
+              <p:cNvPr id="72" name="Rectangle 71"/>
+              <p:cNvSpPr/>
+              <p:nvPr/>
+            </p:nvSpPr>
+            <p:spPr>
+              <a:xfrm>
+                <a:off x="0" y="4297301"/>
+                <a:ext cx="4572000" cy="606467"/>
+              </a:xfrm>
+              <a:prstGeom prst="rect">
+                <a:avLst/>
+              </a:prstGeom>
+              <a:noFill/>
+              <a:ln>
+                <a:noFill/>
+              </a:ln>
+            </p:spPr>
+            <p:style>
+              <a:lnRef idx="2">
+                <a:schemeClr val="accent1">
+                  <a:shade val="50000"/>
+                </a:schemeClr>
+              </a:lnRef>
+              <a:fillRef idx="1">
+                <a:schemeClr val="accent1"/>
+              </a:fillRef>
+              <a:effectRef idx="0">
+                <a:schemeClr val="accent1"/>
+              </a:effectRef>
+              <a:fontRef idx="minor">
+                <a:schemeClr val="lt1"/>
+              </a:fontRef>
+            </p:style>
+            <p:txBody>
+              <a:bodyPr rtlCol="0" anchor="ctr"/>
+              <a:lstStyle/>
+              <a:p>
+                <a:pPr algn="ctr"/>
+                <a:r>
+                  <a:rPr lang="en-US" sz="2800" b="1" spc="600" dirty="0" smtClean="0">
+                    <a:solidFill>
+                      <a:schemeClr val="bg2">
+                        <a:lumMod val="75000"/>
+                      </a:schemeClr>
+                    </a:solidFill>
+                    <a:latin typeface="Courier New" panose="02070309020205020404" pitchFamily="49" charset="0"/>
+                    <a:cs typeface="Courier New" panose="02070309020205020404" pitchFamily="49" charset="0"/>
+                  </a:rPr>
+                  <a:t>…CG</a:t>
+                </a:r>
+                <a:r>
+                  <a:rPr lang="en-US" sz="2800" b="1" spc="600" dirty="0" smtClean="0">
+                    <a:solidFill>
+                      <a:sysClr val="windowText" lastClr="000000"/>
+                    </a:solidFill>
+                    <a:latin typeface="Courier New" panose="02070309020205020404" pitchFamily="49" charset="0"/>
+                    <a:cs typeface="Courier New" panose="02070309020205020404" pitchFamily="49" charset="0"/>
+                  </a:rPr>
+                  <a:t>GCTACTCT</a:t>
+                </a:r>
+                <a:r>
+                  <a:rPr lang="en-US" sz="2800" b="1" spc="600" dirty="0" smtClean="0">
+                    <a:solidFill>
+                      <a:schemeClr val="bg2">
+                        <a:lumMod val="75000"/>
+                      </a:schemeClr>
+                    </a:solidFill>
+                    <a:latin typeface="Courier New" panose="02070309020205020404" pitchFamily="49" charset="0"/>
+                    <a:cs typeface="Courier New" panose="02070309020205020404" pitchFamily="49" charset="0"/>
+                  </a:rPr>
+                  <a:t>TA…</a:t>
+                </a:r>
+                <a:endParaRPr lang="en-US" sz="2800" b="1" spc="600" dirty="0">
+                  <a:solidFill>
+                    <a:schemeClr val="bg2">
+                      <a:lumMod val="75000"/>
+                    </a:schemeClr>
+                  </a:solidFill>
+                  <a:latin typeface="Courier New" panose="02070309020205020404" pitchFamily="49" charset="0"/>
+                  <a:cs typeface="Courier New" panose="02070309020205020404" pitchFamily="49" charset="0"/>
+                </a:endParaRPr>
+              </a:p>
+            </p:txBody>
+          </p:sp>
+          <p:sp>
+            <p:nvSpPr>
+              <p:cNvPr id="73" name="Rectangle 72"/>
+              <p:cNvSpPr/>
+              <p:nvPr/>
+            </p:nvSpPr>
+            <p:spPr>
+              <a:xfrm>
+                <a:off x="1087120" y="4377657"/>
+                <a:ext cx="2326640" cy="450835"/>
+              </a:xfrm>
+              <a:prstGeom prst="rect">
+                <a:avLst/>
+              </a:prstGeom>
+              <a:noFill/>
+              <a:ln w="38100">
+                <a:solidFill>
+                  <a:schemeClr val="tx1"/>
+                </a:solidFill>
+              </a:ln>
+            </p:spPr>
+            <p:style>
+              <a:lnRef idx="2">
+                <a:schemeClr val="accent1">
+                  <a:shade val="50000"/>
+                </a:schemeClr>
+              </a:lnRef>
+              <a:fillRef idx="1">
+                <a:schemeClr val="accent1"/>
+              </a:fillRef>
+              <a:effectRef idx="0">
+                <a:schemeClr val="accent1"/>
+              </a:effectRef>
+              <a:fontRef idx="minor">
+                <a:schemeClr val="lt1"/>
+              </a:fontRef>
+            </p:style>
+            <p:txBody>
+              <a:bodyPr rtlCol="0" anchor="ctr"/>
+              <a:lstStyle/>
+              <a:p>
+                <a:pPr algn="ctr"/>
+                <a:endParaRPr lang="en-US"/>
+              </a:p>
+            </p:txBody>
+          </p:sp>
+          <p:cxnSp>
+            <p:nvCxnSpPr>
+              <p:cNvPr id="74" name="Straight Arrow Connector 73"/>
+              <p:cNvCxnSpPr/>
+              <p:nvPr/>
+            </p:nvCxnSpPr>
+            <p:spPr>
+              <a:xfrm>
+                <a:off x="3302279" y="4222025"/>
+                <a:ext cx="901161" cy="3397"/>
+              </a:xfrm>
+              <a:prstGeom prst="straightConnector1">
+                <a:avLst/>
+              </a:prstGeom>
+              <a:ln w="57150">
+                <a:solidFill>
+                  <a:srgbClr val="C00000"/>
+                </a:solidFill>
+                <a:tailEnd type="triangle"/>
+              </a:ln>
+            </p:spPr>
+            <p:style>
+              <a:lnRef idx="1">
+                <a:schemeClr val="accent1"/>
+              </a:lnRef>
+              <a:fillRef idx="0">
+                <a:schemeClr val="accent1"/>
+              </a:fillRef>
+              <a:effectRef idx="0">
+                <a:schemeClr val="accent1"/>
+              </a:effectRef>
+              <a:fontRef idx="minor">
+                <a:schemeClr val="tx1"/>
+              </a:fontRef>
+            </p:style>
+          </p:cxnSp>
+        </p:grpSp>
+        <p:grpSp>
+          <p:nvGrpSpPr>
+            <p:cNvPr id="33" name="Group 32"/>
+            <p:cNvGrpSpPr/>
+            <p:nvPr/>
+          </p:nvGrpSpPr>
+          <p:grpSpPr>
+            <a:xfrm>
+              <a:off x="7185373" y="3971722"/>
+              <a:ext cx="4291818" cy="1151875"/>
+              <a:chOff x="2173830" y="4008816"/>
+              <a:chExt cx="4291818" cy="1151875"/>
+            </a:xfrm>
+          </p:grpSpPr>
+          <mc:AlternateContent xmlns:mc="http://schemas.openxmlformats.org/markup-compatibility/2006">
+            <mc:Choice xmlns:a14="http://schemas.microsoft.com/office/drawing/2010/main" Requires="a14">
+              <p:sp>
+                <p:nvSpPr>
+                  <p:cNvPr id="30" name="Rectangle 29"/>
+                  <p:cNvSpPr/>
+                  <p:nvPr/>
+                </p:nvSpPr>
+                <p:spPr>
+                  <a:xfrm>
+                    <a:off x="2173830" y="4008816"/>
+                    <a:ext cx="2761267" cy="1151875"/>
+                  </a:xfrm>
+                  <a:prstGeom prst="rect">
+                    <a:avLst/>
+                  </a:prstGeom>
+                  <a:noFill/>
+                  <a:ln>
+                    <a:solidFill>
+                      <a:schemeClr val="bg1"/>
+                    </a:solidFill>
+                  </a:ln>
+                </p:spPr>
+                <p:style>
+                  <a:lnRef idx="2">
+                    <a:schemeClr val="accent1">
+                      <a:shade val="50000"/>
+                    </a:schemeClr>
+                  </a:lnRef>
+                  <a:fillRef idx="1">
+                    <a:schemeClr val="accent1"/>
+                  </a:fillRef>
+                  <a:effectRef idx="0">
+                    <a:schemeClr val="accent1"/>
+                  </a:effectRef>
+                  <a:fontRef idx="minor">
+                    <a:schemeClr val="lt1"/>
+                  </a:fontRef>
+                </p:style>
+                <p:txBody>
+                  <a:bodyPr rtlCol="0" anchor="ctr"/>
+                  <a:lstStyle/>
+                  <a:p>
+                    <a:pPr algn="ctr"/>
+                    <a14:m>
+                      <m:oMathPara xmlns:m="http://schemas.openxmlformats.org/officeDocument/2006/math">
+                        <m:oMathParaPr>
+                          <m:jc m:val="centerGroup"/>
+                        </m:oMathParaPr>
+                        <m:oMath xmlns:m="http://schemas.openxmlformats.org/officeDocument/2006/math">
+                          <m:nary>
+                            <m:naryPr>
+                              <m:chr m:val="∑"/>
+                              <m:supHide m:val="on"/>
+                              <m:ctrlPr>
+                                <a:rPr lang="en-US" b="0" i="1" smtClean="0">
+                                  <a:solidFill>
+                                    <a:sysClr val="windowText" lastClr="000000"/>
+                                  </a:solidFill>
+                                  <a:latin typeface="Cambria Math" panose="02040503050406030204" pitchFamily="18" charset="0"/>
+                                </a:rPr>
+                              </m:ctrlPr>
+                            </m:naryPr>
+                            <m:sub>
+                              <m:r>
+                                <a:rPr lang="en-US" b="0" i="1" smtClean="0">
+                                  <a:solidFill>
+                                    <a:sysClr val="windowText" lastClr="000000"/>
+                                  </a:solidFill>
+                                  <a:latin typeface="Cambria Math" panose="02040503050406030204" pitchFamily="18" charset="0"/>
+                                </a:rPr>
+                                <m:t>𝑖</m:t>
+                              </m:r>
+                            </m:sub>
+                            <m:sup/>
+                            <m:e>
+                              <m:r>
+                                <m:rPr>
+                                  <m:sty m:val="p"/>
+                                </m:rPr>
+                                <a:rPr lang="en-US" b="0" i="0" smtClean="0">
+                                  <a:solidFill>
+                                    <a:sysClr val="windowText" lastClr="000000"/>
+                                  </a:solidFill>
+                                  <a:latin typeface="Cambria Math" panose="02040503050406030204" pitchFamily="18" charset="0"/>
+                                </a:rPr>
+                                <m:t>log</m:t>
+                              </m:r>
+                              <m:r>
+                                <a:rPr lang="en-US" b="0" i="1" smtClean="0">
+                                  <a:solidFill>
+                                    <a:sysClr val="windowText" lastClr="000000"/>
+                                  </a:solidFill>
+                                  <a:latin typeface="Cambria Math" panose="02040503050406030204" pitchFamily="18" charset="0"/>
+                                </a:rPr>
+                                <m:t>⁡</m:t>
+                              </m:r>
+                              <m:d>
+                                <m:dPr>
+                                  <m:ctrlPr>
+                                    <a:rPr lang="en-US" b="0" i="1" smtClean="0">
+                                      <a:solidFill>
+                                        <a:sysClr val="windowText" lastClr="000000"/>
+                                      </a:solidFill>
+                                      <a:latin typeface="Cambria Math" panose="02040503050406030204" pitchFamily="18" charset="0"/>
+                                    </a:rPr>
+                                  </m:ctrlPr>
+                                </m:dPr>
+                                <m:e>
+                                  <m:r>
+                                    <m:rPr>
+                                      <m:sty m:val="p"/>
+                                    </m:rPr>
+                                    <a:rPr lang="en-US">
+                                      <a:solidFill>
+                                        <a:sysClr val="windowText" lastClr="000000"/>
+                                      </a:solidFill>
+                                      <a:latin typeface="Cambria Math" panose="02040503050406030204" pitchFamily="18" charset="0"/>
+                                    </a:rPr>
+                                    <m:t>max</m:t>
+                                  </m:r>
+                                  <m:r>
+                                    <a:rPr lang="en-US" i="1">
+                                      <a:solidFill>
+                                        <a:sysClr val="windowText" lastClr="000000"/>
+                                      </a:solidFill>
+                                      <a:latin typeface="Cambria Math" panose="02040503050406030204" pitchFamily="18" charset="0"/>
+                                    </a:rPr>
+                                    <m:t>⁡</m:t>
+                                  </m:r>
+                                  <m:d>
+                                    <m:dPr>
+                                      <m:ctrlPr>
+                                        <a:rPr lang="en-US" i="1">
+                                          <a:solidFill>
+                                            <a:sysClr val="windowText" lastClr="000000"/>
+                                          </a:solidFill>
+                                          <a:latin typeface="Cambria Math" panose="02040503050406030204" pitchFamily="18" charset="0"/>
+                                        </a:rPr>
+                                      </m:ctrlPr>
+                                    </m:dPr>
+                                    <m:e>
+                                      <m:sSub>
+                                        <m:sSubPr>
+                                          <m:ctrlPr>
+                                            <a:rPr lang="en-US" i="1">
+                                              <a:solidFill>
+                                                <a:sysClr val="windowText" lastClr="000000"/>
+                                              </a:solidFill>
+                                              <a:latin typeface="Cambria Math" panose="02040503050406030204" pitchFamily="18" charset="0"/>
+                                            </a:rPr>
+                                          </m:ctrlPr>
+                                        </m:sSubPr>
+                                        <m:e>
+                                          <m:r>
+                                            <a:rPr lang="en-US" i="1">
+                                              <a:solidFill>
+                                                <a:sysClr val="windowText" lastClr="000000"/>
+                                              </a:solidFill>
+                                              <a:latin typeface="Cambria Math" panose="02040503050406030204" pitchFamily="18" charset="0"/>
+                                            </a:rPr>
+                                            <m:t>𝑀</m:t>
+                                          </m:r>
+                                        </m:e>
+                                        <m:sub>
+                                          <m:r>
+                                            <a:rPr lang="en-US" i="1">
+                                              <a:solidFill>
+                                                <a:sysClr val="windowText" lastClr="000000"/>
+                                              </a:solidFill>
+                                              <a:latin typeface="Cambria Math" panose="02040503050406030204" pitchFamily="18" charset="0"/>
+                                            </a:rPr>
+                                            <m:t>∗,</m:t>
+                                          </m:r>
+                                          <m:r>
+                                            <a:rPr lang="en-US" i="1">
+                                              <a:solidFill>
+                                                <a:sysClr val="windowText" lastClr="000000"/>
+                                              </a:solidFill>
+                                              <a:latin typeface="Cambria Math" panose="02040503050406030204" pitchFamily="18" charset="0"/>
+                                            </a:rPr>
+                                            <m:t>𝑖</m:t>
+                                          </m:r>
+                                        </m:sub>
+                                      </m:sSub>
+                                    </m:e>
+                                  </m:d>
+                                </m:e>
+                              </m:d>
+                              <m:r>
+                                <m:rPr>
+                                  <m:nor/>
+                                </m:rPr>
+                                <a:rPr lang="en-US" dirty="0">
+                                  <a:solidFill>
+                                    <a:sysClr val="windowText" lastClr="000000"/>
+                                  </a:solidFill>
+                                </a:rPr>
+                                <m:t>=-</m:t>
+                              </m:r>
+                              <m:r>
+                                <m:rPr>
+                                  <m:nor/>
+                                </m:rPr>
+                                <a:rPr lang="en-US" dirty="0">
+                                  <a:solidFill>
+                                    <a:sysClr val="windowText" lastClr="000000"/>
+                                  </a:solidFill>
+                                </a:rPr>
+                                <m:t>6</m:t>
+                              </m:r>
+                              <m:r>
+                                <m:rPr>
+                                  <m:nor/>
+                                </m:rPr>
+                                <a:rPr lang="en-US" dirty="0">
+                                  <a:solidFill>
+                                    <a:sysClr val="windowText" lastClr="000000"/>
+                                  </a:solidFill>
+                                </a:rPr>
+                                <m:t>.</m:t>
+                              </m:r>
+                              <m:r>
+                                <m:rPr>
+                                  <m:nor/>
+                                </m:rPr>
+                                <a:rPr lang="en-US" dirty="0">
+                                  <a:solidFill>
+                                    <a:sysClr val="windowText" lastClr="000000"/>
+                                  </a:solidFill>
+                                </a:rPr>
+                                <m:t>50</m:t>
+                              </m:r>
+                            </m:e>
+                          </m:nary>
+                        </m:oMath>
+                      </m:oMathPara>
+                    </a14:m>
+                    <a:endParaRPr lang="en-US" dirty="0">
+                      <a:solidFill>
+                        <a:sysClr val="windowText" lastClr="000000"/>
+                      </a:solidFill>
+                    </a:endParaRPr>
+                  </a:p>
+                </p:txBody>
+              </p:sp>
+            </mc:Choice>
+            <mc:Fallback>
+              <p:sp>
+                <p:nvSpPr>
+                  <p:cNvPr id="30" name="Rectangle 29"/>
+                  <p:cNvSpPr>
+                    <a:spLocks noRot="1" noChangeAspect="1" noMove="1" noResize="1" noEditPoints="1" noAdjustHandles="1" noChangeArrowheads="1" noChangeShapeType="1" noTextEdit="1"/>
+                  </p:cNvSpPr>
+                  <p:nvPr/>
+                </p:nvSpPr>
+                <p:spPr>
+                  <a:xfrm>
+                    <a:off x="2173830" y="4008816"/>
+                    <a:ext cx="2761267" cy="1151875"/>
+                  </a:xfrm>
+                  <a:prstGeom prst="rect">
+                    <a:avLst/>
+                  </a:prstGeom>
+                  <a:blipFill rotWithShape="0">
+                    <a:blip r:embed="rId5"/>
+                    <a:stretch>
+                      <a:fillRect/>
+                    </a:stretch>
+                  </a:blipFill>
+                  <a:ln>
+                    <a:solidFill>
+                      <a:schemeClr val="bg1"/>
+                    </a:solidFill>
+                  </a:ln>
+                </p:spPr>
+                <p:txBody>
+                  <a:bodyPr/>
+                  <a:lstStyle/>
+                  <a:p>
+                    <a:r>
+                      <a:rPr lang="en-US">
+                        <a:noFill/>
+                      </a:rPr>
+                      <a:t> </a:t>
+                    </a:r>
+                  </a:p>
+                </p:txBody>
+              </p:sp>
+            </mc:Fallback>
+          </mc:AlternateContent>
+          <p:sp>
+            <p:nvSpPr>
+              <p:cNvPr id="31" name="Bent-Up Arrow 30"/>
+              <p:cNvSpPr/>
+              <p:nvPr/>
+            </p:nvSpPr>
+            <p:spPr>
+              <a:xfrm rot="5400000" flipV="1">
+                <a:off x="5452493" y="3711203"/>
+                <a:ext cx="663785" cy="1362524"/>
+              </a:xfrm>
+              <a:prstGeom prst="bentUpArrow">
+                <a:avLst/>
+              </a:prstGeom>
+              <a:solidFill>
+                <a:schemeClr val="tx1"/>
+              </a:solidFill>
+              <a:ln>
+                <a:solidFill>
+                  <a:schemeClr val="tx1"/>
+                </a:solidFill>
+              </a:ln>
+            </p:spPr>
+            <p:style>
+              <a:lnRef idx="2">
+                <a:schemeClr val="accent1">
+                  <a:shade val="50000"/>
+                </a:schemeClr>
+              </a:lnRef>
+              <a:fillRef idx="1">
+                <a:schemeClr val="accent1"/>
+              </a:fillRef>
+              <a:effectRef idx="0">
+                <a:schemeClr val="accent1"/>
+              </a:effectRef>
+              <a:fontRef idx="minor">
+                <a:schemeClr val="lt1"/>
+              </a:fontRef>
+            </p:style>
+            <p:txBody>
+              <a:bodyPr rtlCol="0" anchor="ctr"/>
+              <a:lstStyle/>
+              <a:p>
+                <a:pPr algn="ctr"/>
+                <a:endParaRPr lang="en-US"/>
+              </a:p>
+            </p:txBody>
+          </p:sp>
+        </p:grpSp>
+        <p:pic>
+          <p:nvPicPr>
+            <p:cNvPr id="36" name="Picture 35"/>
+            <p:cNvPicPr>
+              <a:picLocks noChangeAspect="1"/>
+            </p:cNvPicPr>
+            <p:nvPr/>
+          </p:nvPicPr>
+          <p:blipFill rotWithShape="1">
+            <a:blip r:embed="rId6"/>
+            <a:srcRect l="12750" t="16058" r="16917" b="16369"/>
+            <a:stretch/>
+          </p:blipFill>
+          <p:spPr>
+            <a:xfrm>
+              <a:off x="2718954" y="3894004"/>
+              <a:ext cx="3043716" cy="1281349"/>
+            </a:xfrm>
+            <a:prstGeom prst="rect">
+              <a:avLst/>
+            </a:prstGeom>
+          </p:spPr>
+        </p:pic>
+        <p:sp>
+          <p:nvSpPr>
+            <p:cNvPr id="37" name="Rectangle 36"/>
+            <p:cNvSpPr/>
+            <p:nvPr/>
+          </p:nvSpPr>
+          <p:spPr>
+            <a:xfrm>
+              <a:off x="2935119" y="5175353"/>
+              <a:ext cx="2490321" cy="286951"/>
+            </a:xfrm>
+            <a:prstGeom prst="rect">
+              <a:avLst/>
+            </a:prstGeom>
+            <a:noFill/>
+            <a:ln>
+              <a:noFill/>
+            </a:ln>
+          </p:spPr>
+          <p:style>
+            <a:lnRef idx="2">
+              <a:schemeClr val="accent1">
+                <a:shade val="50000"/>
+              </a:schemeClr>
+            </a:lnRef>
+            <a:fillRef idx="1">
+              <a:schemeClr val="accent1"/>
+            </a:fillRef>
+            <a:effectRef idx="0">
+              <a:schemeClr val="accent1"/>
+            </a:effectRef>
+            <a:fontRef idx="minor">
+              <a:schemeClr val="lt1"/>
+            </a:fontRef>
+          </p:style>
+          <p:txBody>
+            <a:bodyPr rtlCol="0" anchor="ctr"/>
+            <a:lstStyle/>
+            <a:p>
+              <a:pPr algn="ctr"/>
+              <a:r>
+                <a:rPr lang="en-US" dirty="0" smtClean="0">
+                  <a:solidFill>
+                    <a:sysClr val="windowText" lastClr="000000"/>
+                  </a:solidFill>
+                </a:rPr>
+                <a:t>Location in sequence</a:t>
+              </a:r>
+              <a:endParaRPr lang="en-US" dirty="0">
+                <a:solidFill>
+                  <a:sysClr val="windowText" lastClr="000000"/>
+                </a:solidFill>
+              </a:endParaRPr>
+            </a:p>
+          </p:txBody>
+        </p:sp>
+        <p:sp>
+          <p:nvSpPr>
+            <p:cNvPr id="92" name="Rectangle 91"/>
+            <p:cNvSpPr/>
+            <p:nvPr/>
+          </p:nvSpPr>
+          <p:spPr>
+            <a:xfrm>
+              <a:off x="944848" y="4453504"/>
+              <a:ext cx="1745889" cy="575616"/>
+            </a:xfrm>
+            <a:prstGeom prst="rect">
+              <a:avLst/>
+            </a:prstGeom>
+            <a:noFill/>
+            <a:ln>
+              <a:noFill/>
+            </a:ln>
+          </p:spPr>
+          <p:style>
+            <a:lnRef idx="2">
+              <a:schemeClr val="accent1">
+                <a:shade val="50000"/>
+              </a:schemeClr>
+            </a:lnRef>
+            <a:fillRef idx="1">
+              <a:schemeClr val="accent1"/>
+            </a:fillRef>
+            <a:effectRef idx="0">
+              <a:schemeClr val="accent1"/>
+            </a:effectRef>
+            <a:fontRef idx="minor">
+              <a:schemeClr val="lt1"/>
+            </a:fontRef>
+          </p:style>
+          <p:txBody>
+            <a:bodyPr rtlCol="0" anchor="ctr"/>
+            <a:lstStyle/>
+            <a:p>
+              <a:pPr algn="ctr"/>
+              <a:r>
+                <a:rPr lang="en-US" dirty="0" smtClean="0">
+                  <a:solidFill>
+                    <a:sysClr val="windowText" lastClr="000000"/>
+                  </a:solidFill>
+                </a:rPr>
+                <a:t>Log likelihood of TF binding</a:t>
+              </a:r>
+              <a:endParaRPr lang="en-US" dirty="0">
+                <a:solidFill>
+                  <a:sysClr val="windowText" lastClr="000000"/>
+                </a:solidFill>
+              </a:endParaRPr>
+            </a:p>
+          </p:txBody>
+        </p:sp>
+        <p:sp>
+          <p:nvSpPr>
+            <p:cNvPr id="38" name="Left Arrow 37"/>
+            <p:cNvSpPr/>
+            <p:nvPr/>
+          </p:nvSpPr>
+          <p:spPr>
+            <a:xfrm>
+              <a:off x="5933826" y="4356734"/>
+              <a:ext cx="1178560" cy="330530"/>
+            </a:xfrm>
+            <a:prstGeom prst="leftArrow">
+              <a:avLst/>
+            </a:prstGeom>
+          </p:spPr>
+          <p:style>
+            <a:lnRef idx="2">
+              <a:schemeClr val="dk1">
+                <a:shade val="50000"/>
+              </a:schemeClr>
+            </a:lnRef>
+            <a:fillRef idx="1">
+              <a:schemeClr val="dk1"/>
+            </a:fillRef>
+            <a:effectRef idx="0">
+              <a:schemeClr val="dk1"/>
+            </a:effectRef>
+            <a:fontRef idx="minor">
+              <a:schemeClr val="lt1"/>
+            </a:fontRef>
+          </p:style>
+          <p:txBody>
+            <a:bodyPr rtlCol="0" anchor="ctr"/>
+            <a:lstStyle/>
+            <a:p>
+              <a:pPr algn="ctr"/>
+              <a:endParaRPr lang="en-US"/>
+            </a:p>
+          </p:txBody>
+        </p:sp>
+      </p:grpSp>
+    </p:spTree>
+    <p:extLst>
+      <p:ext uri="{BB962C8B-B14F-4D97-AF65-F5344CB8AC3E}">
+        <p14:creationId xmlns:p14="http://schemas.microsoft.com/office/powerpoint/2010/main" val="200963822"/>
+      </p:ext>
+    </p:extLst>
+  </p:cSld>
+  <p:clrMapOvr>
+    <a:masterClrMapping/>
+  </p:clrMapOvr>
+</p:sld>
+</file>
+
+<file path=ppt/slides/slide14.xml><?xml version="1.0" encoding="utf-8"?>
+<p:sld xmlns:a="http://schemas.openxmlformats.org/drawingml/2006/main" xmlns:r="http://schemas.openxmlformats.org/officeDocument/2006/relationships" xmlns:p="http://schemas.openxmlformats.org/presentationml/2006/main">
+  <p:cSld>
+    <p:spTree>
+      <p:nvGrpSpPr>
+        <p:cNvPr id="1" name=""/>
+        <p:cNvGrpSpPr/>
+        <p:nvPr/>
+      </p:nvGrpSpPr>
+      <p:grpSpPr>
+        <a:xfrm>
+          <a:off x="0" y="0"/>
+          <a:ext cx="0" cy="0"/>
+          <a:chOff x="0" y="0"/>
+          <a:chExt cx="0" cy="0"/>
+        </a:xfrm>
+      </p:grpSpPr>
+      <p:sp>
+        <p:nvSpPr>
+          <p:cNvPr id="2" name="Title 1"/>
+          <p:cNvSpPr>
+            <a:spLocks noGrp="1"/>
+          </p:cNvSpPr>
+          <p:nvPr>
+            <p:ph type="title"/>
+          </p:nvPr>
+        </p:nvSpPr>
+        <p:spPr/>
+        <p:txBody>
+          <a:bodyPr/>
+          <a:lstStyle/>
+          <a:p>
+            <a:endParaRPr lang="en-US"/>
+          </a:p>
+        </p:txBody>
+      </p:sp>
+      <p:pic>
+        <p:nvPicPr>
+          <p:cNvPr id="5" name="Content Placeholder 4"/>
+          <p:cNvPicPr>
+            <a:picLocks noGrp="1" noChangeAspect="1"/>
+          </p:cNvPicPr>
+          <p:nvPr>
+            <p:ph idx="1"/>
+          </p:nvPr>
+        </p:nvPicPr>
+        <p:blipFill>
+          <a:blip r:embed="rId2" cstate="print">
+            <a:extLst>
+              <a:ext uri="{28A0092B-C50C-407E-A947-70E740481C1C}">
+                <a14:useLocalDpi xmlns:a14="http://schemas.microsoft.com/office/drawing/2010/main" val="0"/>
+              </a:ext>
+            </a:extLst>
+          </a:blip>
+          <a:stretch>
+            <a:fillRect/>
+          </a:stretch>
+        </p:blipFill>
+        <p:spPr>
+          <a:xfrm>
+            <a:off x="1633089" y="1825625"/>
+            <a:ext cx="8925821" cy="4351338"/>
+          </a:xfrm>
+        </p:spPr>
+      </p:pic>
+      <p:pic>
+        <p:nvPicPr>
+          <p:cNvPr id="6" name="Picture 5"/>
+          <p:cNvPicPr>
+            <a:picLocks noChangeAspect="1"/>
+          </p:cNvPicPr>
+          <p:nvPr/>
+        </p:nvPicPr>
+        <p:blipFill>
+          <a:blip r:embed="rId3">
+            <a:extLst>
+              <a:ext uri="{28A0092B-C50C-407E-A947-70E740481C1C}">
+                <a14:useLocalDpi xmlns:a14="http://schemas.microsoft.com/office/drawing/2010/main" val="0"/>
+              </a:ext>
+            </a:extLst>
+          </a:blip>
+          <a:stretch>
+            <a:fillRect/>
+          </a:stretch>
+        </p:blipFill>
+        <p:spPr>
+          <a:xfrm>
+            <a:off x="0" y="457200"/>
+            <a:ext cx="12192000" cy="5943600"/>
+          </a:xfrm>
+          <a:prstGeom prst="rect">
+            <a:avLst/>
+          </a:prstGeom>
+        </p:spPr>
+      </p:pic>
+    </p:spTree>
+    <p:extLst>
+      <p:ext uri="{BB962C8B-B14F-4D97-AF65-F5344CB8AC3E}">
+        <p14:creationId xmlns:p14="http://schemas.microsoft.com/office/powerpoint/2010/main" val="2404448462"/>
       </p:ext>
     </p:extLst>
   </p:cSld>

</xml_diff>

<commit_message>
Figure desc added onehot desc added for data representation paragraph
</commit_message>
<xml_diff>
--- a/Help/Figures.pptx
+++ b/Help/Figures.pptx
@@ -256,7 +256,7 @@
           <a:p>
             <a:fld id="{2DC2A043-560F-4D2E-8D1E-02B02E053659}" type="datetimeFigureOut">
               <a:rPr lang="en-US" smtClean="0"/>
-              <a:t>2019-02-19</a:t>
+              <a:t>2019-03-06</a:t>
             </a:fld>
             <a:endParaRPr lang="en-US"/>
           </a:p>
@@ -426,7 +426,7 @@
           <a:p>
             <a:fld id="{2DC2A043-560F-4D2E-8D1E-02B02E053659}" type="datetimeFigureOut">
               <a:rPr lang="en-US" smtClean="0"/>
-              <a:t>2019-02-19</a:t>
+              <a:t>2019-03-06</a:t>
             </a:fld>
             <a:endParaRPr lang="en-US"/>
           </a:p>
@@ -606,7 +606,7 @@
           <a:p>
             <a:fld id="{2DC2A043-560F-4D2E-8D1E-02B02E053659}" type="datetimeFigureOut">
               <a:rPr lang="en-US" smtClean="0"/>
-              <a:t>2019-02-19</a:t>
+              <a:t>2019-03-06</a:t>
             </a:fld>
             <a:endParaRPr lang="en-US"/>
           </a:p>
@@ -776,7 +776,7 @@
           <a:p>
             <a:fld id="{2DC2A043-560F-4D2E-8D1E-02B02E053659}" type="datetimeFigureOut">
               <a:rPr lang="en-US" smtClean="0"/>
-              <a:t>2019-02-19</a:t>
+              <a:t>2019-03-06</a:t>
             </a:fld>
             <a:endParaRPr lang="en-US"/>
           </a:p>
@@ -1022,7 +1022,7 @@
           <a:p>
             <a:fld id="{2DC2A043-560F-4D2E-8D1E-02B02E053659}" type="datetimeFigureOut">
               <a:rPr lang="en-US" smtClean="0"/>
-              <a:t>2019-02-19</a:t>
+              <a:t>2019-03-06</a:t>
             </a:fld>
             <a:endParaRPr lang="en-US"/>
           </a:p>
@@ -1254,7 +1254,7 @@
           <a:p>
             <a:fld id="{2DC2A043-560F-4D2E-8D1E-02B02E053659}" type="datetimeFigureOut">
               <a:rPr lang="en-US" smtClean="0"/>
-              <a:t>2019-02-19</a:t>
+              <a:t>2019-03-06</a:t>
             </a:fld>
             <a:endParaRPr lang="en-US"/>
           </a:p>
@@ -1621,7 +1621,7 @@
           <a:p>
             <a:fld id="{2DC2A043-560F-4D2E-8D1E-02B02E053659}" type="datetimeFigureOut">
               <a:rPr lang="en-US" smtClean="0"/>
-              <a:t>2019-02-19</a:t>
+              <a:t>2019-03-06</a:t>
             </a:fld>
             <a:endParaRPr lang="en-US"/>
           </a:p>
@@ -1739,7 +1739,7 @@
           <a:p>
             <a:fld id="{2DC2A043-560F-4D2E-8D1E-02B02E053659}" type="datetimeFigureOut">
               <a:rPr lang="en-US" smtClean="0"/>
-              <a:t>2019-02-19</a:t>
+              <a:t>2019-03-06</a:t>
             </a:fld>
             <a:endParaRPr lang="en-US"/>
           </a:p>
@@ -1834,7 +1834,7 @@
           <a:p>
             <a:fld id="{2DC2A043-560F-4D2E-8D1E-02B02E053659}" type="datetimeFigureOut">
               <a:rPr lang="en-US" smtClean="0"/>
-              <a:t>2019-02-19</a:t>
+              <a:t>2019-03-06</a:t>
             </a:fld>
             <a:endParaRPr lang="en-US"/>
           </a:p>
@@ -2111,7 +2111,7 @@
           <a:p>
             <a:fld id="{2DC2A043-560F-4D2E-8D1E-02B02E053659}" type="datetimeFigureOut">
               <a:rPr lang="en-US" smtClean="0"/>
-              <a:t>2019-02-19</a:t>
+              <a:t>2019-03-06</a:t>
             </a:fld>
             <a:endParaRPr lang="en-US"/>
           </a:p>
@@ -2364,7 +2364,7 @@
           <a:p>
             <a:fld id="{2DC2A043-560F-4D2E-8D1E-02B02E053659}" type="datetimeFigureOut">
               <a:rPr lang="en-US" smtClean="0"/>
-              <a:t>2019-02-19</a:t>
+              <a:t>2019-03-06</a:t>
             </a:fld>
             <a:endParaRPr lang="en-US"/>
           </a:p>
@@ -2577,7 +2577,7 @@
           <a:p>
             <a:fld id="{2DC2A043-560F-4D2E-8D1E-02B02E053659}" type="datetimeFigureOut">
               <a:rPr lang="en-US" smtClean="0"/>
-              <a:t>2019-02-19</a:t>
+              <a:t>2019-03-06</a:t>
             </a:fld>
             <a:endParaRPr lang="en-US"/>
           </a:p>
@@ -23951,6 +23951,140 @@
           </p:txBody>
         </p:sp>
       </p:grpSp>
+      <p:sp>
+        <p:nvSpPr>
+          <p:cNvPr id="24" name="Rectangle 23"/>
+          <p:cNvSpPr/>
+          <p:nvPr/>
+        </p:nvSpPr>
+        <p:spPr>
+          <a:xfrm>
+            <a:off x="487349" y="1540272"/>
+            <a:ext cx="3683296" cy="575616"/>
+          </a:xfrm>
+          <a:prstGeom prst="rect">
+            <a:avLst/>
+          </a:prstGeom>
+          <a:noFill/>
+          <a:ln>
+            <a:noFill/>
+          </a:ln>
+        </p:spPr>
+        <p:style>
+          <a:lnRef idx="2">
+            <a:schemeClr val="accent1">
+              <a:shade val="50000"/>
+            </a:schemeClr>
+          </a:lnRef>
+          <a:fillRef idx="1">
+            <a:schemeClr val="accent1"/>
+          </a:fillRef>
+          <a:effectRef idx="0">
+            <a:schemeClr val="accent1"/>
+          </a:effectRef>
+          <a:fontRef idx="minor">
+            <a:schemeClr val="lt1"/>
+          </a:fontRef>
+        </p:style>
+        <p:txBody>
+          <a:bodyPr rtlCol="0" anchor="ctr"/>
+          <a:lstStyle/>
+          <a:p>
+            <a:pPr algn="ctr"/>
+            <a:endParaRPr lang="en-US" sz="2800" dirty="0">
+              <a:ln w="0"/>
+              <a:solidFill>
+                <a:schemeClr val="accent1"/>
+              </a:solidFill>
+              <a:effectLst>
+                <a:outerShdw blurRad="38100" dist="25400" dir="5400000" algn="ctr" rotWithShape="0">
+                  <a:srgbClr val="6E747A">
+                    <a:alpha val="43000"/>
+                  </a:srgbClr>
+                </a:outerShdw>
+              </a:effectLst>
+              <a:latin typeface="Courier New" panose="02070309020205020404" pitchFamily="49" charset="0"/>
+              <a:cs typeface="Courier New" panose="02070309020205020404" pitchFamily="49" charset="0"/>
+            </a:endParaRPr>
+          </a:p>
+        </p:txBody>
+      </p:sp>
+      <p:sp>
+        <p:nvSpPr>
+          <p:cNvPr id="25" name="Rectangle 24"/>
+          <p:cNvSpPr/>
+          <p:nvPr/>
+        </p:nvSpPr>
+        <p:spPr>
+          <a:xfrm>
+            <a:off x="-448166" y="1498178"/>
+            <a:ext cx="4572000" cy="606467"/>
+          </a:xfrm>
+          <a:prstGeom prst="rect">
+            <a:avLst/>
+          </a:prstGeom>
+          <a:noFill/>
+          <a:ln>
+            <a:noFill/>
+          </a:ln>
+        </p:spPr>
+        <p:style>
+          <a:lnRef idx="2">
+            <a:schemeClr val="accent1">
+              <a:shade val="50000"/>
+            </a:schemeClr>
+          </a:lnRef>
+          <a:fillRef idx="1">
+            <a:schemeClr val="accent1"/>
+          </a:fillRef>
+          <a:effectRef idx="0">
+            <a:schemeClr val="accent1"/>
+          </a:effectRef>
+          <a:fontRef idx="minor">
+            <a:schemeClr val="lt1"/>
+          </a:fontRef>
+        </p:style>
+        <p:txBody>
+          <a:bodyPr rtlCol="0" anchor="ctr"/>
+          <a:lstStyle/>
+          <a:p>
+            <a:pPr algn="ctr"/>
+            <a:r>
+              <a:rPr lang="en-US" sz="2400" dirty="0" smtClean="0">
+                <a:ln w="0"/>
+                <a:solidFill>
+                  <a:schemeClr val="accent1"/>
+                </a:solidFill>
+                <a:effectLst>
+                  <a:outerShdw blurRad="38100" dist="25400" dir="5400000" algn="ctr" rotWithShape="0">
+                    <a:srgbClr val="6E747A">
+                      <a:alpha val="43000"/>
+                    </a:srgbClr>
+                  </a:outerShdw>
+                </a:effectLst>
+                <a:latin typeface="Courier New" panose="02070309020205020404" pitchFamily="49" charset="0"/>
+                <a:cs typeface="Courier New" panose="02070309020205020404" pitchFamily="49" charset="0"/>
+              </a:rPr>
+              <a:t>One-hot encoding</a:t>
+            </a:r>
+            <a:endParaRPr lang="en-US" sz="2400" dirty="0">
+              <a:ln w="0"/>
+              <a:solidFill>
+                <a:schemeClr val="accent1"/>
+              </a:solidFill>
+              <a:effectLst>
+                <a:outerShdw blurRad="38100" dist="25400" dir="5400000" algn="ctr" rotWithShape="0">
+                  <a:srgbClr val="6E747A">
+                    <a:alpha val="43000"/>
+                  </a:srgbClr>
+                </a:outerShdw>
+              </a:effectLst>
+              <a:latin typeface="Courier New" panose="02070309020205020404" pitchFamily="49" charset="0"/>
+              <a:cs typeface="Courier New" panose="02070309020205020404" pitchFamily="49" charset="0"/>
+            </a:endParaRPr>
+          </a:p>
+        </p:txBody>
+      </p:sp>
     </p:spTree>
     <p:extLst>
       <p:ext uri="{BB962C8B-B14F-4D97-AF65-F5344CB8AC3E}">
@@ -30078,12 +30212,6 @@
                         </a:rPr>
                         <a:t>with histone modifications</a:t>
                       </a:r>
-                      <a:endParaRPr lang="en-US" sz="2400" dirty="0" smtClean="0">
-                        <a:ln w="0"/>
-                        <a:solidFill>
-                          <a:schemeClr val="tx1"/>
-                        </a:solidFill>
-                      </a:endParaRPr>
                     </a:p>
                   </p:txBody>
                 </p:sp>

</xml_diff>